<commit_message>
done with 4.1. on statement-level feature graph
</commit_message>
<xml_diff>
--- a/Figures.pptx
+++ b/Figures.pptx
@@ -16559,14 +16559,12 @@
           </p:cNvPr>
           <p:cNvCxnSpPr>
             <a:cxnSpLocks/>
-            <a:stCxn id="21" idx="1"/>
-            <a:endCxn id="25" idx="7"/>
           </p:cNvCxnSpPr>
           <p:nvPr/>
         </p:nvCxnSpPr>
         <p:spPr>
           <a:xfrm flipH="1">
-            <a:off x="2189668" y="2745740"/>
+            <a:off x="2184898" y="2799979"/>
             <a:ext cx="758259" cy="332130"/>
           </a:xfrm>
           <a:prstGeom prst="straightConnector1">
@@ -16579,8 +16577,8 @@
               </a:schemeClr>
             </a:solidFill>
             <a:prstDash val="lgDash"/>
-            <a:headEnd type="triangle"/>
-            <a:tailEnd type="triangle"/>
+            <a:headEnd type="arrow" w="med" len="med"/>
+            <a:tailEnd type="none" w="med" len="med"/>
           </a:ln>
         </p:spPr>
         <p:style>
@@ -16982,7 +16980,7 @@
         </p:nvGrpSpPr>
         <p:grpSpPr>
           <a:xfrm>
-            <a:off x="2150948" y="3602170"/>
+            <a:off x="2133698" y="3601714"/>
             <a:ext cx="2761607" cy="1035278"/>
             <a:chOff x="1893885" y="3670447"/>
             <a:chExt cx="2761607" cy="1035278"/>
@@ -17017,54 +17015,6 @@
                 </a:schemeClr>
               </a:solidFill>
               <a:prstDash val="dash"/>
-              <a:tailEnd type="triangle"/>
-            </a:ln>
-          </p:spPr>
-          <p:style>
-            <a:lnRef idx="1">
-              <a:schemeClr val="accent1"/>
-            </a:lnRef>
-            <a:fillRef idx="0">
-              <a:schemeClr val="accent1"/>
-            </a:fillRef>
-            <a:effectRef idx="0">
-              <a:schemeClr val="accent1"/>
-            </a:effectRef>
-            <a:fontRef idx="minor">
-              <a:schemeClr val="tx1"/>
-            </a:fontRef>
-          </p:style>
-        </p:cxnSp>
-        <p:cxnSp>
-          <p:nvCxnSpPr>
-            <p:cNvPr id="38" name="Straight Arrow Connector 37">
-              <a:extLst>
-                <a:ext uri="{FF2B5EF4-FFF2-40B4-BE49-F238E27FC236}">
-                  <a16:creationId xmlns:a16="http://schemas.microsoft.com/office/drawing/2014/main" id="{702A1946-4BD2-401C-BA24-3073E84A373A}"/>
-                </a:ext>
-              </a:extLst>
-            </p:cNvPr>
-            <p:cNvCxnSpPr>
-              <a:cxnSpLocks/>
-            </p:cNvCxnSpPr>
-            <p:nvPr/>
-          </p:nvCxnSpPr>
-          <p:spPr>
-            <a:xfrm flipH="1">
-              <a:off x="1893925" y="4314440"/>
-              <a:ext cx="472299" cy="0"/>
-            </a:xfrm>
-            <a:prstGeom prst="straightConnector1">
-              <a:avLst/>
-            </a:prstGeom>
-            <a:ln w="25400">
-              <a:solidFill>
-                <a:schemeClr val="accent2">
-                  <a:lumMod val="75000"/>
-                </a:schemeClr>
-              </a:solidFill>
-              <a:prstDash val="dash"/>
-              <a:headEnd type="triangle"/>
               <a:tailEnd type="triangle"/>
             </a:ln>
           </p:spPr>
@@ -18727,6 +18677,102 @@
           </a:p>
         </p:txBody>
       </p:sp>
+      <p:cxnSp>
+        <p:nvCxnSpPr>
+          <p:cNvPr id="77" name="Straight Arrow Connector 76">
+            <a:extLst>
+              <a:ext uri="{FF2B5EF4-FFF2-40B4-BE49-F238E27FC236}">
+                <a16:creationId xmlns:a16="http://schemas.microsoft.com/office/drawing/2014/main" id="{F7BA89C4-FCBE-42BF-B8C6-1FCBE9247C1F}"/>
+              </a:ext>
+            </a:extLst>
+          </p:cNvPr>
+          <p:cNvCxnSpPr>
+            <a:cxnSpLocks/>
+          </p:cNvCxnSpPr>
+          <p:nvPr/>
+        </p:nvCxnSpPr>
+        <p:spPr>
+          <a:xfrm flipV="1">
+            <a:off x="2146911" y="2688456"/>
+            <a:ext cx="823837" cy="392756"/>
+          </a:xfrm>
+          <a:prstGeom prst="straightConnector1">
+            <a:avLst/>
+          </a:prstGeom>
+          <a:ln w="25400">
+            <a:solidFill>
+              <a:schemeClr val="accent2">
+                <a:lumMod val="75000"/>
+              </a:schemeClr>
+            </a:solidFill>
+            <a:prstDash val="lgDash"/>
+            <a:headEnd type="arrow" w="med" len="med"/>
+            <a:tailEnd type="none" w="med" len="med"/>
+          </a:ln>
+        </p:spPr>
+        <p:style>
+          <a:lnRef idx="1">
+            <a:schemeClr val="accent1"/>
+          </a:lnRef>
+          <a:fillRef idx="0">
+            <a:schemeClr val="accent1"/>
+          </a:fillRef>
+          <a:effectRef idx="0">
+            <a:schemeClr val="accent1"/>
+          </a:effectRef>
+          <a:fontRef idx="minor">
+            <a:schemeClr val="tx1"/>
+          </a:fontRef>
+        </p:style>
+      </p:cxnSp>
+      <p:cxnSp>
+        <p:nvCxnSpPr>
+          <p:cNvPr id="79" name="Straight Arrow Connector 78">
+            <a:extLst>
+              <a:ext uri="{FF2B5EF4-FFF2-40B4-BE49-F238E27FC236}">
+                <a16:creationId xmlns:a16="http://schemas.microsoft.com/office/drawing/2014/main" id="{7BAC4A29-C14E-4629-8498-A2371B6E6A4F}"/>
+              </a:ext>
+            </a:extLst>
+          </p:cNvPr>
+          <p:cNvCxnSpPr>
+            <a:cxnSpLocks/>
+          </p:cNvCxnSpPr>
+          <p:nvPr/>
+        </p:nvCxnSpPr>
+        <p:spPr>
+          <a:xfrm flipH="1">
+            <a:off x="2024826" y="4254306"/>
+            <a:ext cx="591060" cy="0"/>
+          </a:xfrm>
+          <a:prstGeom prst="straightConnector1">
+            <a:avLst/>
+          </a:prstGeom>
+          <a:ln w="25400">
+            <a:solidFill>
+              <a:schemeClr val="accent2">
+                <a:lumMod val="75000"/>
+              </a:schemeClr>
+            </a:solidFill>
+            <a:prstDash val="lgDash"/>
+            <a:headEnd type="arrow" w="med" len="med"/>
+            <a:tailEnd type="none" w="med" len="med"/>
+          </a:ln>
+        </p:spPr>
+        <p:style>
+          <a:lnRef idx="1">
+            <a:schemeClr val="accent1"/>
+          </a:lnRef>
+          <a:fillRef idx="0">
+            <a:schemeClr val="accent1"/>
+          </a:fillRef>
+          <a:effectRef idx="0">
+            <a:schemeClr val="accent1"/>
+          </a:effectRef>
+          <a:fontRef idx="minor">
+            <a:schemeClr val="tx1"/>
+          </a:fontRef>
+        </p:style>
+      </p:cxnSp>
     </p:spTree>
     <p:extLst>
       <p:ext uri="{BB962C8B-B14F-4D97-AF65-F5344CB8AC3E}">

</xml_diff>

<commit_message>
new figures for feature rep learning
</commit_message>
<xml_diff>
--- a/Figures.pptx
+++ b/Figures.pptx
@@ -12,6 +12,7 @@
     <p:sldId id="260" r:id="rId6"/>
     <p:sldId id="261" r:id="rId7"/>
     <p:sldId id="262" r:id="rId8"/>
+    <p:sldId id="263" r:id="rId9"/>
   </p:sldIdLst>
   <p:sldSz cx="12192000" cy="6858000"/>
   <p:notesSz cx="6858000" cy="9144000"/>
@@ -35063,6 +35064,3445 @@
 </p:sld>
 </file>
 
+<file path=ppt/slides/slide8.xml><?xml version="1.0" encoding="utf-8"?>
+<p:sld xmlns:a="http://schemas.openxmlformats.org/drawingml/2006/main" xmlns:r="http://schemas.openxmlformats.org/officeDocument/2006/relationships" xmlns:p="http://schemas.openxmlformats.org/presentationml/2006/main">
+  <p:cSld>
+    <p:spTree>
+      <p:nvGrpSpPr>
+        <p:cNvPr id="1" name=""/>
+        <p:cNvGrpSpPr/>
+        <p:nvPr/>
+      </p:nvGrpSpPr>
+      <p:grpSpPr>
+        <a:xfrm>
+          <a:off x="0" y="0"/>
+          <a:ext cx="0" cy="0"/>
+          <a:chOff x="0" y="0"/>
+          <a:chExt cx="0" cy="0"/>
+        </a:xfrm>
+      </p:grpSpPr>
+      <p:sp>
+        <p:nvSpPr>
+          <p:cNvPr id="2" name="TextBox 1">
+            <a:extLst>
+              <a:ext uri="{FF2B5EF4-FFF2-40B4-BE49-F238E27FC236}">
+                <a16:creationId xmlns:a16="http://schemas.microsoft.com/office/drawing/2014/main" id="{0DA92715-6065-4BD2-A200-8177865C7665}"/>
+              </a:ext>
+            </a:extLst>
+          </p:cNvPr>
+          <p:cNvSpPr txBox="1"/>
+          <p:nvPr/>
+        </p:nvSpPr>
+        <p:spPr>
+          <a:xfrm>
+            <a:off x="3295831" y="1915753"/>
+            <a:ext cx="1930973" cy="338554"/>
+          </a:xfrm>
+          <a:prstGeom prst="rect">
+            <a:avLst/>
+          </a:prstGeom>
+          <a:noFill/>
+        </p:spPr>
+        <p:txBody>
+          <a:bodyPr wrap="square" rtlCol="0">
+            <a:spAutoFit/>
+          </a:bodyPr>
+          <a:lstStyle/>
+          <a:p>
+            <a:r>
+              <a:rPr lang="en-US" sz="1600" i="1" dirty="0"/>
+              <a:t>Code coverage</a:t>
+            </a:r>
+          </a:p>
+        </p:txBody>
+      </p:sp>
+      <p:sp>
+        <p:nvSpPr>
+          <p:cNvPr id="3" name="TextBox 2">
+            <a:extLst>
+              <a:ext uri="{FF2B5EF4-FFF2-40B4-BE49-F238E27FC236}">
+                <a16:creationId xmlns:a16="http://schemas.microsoft.com/office/drawing/2014/main" id="{2E6AADB5-1754-47E3-805D-B0344C7AA2B0}"/>
+              </a:ext>
+            </a:extLst>
+          </p:cNvPr>
+          <p:cNvSpPr txBox="1"/>
+          <p:nvPr/>
+        </p:nvSpPr>
+        <p:spPr>
+          <a:xfrm>
+            <a:off x="3409953" y="2374859"/>
+            <a:ext cx="532549" cy="369332"/>
+          </a:xfrm>
+          <a:prstGeom prst="rect">
+            <a:avLst/>
+          </a:prstGeom>
+          <a:noFill/>
+        </p:spPr>
+        <p:txBody>
+          <a:bodyPr wrap="square" rtlCol="0">
+            <a:spAutoFit/>
+          </a:bodyPr>
+          <a:lstStyle/>
+          <a:p>
+            <a:pPr algn="ctr"/>
+            <a:r>
+              <a:rPr lang="en-US" dirty="0"/>
+              <a:t>AST</a:t>
+            </a:r>
+          </a:p>
+        </p:txBody>
+      </p:sp>
+      <p:sp>
+        <p:nvSpPr>
+          <p:cNvPr id="4" name="TextBox 3">
+            <a:extLst>
+              <a:ext uri="{FF2B5EF4-FFF2-40B4-BE49-F238E27FC236}">
+                <a16:creationId xmlns:a16="http://schemas.microsoft.com/office/drawing/2014/main" id="{5DD5D785-C039-466D-A01A-685FC2094385}"/>
+              </a:ext>
+            </a:extLst>
+          </p:cNvPr>
+          <p:cNvSpPr txBox="1"/>
+          <p:nvPr/>
+        </p:nvSpPr>
+        <p:spPr>
+          <a:xfrm>
+            <a:off x="3264275" y="3240941"/>
+            <a:ext cx="1412660" cy="369332"/>
+          </a:xfrm>
+          <a:prstGeom prst="rect">
+            <a:avLst/>
+          </a:prstGeom>
+          <a:noFill/>
+        </p:spPr>
+        <p:txBody>
+          <a:bodyPr wrap="square" rtlCol="0">
+            <a:spAutoFit/>
+          </a:bodyPr>
+          <a:lstStyle/>
+          <a:p>
+            <a:pPr algn="ctr"/>
+            <a:r>
+              <a:rPr lang="en-US" dirty="0"/>
+              <a:t>Variables</a:t>
+            </a:r>
+          </a:p>
+        </p:txBody>
+      </p:sp>
+      <p:sp>
+        <p:nvSpPr>
+          <p:cNvPr id="33" name="Rectangle: Rounded Corners 32">
+            <a:extLst>
+              <a:ext uri="{FF2B5EF4-FFF2-40B4-BE49-F238E27FC236}">
+                <a16:creationId xmlns:a16="http://schemas.microsoft.com/office/drawing/2014/main" id="{554E4FA8-6A8E-4244-B394-2320D49053FF}"/>
+              </a:ext>
+            </a:extLst>
+          </p:cNvPr>
+          <p:cNvSpPr/>
+          <p:nvPr/>
+        </p:nvSpPr>
+        <p:spPr>
+          <a:xfrm>
+            <a:off x="7749077" y="2489010"/>
+            <a:ext cx="1079695" cy="387059"/>
+          </a:xfrm>
+          <a:prstGeom prst="roundRect">
+            <a:avLst/>
+          </a:prstGeom>
+          <a:solidFill>
+            <a:schemeClr val="accent5">
+              <a:lumMod val="40000"/>
+              <a:lumOff val="60000"/>
+            </a:schemeClr>
+          </a:solidFill>
+          <a:ln>
+            <a:solidFill>
+              <a:schemeClr val="accent5">
+                <a:lumMod val="75000"/>
+              </a:schemeClr>
+            </a:solidFill>
+          </a:ln>
+        </p:spPr>
+        <p:style>
+          <a:lnRef idx="2">
+            <a:schemeClr val="accent1">
+              <a:shade val="50000"/>
+            </a:schemeClr>
+          </a:lnRef>
+          <a:fillRef idx="1">
+            <a:schemeClr val="accent1"/>
+          </a:fillRef>
+          <a:effectRef idx="0">
+            <a:schemeClr val="accent1"/>
+          </a:effectRef>
+          <a:fontRef idx="minor">
+            <a:schemeClr val="lt1"/>
+          </a:fontRef>
+        </p:style>
+        <p:txBody>
+          <a:bodyPr rtlCol="0" anchor="ctr"/>
+          <a:lstStyle/>
+          <a:p>
+            <a:pPr algn="ctr"/>
+            <a:r>
+              <a:rPr lang="en-US" dirty="0"/>
+              <a:t>TreeCaps</a:t>
+            </a:r>
+          </a:p>
+        </p:txBody>
+      </p:sp>
+      <p:sp>
+        <p:nvSpPr>
+          <p:cNvPr id="34" name="Rectangle: Rounded Corners 33">
+            <a:extLst>
+              <a:ext uri="{FF2B5EF4-FFF2-40B4-BE49-F238E27FC236}">
+                <a16:creationId xmlns:a16="http://schemas.microsoft.com/office/drawing/2014/main" id="{D222BB27-0980-484C-96BD-F89E12F26F2D}"/>
+              </a:ext>
+            </a:extLst>
+          </p:cNvPr>
+          <p:cNvSpPr/>
+          <p:nvPr/>
+        </p:nvSpPr>
+        <p:spPr>
+          <a:xfrm>
+            <a:off x="7749077" y="3545224"/>
+            <a:ext cx="1079695" cy="387059"/>
+          </a:xfrm>
+          <a:prstGeom prst="roundRect">
+            <a:avLst/>
+          </a:prstGeom>
+          <a:solidFill>
+            <a:schemeClr val="accent5">
+              <a:lumMod val="40000"/>
+              <a:lumOff val="60000"/>
+            </a:schemeClr>
+          </a:solidFill>
+          <a:ln>
+            <a:solidFill>
+              <a:schemeClr val="accent5">
+                <a:lumMod val="75000"/>
+              </a:schemeClr>
+            </a:solidFill>
+          </a:ln>
+        </p:spPr>
+        <p:style>
+          <a:lnRef idx="2">
+            <a:schemeClr val="accent1">
+              <a:shade val="50000"/>
+            </a:schemeClr>
+          </a:lnRef>
+          <a:fillRef idx="1">
+            <a:schemeClr val="accent1"/>
+          </a:fillRef>
+          <a:effectRef idx="0">
+            <a:schemeClr val="accent1"/>
+          </a:effectRef>
+          <a:fontRef idx="minor">
+            <a:schemeClr val="lt1"/>
+          </a:fontRef>
+        </p:style>
+        <p:txBody>
+          <a:bodyPr rtlCol="0" anchor="ctr"/>
+          <a:lstStyle/>
+          <a:p>
+            <a:pPr algn="ctr"/>
+            <a:r>
+              <a:rPr lang="en-US" dirty="0"/>
+              <a:t>TreeCaps</a:t>
+            </a:r>
+          </a:p>
+        </p:txBody>
+      </p:sp>
+      <p:sp>
+        <p:nvSpPr>
+          <p:cNvPr id="88" name="Rectangle: Rounded Corners 87">
+            <a:extLst>
+              <a:ext uri="{FF2B5EF4-FFF2-40B4-BE49-F238E27FC236}">
+                <a16:creationId xmlns:a16="http://schemas.microsoft.com/office/drawing/2014/main" id="{A9367E06-B8B8-4DE7-9EC6-053AF2EE0809}"/>
+              </a:ext>
+            </a:extLst>
+          </p:cNvPr>
+          <p:cNvSpPr/>
+          <p:nvPr/>
+        </p:nvSpPr>
+        <p:spPr>
+          <a:xfrm>
+            <a:off x="9899307" y="2328492"/>
+            <a:ext cx="1144211" cy="764600"/>
+          </a:xfrm>
+          <a:prstGeom prst="roundRect">
+            <a:avLst/>
+          </a:prstGeom>
+          <a:solidFill>
+            <a:schemeClr val="accent5">
+              <a:lumMod val="40000"/>
+              <a:lumOff val="60000"/>
+            </a:schemeClr>
+          </a:solidFill>
+          <a:ln>
+            <a:solidFill>
+              <a:schemeClr val="accent5">
+                <a:lumMod val="75000"/>
+              </a:schemeClr>
+            </a:solidFill>
+          </a:ln>
+        </p:spPr>
+        <p:style>
+          <a:lnRef idx="2">
+            <a:schemeClr val="accent1">
+              <a:shade val="50000"/>
+            </a:schemeClr>
+          </a:lnRef>
+          <a:fillRef idx="1">
+            <a:schemeClr val="accent1"/>
+          </a:fillRef>
+          <a:effectRef idx="0">
+            <a:schemeClr val="accent1"/>
+          </a:effectRef>
+          <a:fontRef idx="minor">
+            <a:schemeClr val="lt1"/>
+          </a:fontRef>
+        </p:style>
+        <p:txBody>
+          <a:bodyPr lIns="18288" tIns="18288" rIns="18288" bIns="18288" rtlCol="0" anchor="ctr"/>
+          <a:lstStyle/>
+          <a:p>
+            <a:pPr algn="ctr"/>
+            <a:r>
+              <a:rPr lang="en-US" dirty="0"/>
+              <a:t>Fully Connected Layer</a:t>
+            </a:r>
+          </a:p>
+        </p:txBody>
+      </p:sp>
+      <p:sp>
+        <p:nvSpPr>
+          <p:cNvPr id="42" name="TextBox 41">
+            <a:extLst>
+              <a:ext uri="{FF2B5EF4-FFF2-40B4-BE49-F238E27FC236}">
+                <a16:creationId xmlns:a16="http://schemas.microsoft.com/office/drawing/2014/main" id="{40A3D922-C447-4886-B048-8A29486C6ACB}"/>
+              </a:ext>
+            </a:extLst>
+          </p:cNvPr>
+          <p:cNvSpPr txBox="1"/>
+          <p:nvPr/>
+        </p:nvSpPr>
+        <p:spPr>
+          <a:xfrm>
+            <a:off x="9086856" y="3781813"/>
+            <a:ext cx="744222" cy="369332"/>
+          </a:xfrm>
+          <a:prstGeom prst="rect">
+            <a:avLst/>
+          </a:prstGeom>
+          <a:noFill/>
+        </p:spPr>
+        <p:txBody>
+          <a:bodyPr wrap="square" rtlCol="0">
+            <a:spAutoFit/>
+          </a:bodyPr>
+          <a:lstStyle/>
+          <a:p>
+            <a:r>
+              <a:rPr lang="en-US" dirty="0"/>
+              <a:t>V</a:t>
+            </a:r>
+            <a:r>
+              <a:rPr lang="en-US" sz="1050" dirty="0"/>
+              <a:t>var</a:t>
+            </a:r>
+            <a:endParaRPr lang="en-US" sz="1400" dirty="0"/>
+          </a:p>
+        </p:txBody>
+      </p:sp>
+      <p:grpSp>
+        <p:nvGrpSpPr>
+          <p:cNvPr id="74" name="Group 73">
+            <a:extLst>
+              <a:ext uri="{FF2B5EF4-FFF2-40B4-BE49-F238E27FC236}">
+                <a16:creationId xmlns:a16="http://schemas.microsoft.com/office/drawing/2014/main" id="{5D77D2D2-9E26-4AA2-87AF-9D8F429D4CBD}"/>
+              </a:ext>
+            </a:extLst>
+          </p:cNvPr>
+          <p:cNvGrpSpPr/>
+          <p:nvPr/>
+        </p:nvGrpSpPr>
+        <p:grpSpPr>
+          <a:xfrm>
+            <a:off x="9086856" y="3652909"/>
+            <a:ext cx="590550" cy="180483"/>
+            <a:chOff x="10191750" y="3201290"/>
+            <a:chExt cx="590550" cy="180483"/>
+          </a:xfrm>
+        </p:grpSpPr>
+        <p:sp>
+          <p:nvSpPr>
+            <p:cNvPr id="70" name="Rectangle: Rounded Corners 69">
+              <a:extLst>
+                <a:ext uri="{FF2B5EF4-FFF2-40B4-BE49-F238E27FC236}">
+                  <a16:creationId xmlns:a16="http://schemas.microsoft.com/office/drawing/2014/main" id="{A2A97FFB-63D0-4462-AC49-44210F4D91D3}"/>
+                </a:ext>
+              </a:extLst>
+            </p:cNvPr>
+            <p:cNvSpPr/>
+            <p:nvPr/>
+          </p:nvSpPr>
+          <p:spPr>
+            <a:xfrm>
+              <a:off x="10191750" y="3201290"/>
+              <a:ext cx="590550" cy="180483"/>
+            </a:xfrm>
+            <a:prstGeom prst="roundRect">
+              <a:avLst/>
+            </a:prstGeom>
+            <a:noFill/>
+            <a:ln>
+              <a:solidFill>
+                <a:schemeClr val="tx1"/>
+              </a:solidFill>
+            </a:ln>
+          </p:spPr>
+          <p:style>
+            <a:lnRef idx="2">
+              <a:schemeClr val="accent1">
+                <a:shade val="50000"/>
+              </a:schemeClr>
+            </a:lnRef>
+            <a:fillRef idx="1">
+              <a:schemeClr val="accent1"/>
+            </a:fillRef>
+            <a:effectRef idx="0">
+              <a:schemeClr val="accent1"/>
+            </a:effectRef>
+            <a:fontRef idx="minor">
+              <a:schemeClr val="lt1"/>
+            </a:fontRef>
+          </p:style>
+          <p:txBody>
+            <a:bodyPr rtlCol="0" anchor="ctr"/>
+            <a:lstStyle/>
+            <a:p>
+              <a:pPr algn="ctr"/>
+              <a:endParaRPr lang="en-US" dirty="0"/>
+            </a:p>
+          </p:txBody>
+        </p:sp>
+        <p:sp>
+          <p:nvSpPr>
+            <p:cNvPr id="71" name="Oval 70">
+              <a:extLst>
+                <a:ext uri="{FF2B5EF4-FFF2-40B4-BE49-F238E27FC236}">
+                  <a16:creationId xmlns:a16="http://schemas.microsoft.com/office/drawing/2014/main" id="{04E69232-B152-40CD-87CD-0098896F5731}"/>
+                </a:ext>
+              </a:extLst>
+            </p:cNvPr>
+            <p:cNvSpPr/>
+            <p:nvPr/>
+          </p:nvSpPr>
+          <p:spPr>
+            <a:xfrm>
+              <a:off x="10258345" y="3230725"/>
+              <a:ext cx="123905" cy="123905"/>
+            </a:xfrm>
+            <a:prstGeom prst="ellipse">
+              <a:avLst/>
+            </a:prstGeom>
+          </p:spPr>
+          <p:style>
+            <a:lnRef idx="2">
+              <a:schemeClr val="accent1">
+                <a:shade val="50000"/>
+              </a:schemeClr>
+            </a:lnRef>
+            <a:fillRef idx="1">
+              <a:schemeClr val="accent1"/>
+            </a:fillRef>
+            <a:effectRef idx="0">
+              <a:schemeClr val="accent1"/>
+            </a:effectRef>
+            <a:fontRef idx="minor">
+              <a:schemeClr val="lt1"/>
+            </a:fontRef>
+          </p:style>
+          <p:txBody>
+            <a:bodyPr rtlCol="0" anchor="ctr"/>
+            <a:lstStyle/>
+            <a:p>
+              <a:pPr algn="ctr"/>
+              <a:endParaRPr lang="en-US" dirty="0"/>
+            </a:p>
+          </p:txBody>
+        </p:sp>
+        <p:sp>
+          <p:nvSpPr>
+            <p:cNvPr id="72" name="Oval 71">
+              <a:extLst>
+                <a:ext uri="{FF2B5EF4-FFF2-40B4-BE49-F238E27FC236}">
+                  <a16:creationId xmlns:a16="http://schemas.microsoft.com/office/drawing/2014/main" id="{C05F3F5A-98C3-4182-AD40-BE3D86E990F5}"/>
+                </a:ext>
+              </a:extLst>
+            </p:cNvPr>
+            <p:cNvSpPr/>
+            <p:nvPr/>
+          </p:nvSpPr>
+          <p:spPr>
+            <a:xfrm>
+              <a:off x="10421903" y="3227520"/>
+              <a:ext cx="123905" cy="123905"/>
+            </a:xfrm>
+            <a:prstGeom prst="ellipse">
+              <a:avLst/>
+            </a:prstGeom>
+          </p:spPr>
+          <p:style>
+            <a:lnRef idx="2">
+              <a:schemeClr val="accent1">
+                <a:shade val="50000"/>
+              </a:schemeClr>
+            </a:lnRef>
+            <a:fillRef idx="1">
+              <a:schemeClr val="accent1"/>
+            </a:fillRef>
+            <a:effectRef idx="0">
+              <a:schemeClr val="accent1"/>
+            </a:effectRef>
+            <a:fontRef idx="minor">
+              <a:schemeClr val="lt1"/>
+            </a:fontRef>
+          </p:style>
+          <p:txBody>
+            <a:bodyPr rtlCol="0" anchor="ctr"/>
+            <a:lstStyle/>
+            <a:p>
+              <a:pPr algn="ctr"/>
+              <a:endParaRPr lang="en-US" dirty="0"/>
+            </a:p>
+          </p:txBody>
+        </p:sp>
+        <p:sp>
+          <p:nvSpPr>
+            <p:cNvPr id="73" name="Oval 72">
+              <a:extLst>
+                <a:ext uri="{FF2B5EF4-FFF2-40B4-BE49-F238E27FC236}">
+                  <a16:creationId xmlns:a16="http://schemas.microsoft.com/office/drawing/2014/main" id="{2DDD9563-7546-47EB-A666-182C31277647}"/>
+                </a:ext>
+              </a:extLst>
+            </p:cNvPr>
+            <p:cNvSpPr/>
+            <p:nvPr/>
+          </p:nvSpPr>
+          <p:spPr>
+            <a:xfrm>
+              <a:off x="10585461" y="3227520"/>
+              <a:ext cx="123905" cy="123905"/>
+            </a:xfrm>
+            <a:prstGeom prst="ellipse">
+              <a:avLst/>
+            </a:prstGeom>
+          </p:spPr>
+          <p:style>
+            <a:lnRef idx="2">
+              <a:schemeClr val="accent1">
+                <a:shade val="50000"/>
+              </a:schemeClr>
+            </a:lnRef>
+            <a:fillRef idx="1">
+              <a:schemeClr val="accent1"/>
+            </a:fillRef>
+            <a:effectRef idx="0">
+              <a:schemeClr val="accent1"/>
+            </a:effectRef>
+            <a:fontRef idx="minor">
+              <a:schemeClr val="lt1"/>
+            </a:fontRef>
+          </p:style>
+          <p:txBody>
+            <a:bodyPr rtlCol="0" anchor="ctr"/>
+            <a:lstStyle/>
+            <a:p>
+              <a:pPr algn="ctr"/>
+              <a:endParaRPr lang="en-US" dirty="0"/>
+            </a:p>
+          </p:txBody>
+        </p:sp>
+      </p:grpSp>
+      <p:sp>
+        <p:nvSpPr>
+          <p:cNvPr id="75" name="TextBox 74">
+            <a:extLst>
+              <a:ext uri="{FF2B5EF4-FFF2-40B4-BE49-F238E27FC236}">
+                <a16:creationId xmlns:a16="http://schemas.microsoft.com/office/drawing/2014/main" id="{37C7159B-CB38-4E10-B86B-678D503D2FB9}"/>
+              </a:ext>
+            </a:extLst>
+          </p:cNvPr>
+          <p:cNvSpPr txBox="1"/>
+          <p:nvPr/>
+        </p:nvSpPr>
+        <p:spPr>
+          <a:xfrm>
+            <a:off x="9028712" y="2724941"/>
+            <a:ext cx="848615" cy="369332"/>
+          </a:xfrm>
+          <a:prstGeom prst="rect">
+            <a:avLst/>
+          </a:prstGeom>
+          <a:noFill/>
+        </p:spPr>
+        <p:txBody>
+          <a:bodyPr wrap="square" rtlCol="0">
+            <a:spAutoFit/>
+          </a:bodyPr>
+          <a:lstStyle/>
+          <a:p>
+            <a:r>
+              <a:rPr lang="en-US" dirty="0"/>
+              <a:t>V</a:t>
+            </a:r>
+            <a:r>
+              <a:rPr lang="en-US" sz="1050" dirty="0"/>
+              <a:t>sub-AST</a:t>
+            </a:r>
+            <a:endParaRPr lang="en-US" sz="1400" dirty="0"/>
+          </a:p>
+        </p:txBody>
+      </p:sp>
+      <p:grpSp>
+        <p:nvGrpSpPr>
+          <p:cNvPr id="76" name="Group 75">
+            <a:extLst>
+              <a:ext uri="{FF2B5EF4-FFF2-40B4-BE49-F238E27FC236}">
+                <a16:creationId xmlns:a16="http://schemas.microsoft.com/office/drawing/2014/main" id="{BF0F9C16-053D-407A-81DB-C7E42DD4F03B}"/>
+              </a:ext>
+            </a:extLst>
+          </p:cNvPr>
+          <p:cNvGrpSpPr/>
+          <p:nvPr/>
+        </p:nvGrpSpPr>
+        <p:grpSpPr>
+          <a:xfrm>
+            <a:off x="9068803" y="2594056"/>
+            <a:ext cx="590550" cy="180483"/>
+            <a:chOff x="10191750" y="3201290"/>
+            <a:chExt cx="590550" cy="180483"/>
+          </a:xfrm>
+        </p:grpSpPr>
+        <p:sp>
+          <p:nvSpPr>
+            <p:cNvPr id="77" name="Rectangle: Rounded Corners 76">
+              <a:extLst>
+                <a:ext uri="{FF2B5EF4-FFF2-40B4-BE49-F238E27FC236}">
+                  <a16:creationId xmlns:a16="http://schemas.microsoft.com/office/drawing/2014/main" id="{D11EB9D6-0FEB-4749-A1DC-7F62212C2515}"/>
+                </a:ext>
+              </a:extLst>
+            </p:cNvPr>
+            <p:cNvSpPr/>
+            <p:nvPr/>
+          </p:nvSpPr>
+          <p:spPr>
+            <a:xfrm>
+              <a:off x="10191750" y="3201290"/>
+              <a:ext cx="590550" cy="180483"/>
+            </a:xfrm>
+            <a:prstGeom prst="roundRect">
+              <a:avLst/>
+            </a:prstGeom>
+            <a:noFill/>
+            <a:ln>
+              <a:solidFill>
+                <a:schemeClr val="tx1"/>
+              </a:solidFill>
+            </a:ln>
+          </p:spPr>
+          <p:style>
+            <a:lnRef idx="2">
+              <a:schemeClr val="accent1">
+                <a:shade val="50000"/>
+              </a:schemeClr>
+            </a:lnRef>
+            <a:fillRef idx="1">
+              <a:schemeClr val="accent1"/>
+            </a:fillRef>
+            <a:effectRef idx="0">
+              <a:schemeClr val="accent1"/>
+            </a:effectRef>
+            <a:fontRef idx="minor">
+              <a:schemeClr val="lt1"/>
+            </a:fontRef>
+          </p:style>
+          <p:txBody>
+            <a:bodyPr rtlCol="0" anchor="ctr"/>
+            <a:lstStyle/>
+            <a:p>
+              <a:pPr algn="ctr"/>
+              <a:endParaRPr lang="en-US" dirty="0"/>
+            </a:p>
+          </p:txBody>
+        </p:sp>
+        <p:sp>
+          <p:nvSpPr>
+            <p:cNvPr id="78" name="Oval 77">
+              <a:extLst>
+                <a:ext uri="{FF2B5EF4-FFF2-40B4-BE49-F238E27FC236}">
+                  <a16:creationId xmlns:a16="http://schemas.microsoft.com/office/drawing/2014/main" id="{2BB9EB2F-1E3B-4CEE-AC0B-534043517559}"/>
+                </a:ext>
+              </a:extLst>
+            </p:cNvPr>
+            <p:cNvSpPr/>
+            <p:nvPr/>
+          </p:nvSpPr>
+          <p:spPr>
+            <a:xfrm>
+              <a:off x="10258345" y="3230725"/>
+              <a:ext cx="123905" cy="123905"/>
+            </a:xfrm>
+            <a:prstGeom prst="ellipse">
+              <a:avLst/>
+            </a:prstGeom>
+            <a:solidFill>
+              <a:schemeClr val="accent2">
+                <a:lumMod val="40000"/>
+                <a:lumOff val="60000"/>
+              </a:schemeClr>
+            </a:solidFill>
+            <a:ln>
+              <a:solidFill>
+                <a:schemeClr val="accent2">
+                  <a:lumMod val="60000"/>
+                  <a:lumOff val="40000"/>
+                </a:schemeClr>
+              </a:solidFill>
+            </a:ln>
+          </p:spPr>
+          <p:style>
+            <a:lnRef idx="2">
+              <a:schemeClr val="accent1">
+                <a:shade val="50000"/>
+              </a:schemeClr>
+            </a:lnRef>
+            <a:fillRef idx="1">
+              <a:schemeClr val="accent1"/>
+            </a:fillRef>
+            <a:effectRef idx="0">
+              <a:schemeClr val="accent1"/>
+            </a:effectRef>
+            <a:fontRef idx="minor">
+              <a:schemeClr val="lt1"/>
+            </a:fontRef>
+          </p:style>
+          <p:txBody>
+            <a:bodyPr rtlCol="0" anchor="ctr"/>
+            <a:lstStyle/>
+            <a:p>
+              <a:pPr algn="ctr"/>
+              <a:endParaRPr lang="en-US" dirty="0"/>
+            </a:p>
+          </p:txBody>
+        </p:sp>
+        <p:sp>
+          <p:nvSpPr>
+            <p:cNvPr id="79" name="Oval 78">
+              <a:extLst>
+                <a:ext uri="{FF2B5EF4-FFF2-40B4-BE49-F238E27FC236}">
+                  <a16:creationId xmlns:a16="http://schemas.microsoft.com/office/drawing/2014/main" id="{7C5AA231-047D-424F-8BC2-244263F0F501}"/>
+                </a:ext>
+              </a:extLst>
+            </p:cNvPr>
+            <p:cNvSpPr/>
+            <p:nvPr/>
+          </p:nvSpPr>
+          <p:spPr>
+            <a:xfrm>
+              <a:off x="10421903" y="3227520"/>
+              <a:ext cx="123905" cy="123905"/>
+            </a:xfrm>
+            <a:prstGeom prst="ellipse">
+              <a:avLst/>
+            </a:prstGeom>
+            <a:solidFill>
+              <a:schemeClr val="accent2">
+                <a:lumMod val="40000"/>
+                <a:lumOff val="60000"/>
+              </a:schemeClr>
+            </a:solidFill>
+            <a:ln>
+              <a:solidFill>
+                <a:schemeClr val="accent2">
+                  <a:lumMod val="60000"/>
+                  <a:lumOff val="40000"/>
+                </a:schemeClr>
+              </a:solidFill>
+            </a:ln>
+          </p:spPr>
+          <p:style>
+            <a:lnRef idx="2">
+              <a:schemeClr val="accent1">
+                <a:shade val="50000"/>
+              </a:schemeClr>
+            </a:lnRef>
+            <a:fillRef idx="1">
+              <a:schemeClr val="accent1"/>
+            </a:fillRef>
+            <a:effectRef idx="0">
+              <a:schemeClr val="accent1"/>
+            </a:effectRef>
+            <a:fontRef idx="minor">
+              <a:schemeClr val="lt1"/>
+            </a:fontRef>
+          </p:style>
+          <p:txBody>
+            <a:bodyPr rtlCol="0" anchor="ctr"/>
+            <a:lstStyle/>
+            <a:p>
+              <a:pPr algn="ctr"/>
+              <a:endParaRPr lang="en-US" dirty="0"/>
+            </a:p>
+          </p:txBody>
+        </p:sp>
+        <p:sp>
+          <p:nvSpPr>
+            <p:cNvPr id="80" name="Oval 79">
+              <a:extLst>
+                <a:ext uri="{FF2B5EF4-FFF2-40B4-BE49-F238E27FC236}">
+                  <a16:creationId xmlns:a16="http://schemas.microsoft.com/office/drawing/2014/main" id="{16424673-46DB-415F-8BE4-377F84DCAFBE}"/>
+                </a:ext>
+              </a:extLst>
+            </p:cNvPr>
+            <p:cNvSpPr/>
+            <p:nvPr/>
+          </p:nvSpPr>
+          <p:spPr>
+            <a:xfrm>
+              <a:off x="10585461" y="3227520"/>
+              <a:ext cx="123905" cy="123905"/>
+            </a:xfrm>
+            <a:prstGeom prst="ellipse">
+              <a:avLst/>
+            </a:prstGeom>
+            <a:solidFill>
+              <a:schemeClr val="accent2">
+                <a:lumMod val="40000"/>
+                <a:lumOff val="60000"/>
+              </a:schemeClr>
+            </a:solidFill>
+            <a:ln>
+              <a:solidFill>
+                <a:schemeClr val="accent2">
+                  <a:lumMod val="60000"/>
+                  <a:lumOff val="40000"/>
+                </a:schemeClr>
+              </a:solidFill>
+            </a:ln>
+          </p:spPr>
+          <p:style>
+            <a:lnRef idx="2">
+              <a:schemeClr val="accent1">
+                <a:shade val="50000"/>
+              </a:schemeClr>
+            </a:lnRef>
+            <a:fillRef idx="1">
+              <a:schemeClr val="accent1"/>
+            </a:fillRef>
+            <a:effectRef idx="0">
+              <a:schemeClr val="accent1"/>
+            </a:effectRef>
+            <a:fontRef idx="minor">
+              <a:schemeClr val="lt1"/>
+            </a:fontRef>
+          </p:style>
+          <p:txBody>
+            <a:bodyPr rtlCol="0" anchor="ctr"/>
+            <a:lstStyle/>
+            <a:p>
+              <a:pPr algn="ctr"/>
+              <a:endParaRPr lang="en-US" dirty="0"/>
+            </a:p>
+          </p:txBody>
+        </p:sp>
+      </p:grpSp>
+      <p:sp>
+        <p:nvSpPr>
+          <p:cNvPr id="89" name="TextBox 88">
+            <a:extLst>
+              <a:ext uri="{FF2B5EF4-FFF2-40B4-BE49-F238E27FC236}">
+                <a16:creationId xmlns:a16="http://schemas.microsoft.com/office/drawing/2014/main" id="{2A68D3F4-B1F3-4F8F-81E1-76B7E846014D}"/>
+              </a:ext>
+            </a:extLst>
+          </p:cNvPr>
+          <p:cNvSpPr txBox="1"/>
+          <p:nvPr/>
+        </p:nvSpPr>
+        <p:spPr>
+          <a:xfrm>
+            <a:off x="11371552" y="2744191"/>
+            <a:ext cx="744222" cy="369332"/>
+          </a:xfrm>
+          <a:prstGeom prst="rect">
+            <a:avLst/>
+          </a:prstGeom>
+          <a:noFill/>
+        </p:spPr>
+        <p:txBody>
+          <a:bodyPr wrap="square" rtlCol="0">
+            <a:spAutoFit/>
+          </a:bodyPr>
+          <a:lstStyle/>
+          <a:p>
+            <a:r>
+              <a:rPr lang="en-US" dirty="0"/>
+              <a:t>V</a:t>
+            </a:r>
+            <a:r>
+              <a:rPr lang="en-US" sz="1050" dirty="0"/>
+              <a:t>S1</a:t>
+            </a:r>
+            <a:endParaRPr lang="en-US" sz="1400" dirty="0"/>
+          </a:p>
+        </p:txBody>
+      </p:sp>
+      <p:grpSp>
+        <p:nvGrpSpPr>
+          <p:cNvPr id="90" name="Group 89">
+            <a:extLst>
+              <a:ext uri="{FF2B5EF4-FFF2-40B4-BE49-F238E27FC236}">
+                <a16:creationId xmlns:a16="http://schemas.microsoft.com/office/drawing/2014/main" id="{40511621-C7AC-443D-83B2-B4AD1E32C94C}"/>
+              </a:ext>
+            </a:extLst>
+          </p:cNvPr>
+          <p:cNvGrpSpPr/>
+          <p:nvPr/>
+        </p:nvGrpSpPr>
+        <p:grpSpPr>
+          <a:xfrm>
+            <a:off x="11288000" y="2594056"/>
+            <a:ext cx="590550" cy="180483"/>
+            <a:chOff x="10191750" y="3201290"/>
+            <a:chExt cx="590550" cy="180483"/>
+          </a:xfrm>
+        </p:grpSpPr>
+        <p:sp>
+          <p:nvSpPr>
+            <p:cNvPr id="91" name="Rectangle: Rounded Corners 90">
+              <a:extLst>
+                <a:ext uri="{FF2B5EF4-FFF2-40B4-BE49-F238E27FC236}">
+                  <a16:creationId xmlns:a16="http://schemas.microsoft.com/office/drawing/2014/main" id="{448D27F7-3425-460D-BF6E-7E33F2CFF468}"/>
+                </a:ext>
+              </a:extLst>
+            </p:cNvPr>
+            <p:cNvSpPr/>
+            <p:nvPr/>
+          </p:nvSpPr>
+          <p:spPr>
+            <a:xfrm>
+              <a:off x="10191750" y="3201290"/>
+              <a:ext cx="590550" cy="180483"/>
+            </a:xfrm>
+            <a:prstGeom prst="roundRect">
+              <a:avLst/>
+            </a:prstGeom>
+            <a:noFill/>
+            <a:ln>
+              <a:solidFill>
+                <a:schemeClr val="tx1"/>
+              </a:solidFill>
+            </a:ln>
+          </p:spPr>
+          <p:style>
+            <a:lnRef idx="2">
+              <a:schemeClr val="accent1">
+                <a:shade val="50000"/>
+              </a:schemeClr>
+            </a:lnRef>
+            <a:fillRef idx="1">
+              <a:schemeClr val="accent1"/>
+            </a:fillRef>
+            <a:effectRef idx="0">
+              <a:schemeClr val="accent1"/>
+            </a:effectRef>
+            <a:fontRef idx="minor">
+              <a:schemeClr val="lt1"/>
+            </a:fontRef>
+          </p:style>
+          <p:txBody>
+            <a:bodyPr rtlCol="0" anchor="ctr"/>
+            <a:lstStyle/>
+            <a:p>
+              <a:pPr algn="ctr"/>
+              <a:endParaRPr lang="en-US" dirty="0"/>
+            </a:p>
+          </p:txBody>
+        </p:sp>
+        <p:sp>
+          <p:nvSpPr>
+            <p:cNvPr id="92" name="Oval 91">
+              <a:extLst>
+                <a:ext uri="{FF2B5EF4-FFF2-40B4-BE49-F238E27FC236}">
+                  <a16:creationId xmlns:a16="http://schemas.microsoft.com/office/drawing/2014/main" id="{BCC2E568-F967-46F8-8D05-B67502E66FE3}"/>
+                </a:ext>
+              </a:extLst>
+            </p:cNvPr>
+            <p:cNvSpPr/>
+            <p:nvPr/>
+          </p:nvSpPr>
+          <p:spPr>
+            <a:xfrm>
+              <a:off x="10258345" y="3230725"/>
+              <a:ext cx="123905" cy="123905"/>
+            </a:xfrm>
+            <a:prstGeom prst="ellipse">
+              <a:avLst/>
+            </a:prstGeom>
+            <a:solidFill>
+              <a:schemeClr val="accent2">
+                <a:lumMod val="20000"/>
+                <a:lumOff val="80000"/>
+              </a:schemeClr>
+            </a:solidFill>
+            <a:ln>
+              <a:solidFill>
+                <a:srgbClr val="FF0000"/>
+              </a:solidFill>
+            </a:ln>
+          </p:spPr>
+          <p:style>
+            <a:lnRef idx="2">
+              <a:schemeClr val="accent1">
+                <a:shade val="50000"/>
+              </a:schemeClr>
+            </a:lnRef>
+            <a:fillRef idx="1">
+              <a:schemeClr val="accent1"/>
+            </a:fillRef>
+            <a:effectRef idx="0">
+              <a:schemeClr val="accent1"/>
+            </a:effectRef>
+            <a:fontRef idx="minor">
+              <a:schemeClr val="lt1"/>
+            </a:fontRef>
+          </p:style>
+          <p:txBody>
+            <a:bodyPr rtlCol="0" anchor="ctr"/>
+            <a:lstStyle/>
+            <a:p>
+              <a:pPr algn="ctr"/>
+              <a:endParaRPr lang="en-US" dirty="0"/>
+            </a:p>
+          </p:txBody>
+        </p:sp>
+        <p:sp>
+          <p:nvSpPr>
+            <p:cNvPr id="93" name="Oval 92">
+              <a:extLst>
+                <a:ext uri="{FF2B5EF4-FFF2-40B4-BE49-F238E27FC236}">
+                  <a16:creationId xmlns:a16="http://schemas.microsoft.com/office/drawing/2014/main" id="{F00DEC36-3325-4C95-801D-BD13BE6D6C51}"/>
+                </a:ext>
+              </a:extLst>
+            </p:cNvPr>
+            <p:cNvSpPr/>
+            <p:nvPr/>
+          </p:nvSpPr>
+          <p:spPr>
+            <a:xfrm>
+              <a:off x="10421903" y="3227520"/>
+              <a:ext cx="123905" cy="123905"/>
+            </a:xfrm>
+            <a:prstGeom prst="ellipse">
+              <a:avLst/>
+            </a:prstGeom>
+            <a:solidFill>
+              <a:schemeClr val="accent2">
+                <a:lumMod val="20000"/>
+                <a:lumOff val="80000"/>
+              </a:schemeClr>
+            </a:solidFill>
+            <a:ln>
+              <a:solidFill>
+                <a:srgbClr val="FF0000"/>
+              </a:solidFill>
+            </a:ln>
+          </p:spPr>
+          <p:style>
+            <a:lnRef idx="2">
+              <a:schemeClr val="accent1">
+                <a:shade val="50000"/>
+              </a:schemeClr>
+            </a:lnRef>
+            <a:fillRef idx="1">
+              <a:schemeClr val="accent1"/>
+            </a:fillRef>
+            <a:effectRef idx="0">
+              <a:schemeClr val="accent1"/>
+            </a:effectRef>
+            <a:fontRef idx="minor">
+              <a:schemeClr val="lt1"/>
+            </a:fontRef>
+          </p:style>
+          <p:txBody>
+            <a:bodyPr rtlCol="0" anchor="ctr"/>
+            <a:lstStyle/>
+            <a:p>
+              <a:pPr algn="ctr"/>
+              <a:endParaRPr lang="en-US" dirty="0"/>
+            </a:p>
+          </p:txBody>
+        </p:sp>
+        <p:sp>
+          <p:nvSpPr>
+            <p:cNvPr id="94" name="Oval 93">
+              <a:extLst>
+                <a:ext uri="{FF2B5EF4-FFF2-40B4-BE49-F238E27FC236}">
+                  <a16:creationId xmlns:a16="http://schemas.microsoft.com/office/drawing/2014/main" id="{5F5A2604-BED7-4B4C-9318-C7C53A6EAAFA}"/>
+                </a:ext>
+              </a:extLst>
+            </p:cNvPr>
+            <p:cNvSpPr/>
+            <p:nvPr/>
+          </p:nvSpPr>
+          <p:spPr>
+            <a:xfrm>
+              <a:off x="10585461" y="3227520"/>
+              <a:ext cx="123905" cy="123905"/>
+            </a:xfrm>
+            <a:prstGeom prst="ellipse">
+              <a:avLst/>
+            </a:prstGeom>
+            <a:solidFill>
+              <a:schemeClr val="accent2">
+                <a:lumMod val="20000"/>
+                <a:lumOff val="80000"/>
+              </a:schemeClr>
+            </a:solidFill>
+            <a:ln>
+              <a:solidFill>
+                <a:srgbClr val="FF0000"/>
+              </a:solidFill>
+            </a:ln>
+          </p:spPr>
+          <p:style>
+            <a:lnRef idx="2">
+              <a:schemeClr val="accent1">
+                <a:shade val="50000"/>
+              </a:schemeClr>
+            </a:lnRef>
+            <a:fillRef idx="1">
+              <a:schemeClr val="accent1"/>
+            </a:fillRef>
+            <a:effectRef idx="0">
+              <a:schemeClr val="accent1"/>
+            </a:effectRef>
+            <a:fontRef idx="minor">
+              <a:schemeClr val="lt1"/>
+            </a:fontRef>
+          </p:style>
+          <p:txBody>
+            <a:bodyPr rtlCol="0" anchor="ctr"/>
+            <a:lstStyle/>
+            <a:p>
+              <a:pPr algn="ctr"/>
+              <a:endParaRPr lang="en-US" dirty="0"/>
+            </a:p>
+          </p:txBody>
+        </p:sp>
+      </p:grpSp>
+      <p:sp>
+        <p:nvSpPr>
+          <p:cNvPr id="95" name="Left Brace 94">
+            <a:extLst>
+              <a:ext uri="{FF2B5EF4-FFF2-40B4-BE49-F238E27FC236}">
+                <a16:creationId xmlns:a16="http://schemas.microsoft.com/office/drawing/2014/main" id="{C834D831-738E-4293-8262-400D9CC54CC5}"/>
+              </a:ext>
+            </a:extLst>
+          </p:cNvPr>
+          <p:cNvSpPr/>
+          <p:nvPr/>
+        </p:nvSpPr>
+        <p:spPr>
+          <a:xfrm>
+            <a:off x="3040948" y="1261421"/>
+            <a:ext cx="169243" cy="2808437"/>
+          </a:xfrm>
+          <a:prstGeom prst="leftBrace">
+            <a:avLst/>
+          </a:prstGeom>
+          <a:ln w="12700">
+            <a:solidFill>
+              <a:schemeClr val="tx1"/>
+            </a:solidFill>
+          </a:ln>
+        </p:spPr>
+        <p:style>
+          <a:lnRef idx="1">
+            <a:schemeClr val="accent1"/>
+          </a:lnRef>
+          <a:fillRef idx="0">
+            <a:schemeClr val="accent1"/>
+          </a:fillRef>
+          <a:effectRef idx="0">
+            <a:schemeClr val="accent1"/>
+          </a:effectRef>
+          <a:fontRef idx="minor">
+            <a:schemeClr val="tx1"/>
+          </a:fontRef>
+        </p:style>
+        <p:txBody>
+          <a:bodyPr rtlCol="0" anchor="ctr"/>
+          <a:lstStyle/>
+          <a:p>
+            <a:pPr algn="ctr"/>
+            <a:endParaRPr lang="en-US" dirty="0"/>
+          </a:p>
+        </p:txBody>
+      </p:sp>
+      <p:sp>
+        <p:nvSpPr>
+          <p:cNvPr id="96" name="Oval 95">
+            <a:extLst>
+              <a:ext uri="{FF2B5EF4-FFF2-40B4-BE49-F238E27FC236}">
+                <a16:creationId xmlns:a16="http://schemas.microsoft.com/office/drawing/2014/main" id="{A02BA3C1-2213-4915-A024-49F9F6A1CFEE}"/>
+              </a:ext>
+            </a:extLst>
+          </p:cNvPr>
+          <p:cNvSpPr/>
+          <p:nvPr/>
+        </p:nvSpPr>
+        <p:spPr>
+          <a:xfrm>
+            <a:off x="2570797" y="2519921"/>
+            <a:ext cx="373743" cy="373743"/>
+          </a:xfrm>
+          <a:prstGeom prst="ellipse">
+            <a:avLst/>
+          </a:prstGeom>
+          <a:solidFill>
+            <a:schemeClr val="accent2">
+              <a:lumMod val="60000"/>
+              <a:lumOff val="40000"/>
+            </a:schemeClr>
+          </a:solidFill>
+          <a:ln w="31750">
+            <a:solidFill>
+              <a:srgbClr val="FF0000"/>
+            </a:solidFill>
+          </a:ln>
+        </p:spPr>
+        <p:style>
+          <a:lnRef idx="2">
+            <a:schemeClr val="accent1">
+              <a:shade val="50000"/>
+            </a:schemeClr>
+          </a:lnRef>
+          <a:fillRef idx="1">
+            <a:schemeClr val="accent1"/>
+          </a:fillRef>
+          <a:effectRef idx="0">
+            <a:schemeClr val="accent1"/>
+          </a:effectRef>
+          <a:fontRef idx="minor">
+            <a:schemeClr val="lt1"/>
+          </a:fontRef>
+        </p:style>
+        <p:txBody>
+          <a:bodyPr rtlCol="0" anchor="ctr"/>
+          <a:lstStyle/>
+          <a:p>
+            <a:pPr algn="ctr"/>
+            <a:endParaRPr lang="en-US" dirty="0"/>
+          </a:p>
+        </p:txBody>
+      </p:sp>
+      <p:sp>
+        <p:nvSpPr>
+          <p:cNvPr id="97" name="TextBox 96">
+            <a:extLst>
+              <a:ext uri="{FF2B5EF4-FFF2-40B4-BE49-F238E27FC236}">
+                <a16:creationId xmlns:a16="http://schemas.microsoft.com/office/drawing/2014/main" id="{60A2FCE0-B284-46CF-8313-C5EC2315365D}"/>
+              </a:ext>
+            </a:extLst>
+          </p:cNvPr>
+          <p:cNvSpPr txBox="1"/>
+          <p:nvPr/>
+        </p:nvSpPr>
+        <p:spPr>
+          <a:xfrm>
+            <a:off x="2542182" y="2867187"/>
+            <a:ext cx="744222" cy="369332"/>
+          </a:xfrm>
+          <a:prstGeom prst="rect">
+            <a:avLst/>
+          </a:prstGeom>
+          <a:noFill/>
+        </p:spPr>
+        <p:txBody>
+          <a:bodyPr wrap="square" rtlCol="0">
+            <a:spAutoFit/>
+          </a:bodyPr>
+          <a:lstStyle/>
+          <a:p>
+            <a:r>
+              <a:rPr lang="en-US" dirty="0"/>
+              <a:t>S5</a:t>
+            </a:r>
+          </a:p>
+        </p:txBody>
+      </p:sp>
+      <p:grpSp>
+        <p:nvGrpSpPr>
+          <p:cNvPr id="101" name="Group 100">
+            <a:extLst>
+              <a:ext uri="{FF2B5EF4-FFF2-40B4-BE49-F238E27FC236}">
+                <a16:creationId xmlns:a16="http://schemas.microsoft.com/office/drawing/2014/main" id="{732A50FB-52ED-43C7-9A54-CC407AC521CE}"/>
+              </a:ext>
+            </a:extLst>
+          </p:cNvPr>
+          <p:cNvGrpSpPr/>
+          <p:nvPr/>
+        </p:nvGrpSpPr>
+        <p:grpSpPr>
+          <a:xfrm>
+            <a:off x="4843045" y="1356586"/>
+            <a:ext cx="4930439" cy="2505645"/>
+            <a:chOff x="4845386" y="1369465"/>
+            <a:chExt cx="4930439" cy="2505645"/>
+          </a:xfrm>
+        </p:grpSpPr>
+        <p:sp>
+          <p:nvSpPr>
+            <p:cNvPr id="98" name="Arrow: Right 97">
+              <a:extLst>
+                <a:ext uri="{FF2B5EF4-FFF2-40B4-BE49-F238E27FC236}">
+                  <a16:creationId xmlns:a16="http://schemas.microsoft.com/office/drawing/2014/main" id="{3B2E175F-82E6-4D07-91E3-C1DC727C8A4A}"/>
+                </a:ext>
+              </a:extLst>
+            </p:cNvPr>
+            <p:cNvSpPr/>
+            <p:nvPr/>
+          </p:nvSpPr>
+          <p:spPr>
+            <a:xfrm>
+              <a:off x="4853290" y="1369465"/>
+              <a:ext cx="4922535" cy="180484"/>
+            </a:xfrm>
+            <a:prstGeom prst="rightArrow">
+              <a:avLst>
+                <a:gd name="adj1" fmla="val 50000"/>
+                <a:gd name="adj2" fmla="val 0"/>
+              </a:avLst>
+            </a:prstGeom>
+          </p:spPr>
+          <p:style>
+            <a:lnRef idx="2">
+              <a:schemeClr val="accent1">
+                <a:shade val="50000"/>
+              </a:schemeClr>
+            </a:lnRef>
+            <a:fillRef idx="1">
+              <a:schemeClr val="accent1"/>
+            </a:fillRef>
+            <a:effectRef idx="0">
+              <a:schemeClr val="accent1"/>
+            </a:effectRef>
+            <a:fontRef idx="minor">
+              <a:schemeClr val="lt1"/>
+            </a:fontRef>
+          </p:style>
+          <p:txBody>
+            <a:bodyPr rtlCol="0" anchor="ctr"/>
+            <a:lstStyle/>
+            <a:p>
+              <a:pPr algn="ctr"/>
+              <a:endParaRPr lang="en-US" dirty="0"/>
+            </a:p>
+          </p:txBody>
+        </p:sp>
+        <p:sp>
+          <p:nvSpPr>
+            <p:cNvPr id="99" name="Arrow: Right 98">
+              <a:extLst>
+                <a:ext uri="{FF2B5EF4-FFF2-40B4-BE49-F238E27FC236}">
+                  <a16:creationId xmlns:a16="http://schemas.microsoft.com/office/drawing/2014/main" id="{BEB6682C-A6D0-462A-89B9-CFCC0C9E50E1}"/>
+                </a:ext>
+              </a:extLst>
+            </p:cNvPr>
+            <p:cNvSpPr/>
+            <p:nvPr/>
+          </p:nvSpPr>
+          <p:spPr>
+            <a:xfrm>
+              <a:off x="4853290" y="2588312"/>
+              <a:ext cx="210197" cy="221662"/>
+            </a:xfrm>
+            <a:prstGeom prst="rightArrow">
+              <a:avLst/>
+            </a:prstGeom>
+          </p:spPr>
+          <p:style>
+            <a:lnRef idx="2">
+              <a:schemeClr val="accent1">
+                <a:shade val="50000"/>
+              </a:schemeClr>
+            </a:lnRef>
+            <a:fillRef idx="1">
+              <a:schemeClr val="accent1"/>
+            </a:fillRef>
+            <a:effectRef idx="0">
+              <a:schemeClr val="accent1"/>
+            </a:effectRef>
+            <a:fontRef idx="minor">
+              <a:schemeClr val="lt1"/>
+            </a:fontRef>
+          </p:style>
+          <p:txBody>
+            <a:bodyPr rtlCol="0" anchor="ctr"/>
+            <a:lstStyle/>
+            <a:p>
+              <a:pPr algn="ctr"/>
+              <a:endParaRPr lang="en-US" dirty="0"/>
+            </a:p>
+          </p:txBody>
+        </p:sp>
+        <p:sp>
+          <p:nvSpPr>
+            <p:cNvPr id="100" name="Arrow: Right 99">
+              <a:extLst>
+                <a:ext uri="{FF2B5EF4-FFF2-40B4-BE49-F238E27FC236}">
+                  <a16:creationId xmlns:a16="http://schemas.microsoft.com/office/drawing/2014/main" id="{DB552210-CAF0-4467-A574-9E11362CBB8E}"/>
+                </a:ext>
+              </a:extLst>
+            </p:cNvPr>
+            <p:cNvSpPr/>
+            <p:nvPr/>
+          </p:nvSpPr>
+          <p:spPr>
+            <a:xfrm>
+              <a:off x="4845386" y="3653448"/>
+              <a:ext cx="210197" cy="221662"/>
+            </a:xfrm>
+            <a:prstGeom prst="rightArrow">
+              <a:avLst/>
+            </a:prstGeom>
+          </p:spPr>
+          <p:style>
+            <a:lnRef idx="2">
+              <a:schemeClr val="accent1">
+                <a:shade val="50000"/>
+              </a:schemeClr>
+            </a:lnRef>
+            <a:fillRef idx="1">
+              <a:schemeClr val="accent1"/>
+            </a:fillRef>
+            <a:effectRef idx="0">
+              <a:schemeClr val="accent1"/>
+            </a:effectRef>
+            <a:fontRef idx="minor">
+              <a:schemeClr val="lt1"/>
+            </a:fontRef>
+          </p:style>
+          <p:txBody>
+            <a:bodyPr rtlCol="0" anchor="ctr"/>
+            <a:lstStyle/>
+            <a:p>
+              <a:pPr algn="ctr"/>
+              <a:endParaRPr lang="en-US" dirty="0"/>
+            </a:p>
+          </p:txBody>
+        </p:sp>
+      </p:grpSp>
+      <p:grpSp>
+        <p:nvGrpSpPr>
+          <p:cNvPr id="102" name="Group 101">
+            <a:extLst>
+              <a:ext uri="{FF2B5EF4-FFF2-40B4-BE49-F238E27FC236}">
+                <a16:creationId xmlns:a16="http://schemas.microsoft.com/office/drawing/2014/main" id="{65848CD8-EAD9-465F-9992-7DB4574C4FB6}"/>
+              </a:ext>
+            </a:extLst>
+          </p:cNvPr>
+          <p:cNvGrpSpPr/>
+          <p:nvPr/>
+        </p:nvGrpSpPr>
+        <p:grpSpPr>
+          <a:xfrm>
+            <a:off x="5292452" y="2568195"/>
+            <a:ext cx="218101" cy="1286798"/>
+            <a:chOff x="4845386" y="2588312"/>
+            <a:chExt cx="218101" cy="1286798"/>
+          </a:xfrm>
+        </p:grpSpPr>
+        <p:sp>
+          <p:nvSpPr>
+            <p:cNvPr id="104" name="Arrow: Right 103">
+              <a:extLst>
+                <a:ext uri="{FF2B5EF4-FFF2-40B4-BE49-F238E27FC236}">
+                  <a16:creationId xmlns:a16="http://schemas.microsoft.com/office/drawing/2014/main" id="{C9DA98F7-DE71-4CDB-802A-B3D13CFD6CB7}"/>
+                </a:ext>
+              </a:extLst>
+            </p:cNvPr>
+            <p:cNvSpPr/>
+            <p:nvPr/>
+          </p:nvSpPr>
+          <p:spPr>
+            <a:xfrm>
+              <a:off x="4853290" y="2588312"/>
+              <a:ext cx="210197" cy="221662"/>
+            </a:xfrm>
+            <a:prstGeom prst="rightArrow">
+              <a:avLst/>
+            </a:prstGeom>
+          </p:spPr>
+          <p:style>
+            <a:lnRef idx="2">
+              <a:schemeClr val="accent1">
+                <a:shade val="50000"/>
+              </a:schemeClr>
+            </a:lnRef>
+            <a:fillRef idx="1">
+              <a:schemeClr val="accent1"/>
+            </a:fillRef>
+            <a:effectRef idx="0">
+              <a:schemeClr val="accent1"/>
+            </a:effectRef>
+            <a:fontRef idx="minor">
+              <a:schemeClr val="lt1"/>
+            </a:fontRef>
+          </p:style>
+          <p:txBody>
+            <a:bodyPr rtlCol="0" anchor="ctr"/>
+            <a:lstStyle/>
+            <a:p>
+              <a:pPr algn="ctr"/>
+              <a:endParaRPr lang="en-US" dirty="0"/>
+            </a:p>
+          </p:txBody>
+        </p:sp>
+        <p:sp>
+          <p:nvSpPr>
+            <p:cNvPr id="105" name="Arrow: Right 104">
+              <a:extLst>
+                <a:ext uri="{FF2B5EF4-FFF2-40B4-BE49-F238E27FC236}">
+                  <a16:creationId xmlns:a16="http://schemas.microsoft.com/office/drawing/2014/main" id="{B07184F7-29F8-4913-9E76-B1E41FA69E82}"/>
+                </a:ext>
+              </a:extLst>
+            </p:cNvPr>
+            <p:cNvSpPr/>
+            <p:nvPr/>
+          </p:nvSpPr>
+          <p:spPr>
+            <a:xfrm>
+              <a:off x="4845386" y="3653448"/>
+              <a:ext cx="210197" cy="221662"/>
+            </a:xfrm>
+            <a:prstGeom prst="rightArrow">
+              <a:avLst/>
+            </a:prstGeom>
+          </p:spPr>
+          <p:style>
+            <a:lnRef idx="2">
+              <a:schemeClr val="accent1">
+                <a:shade val="50000"/>
+              </a:schemeClr>
+            </a:lnRef>
+            <a:fillRef idx="1">
+              <a:schemeClr val="accent1"/>
+            </a:fillRef>
+            <a:effectRef idx="0">
+              <a:schemeClr val="accent1"/>
+            </a:effectRef>
+            <a:fontRef idx="minor">
+              <a:schemeClr val="lt1"/>
+            </a:fontRef>
+          </p:style>
+          <p:txBody>
+            <a:bodyPr rtlCol="0" anchor="ctr"/>
+            <a:lstStyle/>
+            <a:p>
+              <a:pPr algn="ctr"/>
+              <a:endParaRPr lang="en-US" dirty="0"/>
+            </a:p>
+          </p:txBody>
+        </p:sp>
+      </p:grpSp>
+      <p:grpSp>
+        <p:nvGrpSpPr>
+          <p:cNvPr id="106" name="Group 105">
+            <a:extLst>
+              <a:ext uri="{FF2B5EF4-FFF2-40B4-BE49-F238E27FC236}">
+                <a16:creationId xmlns:a16="http://schemas.microsoft.com/office/drawing/2014/main" id="{A8C23C97-1F7D-48BB-A6FC-6A2403E84F19}"/>
+              </a:ext>
+            </a:extLst>
+          </p:cNvPr>
+          <p:cNvGrpSpPr/>
+          <p:nvPr/>
+        </p:nvGrpSpPr>
+        <p:grpSpPr>
+          <a:xfrm>
+            <a:off x="7506045" y="2575433"/>
+            <a:ext cx="218101" cy="1286798"/>
+            <a:chOff x="4845386" y="2588312"/>
+            <a:chExt cx="218101" cy="1286798"/>
+          </a:xfrm>
+        </p:grpSpPr>
+        <p:sp>
+          <p:nvSpPr>
+            <p:cNvPr id="108" name="Arrow: Right 107">
+              <a:extLst>
+                <a:ext uri="{FF2B5EF4-FFF2-40B4-BE49-F238E27FC236}">
+                  <a16:creationId xmlns:a16="http://schemas.microsoft.com/office/drawing/2014/main" id="{BC61EE30-0D6F-44EC-AC7D-9E516A3A8BEF}"/>
+                </a:ext>
+              </a:extLst>
+            </p:cNvPr>
+            <p:cNvSpPr/>
+            <p:nvPr/>
+          </p:nvSpPr>
+          <p:spPr>
+            <a:xfrm>
+              <a:off x="4853290" y="2588312"/>
+              <a:ext cx="210197" cy="221662"/>
+            </a:xfrm>
+            <a:prstGeom prst="rightArrow">
+              <a:avLst/>
+            </a:prstGeom>
+          </p:spPr>
+          <p:style>
+            <a:lnRef idx="2">
+              <a:schemeClr val="accent1">
+                <a:shade val="50000"/>
+              </a:schemeClr>
+            </a:lnRef>
+            <a:fillRef idx="1">
+              <a:schemeClr val="accent1"/>
+            </a:fillRef>
+            <a:effectRef idx="0">
+              <a:schemeClr val="accent1"/>
+            </a:effectRef>
+            <a:fontRef idx="minor">
+              <a:schemeClr val="lt1"/>
+            </a:fontRef>
+          </p:style>
+          <p:txBody>
+            <a:bodyPr rtlCol="0" anchor="ctr"/>
+            <a:lstStyle/>
+            <a:p>
+              <a:pPr algn="ctr"/>
+              <a:endParaRPr lang="en-US" dirty="0"/>
+            </a:p>
+          </p:txBody>
+        </p:sp>
+        <p:sp>
+          <p:nvSpPr>
+            <p:cNvPr id="109" name="Arrow: Right 108">
+              <a:extLst>
+                <a:ext uri="{FF2B5EF4-FFF2-40B4-BE49-F238E27FC236}">
+                  <a16:creationId xmlns:a16="http://schemas.microsoft.com/office/drawing/2014/main" id="{825A5122-6A1C-47B4-B8E7-4D0C5329B628}"/>
+                </a:ext>
+              </a:extLst>
+            </p:cNvPr>
+            <p:cNvSpPr/>
+            <p:nvPr/>
+          </p:nvSpPr>
+          <p:spPr>
+            <a:xfrm>
+              <a:off x="4845386" y="3653448"/>
+              <a:ext cx="210197" cy="221662"/>
+            </a:xfrm>
+            <a:prstGeom prst="rightArrow">
+              <a:avLst/>
+            </a:prstGeom>
+          </p:spPr>
+          <p:style>
+            <a:lnRef idx="2">
+              <a:schemeClr val="accent1">
+                <a:shade val="50000"/>
+              </a:schemeClr>
+            </a:lnRef>
+            <a:fillRef idx="1">
+              <a:schemeClr val="accent1"/>
+            </a:fillRef>
+            <a:effectRef idx="0">
+              <a:schemeClr val="accent1"/>
+            </a:effectRef>
+            <a:fontRef idx="minor">
+              <a:schemeClr val="lt1"/>
+            </a:fontRef>
+          </p:style>
+          <p:txBody>
+            <a:bodyPr rtlCol="0" anchor="ctr"/>
+            <a:lstStyle/>
+            <a:p>
+              <a:pPr algn="ctr"/>
+              <a:endParaRPr lang="en-US" dirty="0"/>
+            </a:p>
+          </p:txBody>
+        </p:sp>
+      </p:grpSp>
+      <p:grpSp>
+        <p:nvGrpSpPr>
+          <p:cNvPr id="110" name="Group 109">
+            <a:extLst>
+              <a:ext uri="{FF2B5EF4-FFF2-40B4-BE49-F238E27FC236}">
+                <a16:creationId xmlns:a16="http://schemas.microsoft.com/office/drawing/2014/main" id="{EE2FC49A-3C1A-4201-84C4-116AF3F98778}"/>
+              </a:ext>
+            </a:extLst>
+          </p:cNvPr>
+          <p:cNvGrpSpPr/>
+          <p:nvPr/>
+        </p:nvGrpSpPr>
+        <p:grpSpPr>
+          <a:xfrm>
+            <a:off x="8837765" y="2575433"/>
+            <a:ext cx="218101" cy="1286798"/>
+            <a:chOff x="4845386" y="2588312"/>
+            <a:chExt cx="218101" cy="1286798"/>
+          </a:xfrm>
+        </p:grpSpPr>
+        <p:sp>
+          <p:nvSpPr>
+            <p:cNvPr id="112" name="Arrow: Right 111">
+              <a:extLst>
+                <a:ext uri="{FF2B5EF4-FFF2-40B4-BE49-F238E27FC236}">
+                  <a16:creationId xmlns:a16="http://schemas.microsoft.com/office/drawing/2014/main" id="{06AFEB14-1FDB-42F1-B8CA-0774BD5B2323}"/>
+                </a:ext>
+              </a:extLst>
+            </p:cNvPr>
+            <p:cNvSpPr/>
+            <p:nvPr/>
+          </p:nvSpPr>
+          <p:spPr>
+            <a:xfrm>
+              <a:off x="4853290" y="2588312"/>
+              <a:ext cx="210197" cy="221662"/>
+            </a:xfrm>
+            <a:prstGeom prst="rightArrow">
+              <a:avLst/>
+            </a:prstGeom>
+          </p:spPr>
+          <p:style>
+            <a:lnRef idx="2">
+              <a:schemeClr val="accent1">
+                <a:shade val="50000"/>
+              </a:schemeClr>
+            </a:lnRef>
+            <a:fillRef idx="1">
+              <a:schemeClr val="accent1"/>
+            </a:fillRef>
+            <a:effectRef idx="0">
+              <a:schemeClr val="accent1"/>
+            </a:effectRef>
+            <a:fontRef idx="minor">
+              <a:schemeClr val="lt1"/>
+            </a:fontRef>
+          </p:style>
+          <p:txBody>
+            <a:bodyPr rtlCol="0" anchor="ctr"/>
+            <a:lstStyle/>
+            <a:p>
+              <a:pPr algn="ctr"/>
+              <a:endParaRPr lang="en-US" dirty="0"/>
+            </a:p>
+          </p:txBody>
+        </p:sp>
+        <p:sp>
+          <p:nvSpPr>
+            <p:cNvPr id="113" name="Arrow: Right 112">
+              <a:extLst>
+                <a:ext uri="{FF2B5EF4-FFF2-40B4-BE49-F238E27FC236}">
+                  <a16:creationId xmlns:a16="http://schemas.microsoft.com/office/drawing/2014/main" id="{F1634A77-699E-4855-891E-18ABCC30539B}"/>
+                </a:ext>
+              </a:extLst>
+            </p:cNvPr>
+            <p:cNvSpPr/>
+            <p:nvPr/>
+          </p:nvSpPr>
+          <p:spPr>
+            <a:xfrm>
+              <a:off x="4845386" y="3653448"/>
+              <a:ext cx="210197" cy="221662"/>
+            </a:xfrm>
+            <a:prstGeom prst="rightArrow">
+              <a:avLst/>
+            </a:prstGeom>
+          </p:spPr>
+          <p:style>
+            <a:lnRef idx="2">
+              <a:schemeClr val="accent1">
+                <a:shade val="50000"/>
+              </a:schemeClr>
+            </a:lnRef>
+            <a:fillRef idx="1">
+              <a:schemeClr val="accent1"/>
+            </a:fillRef>
+            <a:effectRef idx="0">
+              <a:schemeClr val="accent1"/>
+            </a:effectRef>
+            <a:fontRef idx="minor">
+              <a:schemeClr val="lt1"/>
+            </a:fontRef>
+          </p:style>
+          <p:txBody>
+            <a:bodyPr rtlCol="0" anchor="ctr"/>
+            <a:lstStyle/>
+            <a:p>
+              <a:pPr algn="ctr"/>
+              <a:endParaRPr lang="en-US" dirty="0"/>
+            </a:p>
+          </p:txBody>
+        </p:sp>
+      </p:grpSp>
+      <p:grpSp>
+        <p:nvGrpSpPr>
+          <p:cNvPr id="114" name="Group 113">
+            <a:extLst>
+              <a:ext uri="{FF2B5EF4-FFF2-40B4-BE49-F238E27FC236}">
+                <a16:creationId xmlns:a16="http://schemas.microsoft.com/office/drawing/2014/main" id="{03574EA4-70CA-407C-920B-C0E4A9D3D02A}"/>
+              </a:ext>
+            </a:extLst>
+          </p:cNvPr>
+          <p:cNvGrpSpPr/>
+          <p:nvPr/>
+        </p:nvGrpSpPr>
+        <p:grpSpPr>
+          <a:xfrm>
+            <a:off x="9675796" y="1391913"/>
+            <a:ext cx="1598844" cy="2360035"/>
+            <a:chOff x="4856465" y="1404030"/>
+            <a:chExt cx="1598844" cy="2360035"/>
+          </a:xfrm>
+        </p:grpSpPr>
+        <p:sp>
+          <p:nvSpPr>
+            <p:cNvPr id="115" name="Arrow: Right 114">
+              <a:extLst>
+                <a:ext uri="{FF2B5EF4-FFF2-40B4-BE49-F238E27FC236}">
+                  <a16:creationId xmlns:a16="http://schemas.microsoft.com/office/drawing/2014/main" id="{766829F2-97DB-4AF6-B014-0D2968A08781}"/>
+                </a:ext>
+              </a:extLst>
+            </p:cNvPr>
+            <p:cNvSpPr/>
+            <p:nvPr/>
+          </p:nvSpPr>
+          <p:spPr>
+            <a:xfrm rot="4860053">
+              <a:off x="4499122" y="1802144"/>
+              <a:ext cx="983700" cy="187472"/>
+            </a:xfrm>
+            <a:prstGeom prst="rightArrow">
+              <a:avLst/>
+            </a:prstGeom>
+          </p:spPr>
+          <p:style>
+            <a:lnRef idx="2">
+              <a:schemeClr val="accent1">
+                <a:shade val="50000"/>
+              </a:schemeClr>
+            </a:lnRef>
+            <a:fillRef idx="1">
+              <a:schemeClr val="accent1"/>
+            </a:fillRef>
+            <a:effectRef idx="0">
+              <a:schemeClr val="accent1"/>
+            </a:effectRef>
+            <a:fontRef idx="minor">
+              <a:schemeClr val="lt1"/>
+            </a:fontRef>
+          </p:style>
+          <p:txBody>
+            <a:bodyPr rtlCol="0" anchor="ctr"/>
+            <a:lstStyle/>
+            <a:p>
+              <a:pPr algn="ctr"/>
+              <a:endParaRPr lang="en-US" dirty="0"/>
+            </a:p>
+          </p:txBody>
+        </p:sp>
+        <p:sp>
+          <p:nvSpPr>
+            <p:cNvPr id="116" name="Arrow: Right 115">
+              <a:extLst>
+                <a:ext uri="{FF2B5EF4-FFF2-40B4-BE49-F238E27FC236}">
+                  <a16:creationId xmlns:a16="http://schemas.microsoft.com/office/drawing/2014/main" id="{2F387664-0630-408F-8EA3-D0ECEF069958}"/>
+                </a:ext>
+              </a:extLst>
+            </p:cNvPr>
+            <p:cNvSpPr/>
+            <p:nvPr/>
+          </p:nvSpPr>
+          <p:spPr>
+            <a:xfrm>
+              <a:off x="4856465" y="2588312"/>
+              <a:ext cx="210197" cy="221662"/>
+            </a:xfrm>
+            <a:prstGeom prst="rightArrow">
+              <a:avLst/>
+            </a:prstGeom>
+          </p:spPr>
+          <p:style>
+            <a:lnRef idx="2">
+              <a:schemeClr val="accent1">
+                <a:shade val="50000"/>
+              </a:schemeClr>
+            </a:lnRef>
+            <a:fillRef idx="1">
+              <a:schemeClr val="accent1"/>
+            </a:fillRef>
+            <a:effectRef idx="0">
+              <a:schemeClr val="accent1"/>
+            </a:effectRef>
+            <a:fontRef idx="minor">
+              <a:schemeClr val="lt1"/>
+            </a:fontRef>
+          </p:style>
+          <p:txBody>
+            <a:bodyPr rtlCol="0" anchor="ctr"/>
+            <a:lstStyle/>
+            <a:p>
+              <a:pPr algn="ctr"/>
+              <a:endParaRPr lang="en-US" dirty="0"/>
+            </a:p>
+          </p:txBody>
+        </p:sp>
+        <p:sp>
+          <p:nvSpPr>
+            <p:cNvPr id="118" name="Arrow: Right 117">
+              <a:extLst>
+                <a:ext uri="{FF2B5EF4-FFF2-40B4-BE49-F238E27FC236}">
+                  <a16:creationId xmlns:a16="http://schemas.microsoft.com/office/drawing/2014/main" id="{70DE8E41-2211-4E93-8DB5-2CD1EFFB6728}"/>
+                </a:ext>
+              </a:extLst>
+            </p:cNvPr>
+            <p:cNvSpPr/>
+            <p:nvPr/>
+          </p:nvSpPr>
+          <p:spPr>
+            <a:xfrm rot="16776489">
+              <a:off x="4595559" y="3313634"/>
+              <a:ext cx="768479" cy="132384"/>
+            </a:xfrm>
+            <a:prstGeom prst="rightArrow">
+              <a:avLst/>
+            </a:prstGeom>
+          </p:spPr>
+          <p:style>
+            <a:lnRef idx="2">
+              <a:schemeClr val="accent1">
+                <a:shade val="50000"/>
+              </a:schemeClr>
+            </a:lnRef>
+            <a:fillRef idx="1">
+              <a:schemeClr val="accent1"/>
+            </a:fillRef>
+            <a:effectRef idx="0">
+              <a:schemeClr val="accent1"/>
+            </a:effectRef>
+            <a:fontRef idx="minor">
+              <a:schemeClr val="lt1"/>
+            </a:fontRef>
+          </p:style>
+          <p:txBody>
+            <a:bodyPr rtlCol="0" anchor="ctr"/>
+            <a:lstStyle/>
+            <a:p>
+              <a:pPr algn="ctr"/>
+              <a:endParaRPr lang="en-US" dirty="0"/>
+            </a:p>
+          </p:txBody>
+        </p:sp>
+        <p:sp>
+          <p:nvSpPr>
+            <p:cNvPr id="119" name="Arrow: Right 118">
+              <a:extLst>
+                <a:ext uri="{FF2B5EF4-FFF2-40B4-BE49-F238E27FC236}">
+                  <a16:creationId xmlns:a16="http://schemas.microsoft.com/office/drawing/2014/main" id="{6214AFE8-CD4A-4CDC-85CC-6B7F17160CA6}"/>
+                </a:ext>
+              </a:extLst>
+            </p:cNvPr>
+            <p:cNvSpPr/>
+            <p:nvPr/>
+          </p:nvSpPr>
+          <p:spPr>
+            <a:xfrm>
+              <a:off x="6245112" y="2600429"/>
+              <a:ext cx="210197" cy="221662"/>
+            </a:xfrm>
+            <a:prstGeom prst="rightArrow">
+              <a:avLst/>
+            </a:prstGeom>
+          </p:spPr>
+          <p:style>
+            <a:lnRef idx="2">
+              <a:schemeClr val="accent1">
+                <a:shade val="50000"/>
+              </a:schemeClr>
+            </a:lnRef>
+            <a:fillRef idx="1">
+              <a:schemeClr val="accent1"/>
+            </a:fillRef>
+            <a:effectRef idx="0">
+              <a:schemeClr val="accent1"/>
+            </a:effectRef>
+            <a:fontRef idx="minor">
+              <a:schemeClr val="lt1"/>
+            </a:fontRef>
+          </p:style>
+          <p:txBody>
+            <a:bodyPr rtlCol="0" anchor="ctr"/>
+            <a:lstStyle/>
+            <a:p>
+              <a:pPr algn="ctr"/>
+              <a:endParaRPr lang="en-US" dirty="0"/>
+            </a:p>
+          </p:txBody>
+        </p:sp>
+      </p:grpSp>
+      <p:grpSp>
+        <p:nvGrpSpPr>
+          <p:cNvPr id="117" name="Group 116">
+            <a:extLst>
+              <a:ext uri="{FF2B5EF4-FFF2-40B4-BE49-F238E27FC236}">
+                <a16:creationId xmlns:a16="http://schemas.microsoft.com/office/drawing/2014/main" id="{50AC4347-D3D3-44B2-8511-2224C1D2167B}"/>
+              </a:ext>
+            </a:extLst>
+          </p:cNvPr>
+          <p:cNvGrpSpPr/>
+          <p:nvPr/>
+        </p:nvGrpSpPr>
+        <p:grpSpPr>
+          <a:xfrm>
+            <a:off x="3457306" y="2384221"/>
+            <a:ext cx="1058877" cy="787831"/>
+            <a:chOff x="7478948" y="2478168"/>
+            <a:chExt cx="1058877" cy="1166903"/>
+          </a:xfrm>
+        </p:grpSpPr>
+        <p:sp>
+          <p:nvSpPr>
+            <p:cNvPr id="120" name="Oval 119">
+              <a:extLst>
+                <a:ext uri="{FF2B5EF4-FFF2-40B4-BE49-F238E27FC236}">
+                  <a16:creationId xmlns:a16="http://schemas.microsoft.com/office/drawing/2014/main" id="{02910987-63ED-4E1E-B7C8-471816686224}"/>
+                </a:ext>
+              </a:extLst>
+            </p:cNvPr>
+            <p:cNvSpPr/>
+            <p:nvPr/>
+          </p:nvSpPr>
+          <p:spPr>
+            <a:xfrm>
+              <a:off x="8016610" y="2478168"/>
+              <a:ext cx="200993" cy="200993"/>
+            </a:xfrm>
+            <a:prstGeom prst="ellipse">
+              <a:avLst/>
+            </a:prstGeom>
+            <a:solidFill>
+              <a:schemeClr val="accent6">
+                <a:lumMod val="60000"/>
+                <a:lumOff val="40000"/>
+              </a:schemeClr>
+            </a:solidFill>
+            <a:ln>
+              <a:solidFill>
+                <a:schemeClr val="accent6">
+                  <a:lumMod val="75000"/>
+                </a:schemeClr>
+              </a:solidFill>
+            </a:ln>
+          </p:spPr>
+          <p:style>
+            <a:lnRef idx="2">
+              <a:schemeClr val="accent1">
+                <a:shade val="50000"/>
+              </a:schemeClr>
+            </a:lnRef>
+            <a:fillRef idx="1">
+              <a:schemeClr val="accent1"/>
+            </a:fillRef>
+            <a:effectRef idx="0">
+              <a:schemeClr val="accent1"/>
+            </a:effectRef>
+            <a:fontRef idx="minor">
+              <a:schemeClr val="lt1"/>
+            </a:fontRef>
+          </p:style>
+          <p:txBody>
+            <a:bodyPr rtlCol="0" anchor="ctr"/>
+            <a:lstStyle/>
+            <a:p>
+              <a:pPr algn="ctr"/>
+              <a:endParaRPr lang="en-US" dirty="0"/>
+            </a:p>
+          </p:txBody>
+        </p:sp>
+        <p:sp>
+          <p:nvSpPr>
+            <p:cNvPr id="121" name="Oval 120">
+              <a:extLst>
+                <a:ext uri="{FF2B5EF4-FFF2-40B4-BE49-F238E27FC236}">
+                  <a16:creationId xmlns:a16="http://schemas.microsoft.com/office/drawing/2014/main" id="{860961CC-D4A5-449C-8925-6465367E38D0}"/>
+                </a:ext>
+              </a:extLst>
+            </p:cNvPr>
+            <p:cNvSpPr/>
+            <p:nvPr/>
+          </p:nvSpPr>
+          <p:spPr>
+            <a:xfrm>
+              <a:off x="7735790" y="3011937"/>
+              <a:ext cx="200993" cy="200993"/>
+            </a:xfrm>
+            <a:prstGeom prst="ellipse">
+              <a:avLst/>
+            </a:prstGeom>
+            <a:solidFill>
+              <a:schemeClr val="accent6">
+                <a:lumMod val="60000"/>
+                <a:lumOff val="40000"/>
+              </a:schemeClr>
+            </a:solidFill>
+            <a:ln>
+              <a:solidFill>
+                <a:schemeClr val="accent6">
+                  <a:lumMod val="75000"/>
+                </a:schemeClr>
+              </a:solidFill>
+            </a:ln>
+          </p:spPr>
+          <p:style>
+            <a:lnRef idx="2">
+              <a:schemeClr val="accent1">
+                <a:shade val="50000"/>
+              </a:schemeClr>
+            </a:lnRef>
+            <a:fillRef idx="1">
+              <a:schemeClr val="accent1"/>
+            </a:fillRef>
+            <a:effectRef idx="0">
+              <a:schemeClr val="accent1"/>
+            </a:effectRef>
+            <a:fontRef idx="minor">
+              <a:schemeClr val="lt1"/>
+            </a:fontRef>
+          </p:style>
+          <p:txBody>
+            <a:bodyPr rtlCol="0" anchor="ctr"/>
+            <a:lstStyle/>
+            <a:p>
+              <a:pPr algn="ctr"/>
+              <a:endParaRPr lang="en-US" dirty="0"/>
+            </a:p>
+          </p:txBody>
+        </p:sp>
+        <p:sp>
+          <p:nvSpPr>
+            <p:cNvPr id="122" name="Oval 121">
+              <a:extLst>
+                <a:ext uri="{FF2B5EF4-FFF2-40B4-BE49-F238E27FC236}">
+                  <a16:creationId xmlns:a16="http://schemas.microsoft.com/office/drawing/2014/main" id="{D4324D14-1354-43EA-855A-7CC46352451C}"/>
+                </a:ext>
+              </a:extLst>
+            </p:cNvPr>
+            <p:cNvSpPr/>
+            <p:nvPr/>
+          </p:nvSpPr>
+          <p:spPr>
+            <a:xfrm>
+              <a:off x="7478948" y="3444078"/>
+              <a:ext cx="200993" cy="200993"/>
+            </a:xfrm>
+            <a:prstGeom prst="ellipse">
+              <a:avLst/>
+            </a:prstGeom>
+            <a:solidFill>
+              <a:schemeClr val="accent6">
+                <a:lumMod val="60000"/>
+                <a:lumOff val="40000"/>
+              </a:schemeClr>
+            </a:solidFill>
+            <a:ln>
+              <a:solidFill>
+                <a:schemeClr val="accent6">
+                  <a:lumMod val="75000"/>
+                </a:schemeClr>
+              </a:solidFill>
+            </a:ln>
+          </p:spPr>
+          <p:style>
+            <a:lnRef idx="2">
+              <a:schemeClr val="accent1">
+                <a:shade val="50000"/>
+              </a:schemeClr>
+            </a:lnRef>
+            <a:fillRef idx="1">
+              <a:schemeClr val="accent1"/>
+            </a:fillRef>
+            <a:effectRef idx="0">
+              <a:schemeClr val="accent1"/>
+            </a:effectRef>
+            <a:fontRef idx="minor">
+              <a:schemeClr val="lt1"/>
+            </a:fontRef>
+          </p:style>
+          <p:txBody>
+            <a:bodyPr rtlCol="0" anchor="ctr"/>
+            <a:lstStyle/>
+            <a:p>
+              <a:pPr algn="ctr"/>
+              <a:endParaRPr lang="en-US" dirty="0"/>
+            </a:p>
+          </p:txBody>
+        </p:sp>
+        <p:sp>
+          <p:nvSpPr>
+            <p:cNvPr id="123" name="Oval 122">
+              <a:extLst>
+                <a:ext uri="{FF2B5EF4-FFF2-40B4-BE49-F238E27FC236}">
+                  <a16:creationId xmlns:a16="http://schemas.microsoft.com/office/drawing/2014/main" id="{0263B05C-3EF3-489C-8772-BD13773E375A}"/>
+                </a:ext>
+              </a:extLst>
+            </p:cNvPr>
+            <p:cNvSpPr/>
+            <p:nvPr/>
+          </p:nvSpPr>
+          <p:spPr>
+            <a:xfrm>
+              <a:off x="8054340" y="3429000"/>
+              <a:ext cx="200993" cy="200993"/>
+            </a:xfrm>
+            <a:prstGeom prst="ellipse">
+              <a:avLst/>
+            </a:prstGeom>
+            <a:solidFill>
+              <a:schemeClr val="accent6">
+                <a:lumMod val="60000"/>
+                <a:lumOff val="40000"/>
+              </a:schemeClr>
+            </a:solidFill>
+            <a:ln>
+              <a:solidFill>
+                <a:schemeClr val="accent6">
+                  <a:lumMod val="75000"/>
+                </a:schemeClr>
+              </a:solidFill>
+            </a:ln>
+          </p:spPr>
+          <p:style>
+            <a:lnRef idx="2">
+              <a:schemeClr val="accent1">
+                <a:shade val="50000"/>
+              </a:schemeClr>
+            </a:lnRef>
+            <a:fillRef idx="1">
+              <a:schemeClr val="accent1"/>
+            </a:fillRef>
+            <a:effectRef idx="0">
+              <a:schemeClr val="accent1"/>
+            </a:effectRef>
+            <a:fontRef idx="minor">
+              <a:schemeClr val="lt1"/>
+            </a:fontRef>
+          </p:style>
+          <p:txBody>
+            <a:bodyPr rtlCol="0" anchor="ctr"/>
+            <a:lstStyle/>
+            <a:p>
+              <a:pPr algn="ctr"/>
+              <a:endParaRPr lang="en-US" dirty="0"/>
+            </a:p>
+          </p:txBody>
+        </p:sp>
+        <p:cxnSp>
+          <p:nvCxnSpPr>
+            <p:cNvPr id="124" name="Straight Arrow Connector 123">
+              <a:extLst>
+                <a:ext uri="{FF2B5EF4-FFF2-40B4-BE49-F238E27FC236}">
+                  <a16:creationId xmlns:a16="http://schemas.microsoft.com/office/drawing/2014/main" id="{BA019E94-7E53-47AD-A59F-7BA2CB8CABE9}"/>
+                </a:ext>
+              </a:extLst>
+            </p:cNvPr>
+            <p:cNvCxnSpPr>
+              <a:cxnSpLocks/>
+              <a:stCxn id="120" idx="3"/>
+              <a:endCxn id="121" idx="0"/>
+            </p:cNvCxnSpPr>
+            <p:nvPr/>
+          </p:nvCxnSpPr>
+          <p:spPr>
+            <a:xfrm flipH="1">
+              <a:off x="7836287" y="2649726"/>
+              <a:ext cx="209758" cy="362211"/>
+            </a:xfrm>
+            <a:prstGeom prst="straightConnector1">
+              <a:avLst/>
+            </a:prstGeom>
+            <a:ln w="19050">
+              <a:tailEnd type="triangle"/>
+            </a:ln>
+          </p:spPr>
+          <p:style>
+            <a:lnRef idx="1">
+              <a:schemeClr val="accent1"/>
+            </a:lnRef>
+            <a:fillRef idx="0">
+              <a:schemeClr val="accent1"/>
+            </a:fillRef>
+            <a:effectRef idx="0">
+              <a:schemeClr val="accent1"/>
+            </a:effectRef>
+            <a:fontRef idx="minor">
+              <a:schemeClr val="tx1"/>
+            </a:fontRef>
+          </p:style>
+        </p:cxnSp>
+        <p:cxnSp>
+          <p:nvCxnSpPr>
+            <p:cNvPr id="125" name="Straight Arrow Connector 124">
+              <a:extLst>
+                <a:ext uri="{FF2B5EF4-FFF2-40B4-BE49-F238E27FC236}">
+                  <a16:creationId xmlns:a16="http://schemas.microsoft.com/office/drawing/2014/main" id="{123F44ED-89E4-4AC2-B9F6-720214CDE3F1}"/>
+                </a:ext>
+              </a:extLst>
+            </p:cNvPr>
+            <p:cNvCxnSpPr>
+              <a:cxnSpLocks/>
+              <a:stCxn id="121" idx="3"/>
+              <a:endCxn id="122" idx="7"/>
+            </p:cNvCxnSpPr>
+            <p:nvPr/>
+          </p:nvCxnSpPr>
+          <p:spPr>
+            <a:xfrm flipH="1">
+              <a:off x="7650506" y="3183495"/>
+              <a:ext cx="114719" cy="290018"/>
+            </a:xfrm>
+            <a:prstGeom prst="straightConnector1">
+              <a:avLst/>
+            </a:prstGeom>
+            <a:ln w="19050">
+              <a:tailEnd type="triangle"/>
+            </a:ln>
+          </p:spPr>
+          <p:style>
+            <a:lnRef idx="1">
+              <a:schemeClr val="accent1"/>
+            </a:lnRef>
+            <a:fillRef idx="0">
+              <a:schemeClr val="accent1"/>
+            </a:fillRef>
+            <a:effectRef idx="0">
+              <a:schemeClr val="accent1"/>
+            </a:effectRef>
+            <a:fontRef idx="minor">
+              <a:schemeClr val="tx1"/>
+            </a:fontRef>
+          </p:style>
+        </p:cxnSp>
+        <p:cxnSp>
+          <p:nvCxnSpPr>
+            <p:cNvPr id="126" name="Straight Arrow Connector 125">
+              <a:extLst>
+                <a:ext uri="{FF2B5EF4-FFF2-40B4-BE49-F238E27FC236}">
+                  <a16:creationId xmlns:a16="http://schemas.microsoft.com/office/drawing/2014/main" id="{93852753-F936-4324-8614-1739B9C550C1}"/>
+                </a:ext>
+              </a:extLst>
+            </p:cNvPr>
+            <p:cNvCxnSpPr>
+              <a:cxnSpLocks/>
+              <a:stCxn id="121" idx="5"/>
+              <a:endCxn id="123" idx="1"/>
+            </p:cNvCxnSpPr>
+            <p:nvPr/>
+          </p:nvCxnSpPr>
+          <p:spPr>
+            <a:xfrm>
+              <a:off x="7907348" y="3183495"/>
+              <a:ext cx="176427" cy="274940"/>
+            </a:xfrm>
+            <a:prstGeom prst="straightConnector1">
+              <a:avLst/>
+            </a:prstGeom>
+            <a:ln w="19050">
+              <a:tailEnd type="triangle"/>
+            </a:ln>
+          </p:spPr>
+          <p:style>
+            <a:lnRef idx="1">
+              <a:schemeClr val="accent1"/>
+            </a:lnRef>
+            <a:fillRef idx="0">
+              <a:schemeClr val="accent1"/>
+            </a:fillRef>
+            <a:effectRef idx="0">
+              <a:schemeClr val="accent1"/>
+            </a:effectRef>
+            <a:fontRef idx="minor">
+              <a:schemeClr val="tx1"/>
+            </a:fontRef>
+          </p:style>
+        </p:cxnSp>
+        <p:sp>
+          <p:nvSpPr>
+            <p:cNvPr id="127" name="Oval 126">
+              <a:extLst>
+                <a:ext uri="{FF2B5EF4-FFF2-40B4-BE49-F238E27FC236}">
+                  <a16:creationId xmlns:a16="http://schemas.microsoft.com/office/drawing/2014/main" id="{87518151-4353-4D8A-968D-993A87C546FF}"/>
+                </a:ext>
+              </a:extLst>
+            </p:cNvPr>
+            <p:cNvSpPr/>
+            <p:nvPr/>
+          </p:nvSpPr>
+          <p:spPr>
+            <a:xfrm>
+              <a:off x="8336832" y="3000566"/>
+              <a:ext cx="200993" cy="200993"/>
+            </a:xfrm>
+            <a:prstGeom prst="ellipse">
+              <a:avLst/>
+            </a:prstGeom>
+            <a:solidFill>
+              <a:schemeClr val="accent6">
+                <a:lumMod val="60000"/>
+                <a:lumOff val="40000"/>
+              </a:schemeClr>
+            </a:solidFill>
+            <a:ln>
+              <a:solidFill>
+                <a:schemeClr val="accent6">
+                  <a:lumMod val="75000"/>
+                </a:schemeClr>
+              </a:solidFill>
+            </a:ln>
+          </p:spPr>
+          <p:style>
+            <a:lnRef idx="2">
+              <a:schemeClr val="accent1">
+                <a:shade val="50000"/>
+              </a:schemeClr>
+            </a:lnRef>
+            <a:fillRef idx="1">
+              <a:schemeClr val="accent1"/>
+            </a:fillRef>
+            <a:effectRef idx="0">
+              <a:schemeClr val="accent1"/>
+            </a:effectRef>
+            <a:fontRef idx="minor">
+              <a:schemeClr val="lt1"/>
+            </a:fontRef>
+          </p:style>
+          <p:txBody>
+            <a:bodyPr rtlCol="0" anchor="ctr"/>
+            <a:lstStyle/>
+            <a:p>
+              <a:pPr algn="ctr"/>
+              <a:endParaRPr lang="en-US" dirty="0"/>
+            </a:p>
+          </p:txBody>
+        </p:sp>
+        <p:cxnSp>
+          <p:nvCxnSpPr>
+            <p:cNvPr id="128" name="Straight Arrow Connector 127">
+              <a:extLst>
+                <a:ext uri="{FF2B5EF4-FFF2-40B4-BE49-F238E27FC236}">
+                  <a16:creationId xmlns:a16="http://schemas.microsoft.com/office/drawing/2014/main" id="{44984258-6B71-455F-8101-4CD6CB93E3AC}"/>
+                </a:ext>
+              </a:extLst>
+            </p:cNvPr>
+            <p:cNvCxnSpPr>
+              <a:cxnSpLocks/>
+              <a:stCxn id="120" idx="5"/>
+              <a:endCxn id="127" idx="1"/>
+            </p:cNvCxnSpPr>
+            <p:nvPr/>
+          </p:nvCxnSpPr>
+          <p:spPr>
+            <a:xfrm>
+              <a:off x="8188168" y="2649726"/>
+              <a:ext cx="178099" cy="380275"/>
+            </a:xfrm>
+            <a:prstGeom prst="straightConnector1">
+              <a:avLst/>
+            </a:prstGeom>
+            <a:ln w="19050">
+              <a:tailEnd type="triangle"/>
+            </a:ln>
+          </p:spPr>
+          <p:style>
+            <a:lnRef idx="1">
+              <a:schemeClr val="accent1"/>
+            </a:lnRef>
+            <a:fillRef idx="0">
+              <a:schemeClr val="accent1"/>
+            </a:fillRef>
+            <a:effectRef idx="0">
+              <a:schemeClr val="accent1"/>
+            </a:effectRef>
+            <a:fontRef idx="minor">
+              <a:schemeClr val="tx1"/>
+            </a:fontRef>
+          </p:style>
+        </p:cxnSp>
+      </p:grpSp>
+      <p:sp>
+        <p:nvSpPr>
+          <p:cNvPr id="129" name="TextBox 128">
+            <a:extLst>
+              <a:ext uri="{FF2B5EF4-FFF2-40B4-BE49-F238E27FC236}">
+                <a16:creationId xmlns:a16="http://schemas.microsoft.com/office/drawing/2014/main" id="{8023EBE8-EAFF-4D49-BF19-3F9CD74FEB90}"/>
+              </a:ext>
+            </a:extLst>
+          </p:cNvPr>
+          <p:cNvSpPr txBox="1"/>
+          <p:nvPr/>
+        </p:nvSpPr>
+        <p:spPr>
+          <a:xfrm>
+            <a:off x="3002972" y="1116123"/>
+            <a:ext cx="2005835" cy="923330"/>
+          </a:xfrm>
+          <a:prstGeom prst="rect">
+            <a:avLst/>
+          </a:prstGeom>
+          <a:noFill/>
+        </p:spPr>
+        <p:txBody>
+          <a:bodyPr wrap="square" rtlCol="0">
+            <a:spAutoFit/>
+          </a:bodyPr>
+          <a:lstStyle/>
+          <a:p>
+            <a:pPr algn="ctr"/>
+            <a:r>
+              <a:rPr lang="en-US" dirty="0"/>
+              <a:t>   C=&lt;1, 1, 0, …, 0&gt;</a:t>
+            </a:r>
+          </a:p>
+          <a:p>
+            <a:pPr algn="ctr"/>
+            <a:r>
+              <a:rPr lang="en-US" dirty="0"/>
+              <a:t>   R=&lt;0, 1, 0, …, 1&gt;</a:t>
+            </a:r>
+          </a:p>
+          <a:p>
+            <a:pPr algn="ctr"/>
+            <a:r>
+              <a:rPr lang="en-US" dirty="0"/>
+              <a:t>V</a:t>
+            </a:r>
+            <a:r>
+              <a:rPr lang="en-US" sz="1200" dirty="0"/>
+              <a:t>coverage</a:t>
+            </a:r>
+            <a:r>
+              <a:rPr lang="en-US" dirty="0"/>
+              <a:t>=&lt;C, R&gt;</a:t>
+            </a:r>
+          </a:p>
+        </p:txBody>
+      </p:sp>
+      <p:grpSp>
+        <p:nvGrpSpPr>
+          <p:cNvPr id="130" name="Group 129">
+            <a:extLst>
+              <a:ext uri="{FF2B5EF4-FFF2-40B4-BE49-F238E27FC236}">
+                <a16:creationId xmlns:a16="http://schemas.microsoft.com/office/drawing/2014/main" id="{522FC1BE-EE8A-4869-8492-EB4603AA3F41}"/>
+              </a:ext>
+            </a:extLst>
+          </p:cNvPr>
+          <p:cNvGrpSpPr/>
+          <p:nvPr/>
+        </p:nvGrpSpPr>
+        <p:grpSpPr>
+          <a:xfrm>
+            <a:off x="3164809" y="3541434"/>
+            <a:ext cx="1650239" cy="523220"/>
+            <a:chOff x="6805424" y="4351147"/>
+            <a:chExt cx="1781658" cy="523220"/>
+          </a:xfrm>
+        </p:grpSpPr>
+        <p:sp>
+          <p:nvSpPr>
+            <p:cNvPr id="131" name="TextBox 130">
+              <a:extLst>
+                <a:ext uri="{FF2B5EF4-FFF2-40B4-BE49-F238E27FC236}">
+                  <a16:creationId xmlns:a16="http://schemas.microsoft.com/office/drawing/2014/main" id="{2E739B2D-7B3E-4F4D-8B48-D37DC3F8AAB6}"/>
+                </a:ext>
+              </a:extLst>
+            </p:cNvPr>
+            <p:cNvSpPr txBox="1"/>
+            <p:nvPr/>
+          </p:nvSpPr>
+          <p:spPr>
+            <a:xfrm>
+              <a:off x="6805424" y="4351147"/>
+              <a:ext cx="1781658" cy="523220"/>
+            </a:xfrm>
+            <a:prstGeom prst="rect">
+              <a:avLst/>
+            </a:prstGeom>
+            <a:noFill/>
+          </p:spPr>
+          <p:txBody>
+            <a:bodyPr wrap="square" rtlCol="0">
+              <a:spAutoFit/>
+            </a:bodyPr>
+            <a:lstStyle/>
+            <a:p>
+              <a:pPr algn="ctr"/>
+              <a:r>
+                <a:rPr lang="en-US" sz="1400" dirty="0"/>
+                <a:t>tree BSPTree  Euclidean2D </a:t>
+              </a:r>
+            </a:p>
+          </p:txBody>
+        </p:sp>
+        <p:sp>
+          <p:nvSpPr>
+            <p:cNvPr id="132" name="Rectangle 131">
+              <a:extLst>
+                <a:ext uri="{FF2B5EF4-FFF2-40B4-BE49-F238E27FC236}">
+                  <a16:creationId xmlns:a16="http://schemas.microsoft.com/office/drawing/2014/main" id="{63449A25-935F-4747-A2F1-5BE22151FDB1}"/>
+                </a:ext>
+              </a:extLst>
+            </p:cNvPr>
+            <p:cNvSpPr/>
+            <p:nvPr/>
+          </p:nvSpPr>
+          <p:spPr>
+            <a:xfrm>
+              <a:off x="6923518" y="4365593"/>
+              <a:ext cx="1604339" cy="481529"/>
+            </a:xfrm>
+            <a:prstGeom prst="rect">
+              <a:avLst/>
+            </a:prstGeom>
+            <a:noFill/>
+            <a:ln>
+              <a:solidFill>
+                <a:schemeClr val="tx1"/>
+              </a:solidFill>
+              <a:prstDash val="dash"/>
+            </a:ln>
+          </p:spPr>
+          <p:style>
+            <a:lnRef idx="2">
+              <a:schemeClr val="accent1">
+                <a:shade val="50000"/>
+              </a:schemeClr>
+            </a:lnRef>
+            <a:fillRef idx="1">
+              <a:schemeClr val="accent1"/>
+            </a:fillRef>
+            <a:effectRef idx="0">
+              <a:schemeClr val="accent1"/>
+            </a:effectRef>
+            <a:fontRef idx="minor">
+              <a:schemeClr val="lt1"/>
+            </a:fontRef>
+          </p:style>
+          <p:txBody>
+            <a:bodyPr rtlCol="0" anchor="ctr"/>
+            <a:lstStyle/>
+            <a:p>
+              <a:pPr algn="ctr"/>
+              <a:endParaRPr lang="en-US" dirty="0"/>
+            </a:p>
+          </p:txBody>
+        </p:sp>
+      </p:grpSp>
+      <p:sp>
+        <p:nvSpPr>
+          <p:cNvPr id="81" name="Rectangle: Rounded Corners 80">
+            <a:extLst>
+              <a:ext uri="{FF2B5EF4-FFF2-40B4-BE49-F238E27FC236}">
+                <a16:creationId xmlns:a16="http://schemas.microsoft.com/office/drawing/2014/main" id="{D0EB3768-FA0C-476E-B2C3-DFF5E1EDAA44}"/>
+              </a:ext>
+            </a:extLst>
+          </p:cNvPr>
+          <p:cNvSpPr/>
+          <p:nvPr/>
+        </p:nvSpPr>
+        <p:spPr>
+          <a:xfrm>
+            <a:off x="5065088" y="2284078"/>
+            <a:ext cx="240732" cy="738664"/>
+          </a:xfrm>
+          <a:prstGeom prst="roundRect">
+            <a:avLst/>
+          </a:prstGeom>
+          <a:solidFill>
+            <a:schemeClr val="accent2">
+              <a:lumMod val="60000"/>
+              <a:lumOff val="40000"/>
+            </a:schemeClr>
+          </a:solidFill>
+          <a:ln>
+            <a:solidFill>
+              <a:schemeClr val="accent2">
+                <a:lumMod val="75000"/>
+              </a:schemeClr>
+            </a:solidFill>
+          </a:ln>
+        </p:spPr>
+        <p:style>
+          <a:lnRef idx="2">
+            <a:schemeClr val="accent1">
+              <a:shade val="50000"/>
+            </a:schemeClr>
+          </a:lnRef>
+          <a:fillRef idx="1">
+            <a:schemeClr val="accent1"/>
+          </a:fillRef>
+          <a:effectRef idx="0">
+            <a:schemeClr val="accent1"/>
+          </a:effectRef>
+          <a:fontRef idx="minor">
+            <a:schemeClr val="lt1"/>
+          </a:fontRef>
+        </p:style>
+        <p:txBody>
+          <a:bodyPr rtlCol="0" anchor="ctr"/>
+          <a:lstStyle/>
+          <a:p>
+            <a:pPr algn="ctr"/>
+            <a:endParaRPr lang="en-US" dirty="0"/>
+          </a:p>
+        </p:txBody>
+      </p:sp>
+      <p:sp>
+        <p:nvSpPr>
+          <p:cNvPr id="82" name="Rectangle: Rounded Corners 81">
+            <a:extLst>
+              <a:ext uri="{FF2B5EF4-FFF2-40B4-BE49-F238E27FC236}">
+                <a16:creationId xmlns:a16="http://schemas.microsoft.com/office/drawing/2014/main" id="{E873B225-B823-4EE7-ADD3-C36A6DE5BF03}"/>
+              </a:ext>
+            </a:extLst>
+          </p:cNvPr>
+          <p:cNvSpPr/>
+          <p:nvPr/>
+        </p:nvSpPr>
+        <p:spPr>
+          <a:xfrm>
+            <a:off x="5065088" y="3326849"/>
+            <a:ext cx="240732" cy="738664"/>
+          </a:xfrm>
+          <a:prstGeom prst="roundRect">
+            <a:avLst/>
+          </a:prstGeom>
+          <a:solidFill>
+            <a:schemeClr val="accent2">
+              <a:lumMod val="60000"/>
+              <a:lumOff val="40000"/>
+            </a:schemeClr>
+          </a:solidFill>
+          <a:ln>
+            <a:solidFill>
+              <a:schemeClr val="accent2">
+                <a:lumMod val="75000"/>
+              </a:schemeClr>
+            </a:solidFill>
+          </a:ln>
+        </p:spPr>
+        <p:style>
+          <a:lnRef idx="2">
+            <a:schemeClr val="accent1">
+              <a:shade val="50000"/>
+            </a:schemeClr>
+          </a:lnRef>
+          <a:fillRef idx="1">
+            <a:schemeClr val="accent1"/>
+          </a:fillRef>
+          <a:effectRef idx="0">
+            <a:schemeClr val="accent1"/>
+          </a:effectRef>
+          <a:fontRef idx="minor">
+            <a:schemeClr val="lt1"/>
+          </a:fontRef>
+        </p:style>
+        <p:txBody>
+          <a:bodyPr rtlCol="0" anchor="ctr"/>
+          <a:lstStyle/>
+          <a:p>
+            <a:pPr algn="ctr"/>
+            <a:endParaRPr lang="en-US" dirty="0"/>
+          </a:p>
+        </p:txBody>
+      </p:sp>
+      <p:grpSp>
+        <p:nvGrpSpPr>
+          <p:cNvPr id="5" name="Group 4">
+            <a:extLst>
+              <a:ext uri="{FF2B5EF4-FFF2-40B4-BE49-F238E27FC236}">
+                <a16:creationId xmlns:a16="http://schemas.microsoft.com/office/drawing/2014/main" id="{399C681E-CEA4-4905-9BDF-077710D4E068}"/>
+              </a:ext>
+            </a:extLst>
+          </p:cNvPr>
+          <p:cNvGrpSpPr/>
+          <p:nvPr/>
+        </p:nvGrpSpPr>
+        <p:grpSpPr>
+          <a:xfrm>
+            <a:off x="5450793" y="2214816"/>
+            <a:ext cx="1058877" cy="982630"/>
+            <a:chOff x="5531478" y="2136226"/>
+            <a:chExt cx="1058877" cy="982630"/>
+          </a:xfrm>
+        </p:grpSpPr>
+        <p:grpSp>
+          <p:nvGrpSpPr>
+            <p:cNvPr id="83" name="Group 82">
+              <a:extLst>
+                <a:ext uri="{FF2B5EF4-FFF2-40B4-BE49-F238E27FC236}">
+                  <a16:creationId xmlns:a16="http://schemas.microsoft.com/office/drawing/2014/main" id="{F8043FEC-B630-4E91-BBD0-A44E24505E68}"/>
+                </a:ext>
+              </a:extLst>
+            </p:cNvPr>
+            <p:cNvGrpSpPr/>
+            <p:nvPr/>
+          </p:nvGrpSpPr>
+          <p:grpSpPr>
+            <a:xfrm>
+              <a:off x="5531478" y="2331025"/>
+              <a:ext cx="1058877" cy="787831"/>
+              <a:chOff x="7478948" y="2478168"/>
+              <a:chExt cx="1058877" cy="1166903"/>
+            </a:xfrm>
+          </p:grpSpPr>
+          <p:sp>
+            <p:nvSpPr>
+              <p:cNvPr id="84" name="Oval 83">
+                <a:extLst>
+                  <a:ext uri="{FF2B5EF4-FFF2-40B4-BE49-F238E27FC236}">
+                    <a16:creationId xmlns:a16="http://schemas.microsoft.com/office/drawing/2014/main" id="{B501B9E0-271B-4D8B-838E-27FB9D5DEE87}"/>
+                  </a:ext>
+                </a:extLst>
+              </p:cNvPr>
+              <p:cNvSpPr/>
+              <p:nvPr/>
+            </p:nvSpPr>
+            <p:spPr>
+              <a:xfrm>
+                <a:off x="8016610" y="2478168"/>
+                <a:ext cx="200993" cy="200993"/>
+              </a:xfrm>
+              <a:prstGeom prst="ellipse">
+                <a:avLst/>
+              </a:prstGeom>
+              <a:solidFill>
+                <a:schemeClr val="accent6">
+                  <a:lumMod val="60000"/>
+                  <a:lumOff val="40000"/>
+                </a:schemeClr>
+              </a:solidFill>
+              <a:ln>
+                <a:solidFill>
+                  <a:schemeClr val="accent6">
+                    <a:lumMod val="75000"/>
+                  </a:schemeClr>
+                </a:solidFill>
+              </a:ln>
+            </p:spPr>
+            <p:style>
+              <a:lnRef idx="2">
+                <a:schemeClr val="accent1">
+                  <a:shade val="50000"/>
+                </a:schemeClr>
+              </a:lnRef>
+              <a:fillRef idx="1">
+                <a:schemeClr val="accent1"/>
+              </a:fillRef>
+              <a:effectRef idx="0">
+                <a:schemeClr val="accent1"/>
+              </a:effectRef>
+              <a:fontRef idx="minor">
+                <a:schemeClr val="lt1"/>
+              </a:fontRef>
+            </p:style>
+            <p:txBody>
+              <a:bodyPr rtlCol="0" anchor="ctr"/>
+              <a:lstStyle/>
+              <a:p>
+                <a:pPr algn="ctr"/>
+                <a:endParaRPr lang="en-US" dirty="0"/>
+              </a:p>
+            </p:txBody>
+          </p:sp>
+          <p:sp>
+            <p:nvSpPr>
+              <p:cNvPr id="85" name="Oval 84">
+                <a:extLst>
+                  <a:ext uri="{FF2B5EF4-FFF2-40B4-BE49-F238E27FC236}">
+                    <a16:creationId xmlns:a16="http://schemas.microsoft.com/office/drawing/2014/main" id="{490CF80C-E60B-410E-94C6-18AE832CA284}"/>
+                  </a:ext>
+                </a:extLst>
+              </p:cNvPr>
+              <p:cNvSpPr/>
+              <p:nvPr/>
+            </p:nvSpPr>
+            <p:spPr>
+              <a:xfrm>
+                <a:off x="7735790" y="3011937"/>
+                <a:ext cx="200993" cy="200993"/>
+              </a:xfrm>
+              <a:prstGeom prst="ellipse">
+                <a:avLst/>
+              </a:prstGeom>
+              <a:solidFill>
+                <a:schemeClr val="accent6">
+                  <a:lumMod val="60000"/>
+                  <a:lumOff val="40000"/>
+                </a:schemeClr>
+              </a:solidFill>
+              <a:ln>
+                <a:solidFill>
+                  <a:schemeClr val="accent6">
+                    <a:lumMod val="75000"/>
+                  </a:schemeClr>
+                </a:solidFill>
+              </a:ln>
+            </p:spPr>
+            <p:style>
+              <a:lnRef idx="2">
+                <a:schemeClr val="accent1">
+                  <a:shade val="50000"/>
+                </a:schemeClr>
+              </a:lnRef>
+              <a:fillRef idx="1">
+                <a:schemeClr val="accent1"/>
+              </a:fillRef>
+              <a:effectRef idx="0">
+                <a:schemeClr val="accent1"/>
+              </a:effectRef>
+              <a:fontRef idx="minor">
+                <a:schemeClr val="lt1"/>
+              </a:fontRef>
+            </p:style>
+            <p:txBody>
+              <a:bodyPr rtlCol="0" anchor="ctr"/>
+              <a:lstStyle/>
+              <a:p>
+                <a:pPr algn="ctr"/>
+                <a:endParaRPr lang="en-US" dirty="0"/>
+              </a:p>
+            </p:txBody>
+          </p:sp>
+          <p:sp>
+            <p:nvSpPr>
+              <p:cNvPr id="86" name="Oval 85">
+                <a:extLst>
+                  <a:ext uri="{FF2B5EF4-FFF2-40B4-BE49-F238E27FC236}">
+                    <a16:creationId xmlns:a16="http://schemas.microsoft.com/office/drawing/2014/main" id="{635A5B00-2459-45AE-AEDD-895C595FBA41}"/>
+                  </a:ext>
+                </a:extLst>
+              </p:cNvPr>
+              <p:cNvSpPr/>
+              <p:nvPr/>
+            </p:nvSpPr>
+            <p:spPr>
+              <a:xfrm>
+                <a:off x="7478948" y="3444078"/>
+                <a:ext cx="200993" cy="200993"/>
+              </a:xfrm>
+              <a:prstGeom prst="ellipse">
+                <a:avLst/>
+              </a:prstGeom>
+              <a:solidFill>
+                <a:schemeClr val="accent6">
+                  <a:lumMod val="60000"/>
+                  <a:lumOff val="40000"/>
+                </a:schemeClr>
+              </a:solidFill>
+              <a:ln>
+                <a:solidFill>
+                  <a:schemeClr val="accent6">
+                    <a:lumMod val="75000"/>
+                  </a:schemeClr>
+                </a:solidFill>
+              </a:ln>
+            </p:spPr>
+            <p:style>
+              <a:lnRef idx="2">
+                <a:schemeClr val="accent1">
+                  <a:shade val="50000"/>
+                </a:schemeClr>
+              </a:lnRef>
+              <a:fillRef idx="1">
+                <a:schemeClr val="accent1"/>
+              </a:fillRef>
+              <a:effectRef idx="0">
+                <a:schemeClr val="accent1"/>
+              </a:effectRef>
+              <a:fontRef idx="minor">
+                <a:schemeClr val="lt1"/>
+              </a:fontRef>
+            </p:style>
+            <p:txBody>
+              <a:bodyPr rtlCol="0" anchor="ctr"/>
+              <a:lstStyle/>
+              <a:p>
+                <a:pPr algn="ctr"/>
+                <a:endParaRPr lang="en-US" dirty="0"/>
+              </a:p>
+            </p:txBody>
+          </p:sp>
+          <p:sp>
+            <p:nvSpPr>
+              <p:cNvPr id="87" name="Oval 86">
+                <a:extLst>
+                  <a:ext uri="{FF2B5EF4-FFF2-40B4-BE49-F238E27FC236}">
+                    <a16:creationId xmlns:a16="http://schemas.microsoft.com/office/drawing/2014/main" id="{2E5DBD8C-2AC5-442E-AF2C-C74839113929}"/>
+                  </a:ext>
+                </a:extLst>
+              </p:cNvPr>
+              <p:cNvSpPr/>
+              <p:nvPr/>
+            </p:nvSpPr>
+            <p:spPr>
+              <a:xfrm>
+                <a:off x="8054340" y="3429000"/>
+                <a:ext cx="200993" cy="200993"/>
+              </a:xfrm>
+              <a:prstGeom prst="ellipse">
+                <a:avLst/>
+              </a:prstGeom>
+              <a:solidFill>
+                <a:schemeClr val="accent6">
+                  <a:lumMod val="60000"/>
+                  <a:lumOff val="40000"/>
+                </a:schemeClr>
+              </a:solidFill>
+              <a:ln>
+                <a:solidFill>
+                  <a:schemeClr val="accent6">
+                    <a:lumMod val="75000"/>
+                  </a:schemeClr>
+                </a:solidFill>
+              </a:ln>
+            </p:spPr>
+            <p:style>
+              <a:lnRef idx="2">
+                <a:schemeClr val="accent1">
+                  <a:shade val="50000"/>
+                </a:schemeClr>
+              </a:lnRef>
+              <a:fillRef idx="1">
+                <a:schemeClr val="accent1"/>
+              </a:fillRef>
+              <a:effectRef idx="0">
+                <a:schemeClr val="accent1"/>
+              </a:effectRef>
+              <a:fontRef idx="minor">
+                <a:schemeClr val="lt1"/>
+              </a:fontRef>
+            </p:style>
+            <p:txBody>
+              <a:bodyPr rtlCol="0" anchor="ctr"/>
+              <a:lstStyle/>
+              <a:p>
+                <a:pPr algn="ctr"/>
+                <a:endParaRPr lang="en-US" dirty="0"/>
+              </a:p>
+            </p:txBody>
+          </p:sp>
+          <p:cxnSp>
+            <p:nvCxnSpPr>
+              <p:cNvPr id="103" name="Straight Arrow Connector 102">
+                <a:extLst>
+                  <a:ext uri="{FF2B5EF4-FFF2-40B4-BE49-F238E27FC236}">
+                    <a16:creationId xmlns:a16="http://schemas.microsoft.com/office/drawing/2014/main" id="{B6654A25-7A15-4A3F-821B-9F8DA42BF6DA}"/>
+                  </a:ext>
+                </a:extLst>
+              </p:cNvPr>
+              <p:cNvCxnSpPr>
+                <a:cxnSpLocks/>
+                <a:stCxn id="84" idx="3"/>
+                <a:endCxn id="85" idx="0"/>
+              </p:cNvCxnSpPr>
+              <p:nvPr/>
+            </p:nvCxnSpPr>
+            <p:spPr>
+              <a:xfrm flipH="1">
+                <a:off x="7836287" y="2649726"/>
+                <a:ext cx="209758" cy="362211"/>
+              </a:xfrm>
+              <a:prstGeom prst="straightConnector1">
+                <a:avLst/>
+              </a:prstGeom>
+              <a:ln w="19050">
+                <a:tailEnd type="triangle"/>
+              </a:ln>
+            </p:spPr>
+            <p:style>
+              <a:lnRef idx="1">
+                <a:schemeClr val="accent1"/>
+              </a:lnRef>
+              <a:fillRef idx="0">
+                <a:schemeClr val="accent1"/>
+              </a:fillRef>
+              <a:effectRef idx="0">
+                <a:schemeClr val="accent1"/>
+              </a:effectRef>
+              <a:fontRef idx="minor">
+                <a:schemeClr val="tx1"/>
+              </a:fontRef>
+            </p:style>
+          </p:cxnSp>
+          <p:cxnSp>
+            <p:nvCxnSpPr>
+              <p:cNvPr id="107" name="Straight Arrow Connector 106">
+                <a:extLst>
+                  <a:ext uri="{FF2B5EF4-FFF2-40B4-BE49-F238E27FC236}">
+                    <a16:creationId xmlns:a16="http://schemas.microsoft.com/office/drawing/2014/main" id="{6374AE87-037A-4ECE-8903-7731CC6FA4BA}"/>
+                  </a:ext>
+                </a:extLst>
+              </p:cNvPr>
+              <p:cNvCxnSpPr>
+                <a:cxnSpLocks/>
+                <a:stCxn id="85" idx="3"/>
+                <a:endCxn id="86" idx="7"/>
+              </p:cNvCxnSpPr>
+              <p:nvPr/>
+            </p:nvCxnSpPr>
+            <p:spPr>
+              <a:xfrm flipH="1">
+                <a:off x="7650506" y="3183495"/>
+                <a:ext cx="114719" cy="290018"/>
+              </a:xfrm>
+              <a:prstGeom prst="straightConnector1">
+                <a:avLst/>
+              </a:prstGeom>
+              <a:ln w="19050">
+                <a:tailEnd type="triangle"/>
+              </a:ln>
+            </p:spPr>
+            <p:style>
+              <a:lnRef idx="1">
+                <a:schemeClr val="accent1"/>
+              </a:lnRef>
+              <a:fillRef idx="0">
+                <a:schemeClr val="accent1"/>
+              </a:fillRef>
+              <a:effectRef idx="0">
+                <a:schemeClr val="accent1"/>
+              </a:effectRef>
+              <a:fontRef idx="minor">
+                <a:schemeClr val="tx1"/>
+              </a:fontRef>
+            </p:style>
+          </p:cxnSp>
+          <p:cxnSp>
+            <p:nvCxnSpPr>
+              <p:cNvPr id="111" name="Straight Arrow Connector 110">
+                <a:extLst>
+                  <a:ext uri="{FF2B5EF4-FFF2-40B4-BE49-F238E27FC236}">
+                    <a16:creationId xmlns:a16="http://schemas.microsoft.com/office/drawing/2014/main" id="{6934B496-761B-4D74-B128-428583567E6C}"/>
+                  </a:ext>
+                </a:extLst>
+              </p:cNvPr>
+              <p:cNvCxnSpPr>
+                <a:cxnSpLocks/>
+                <a:stCxn id="85" idx="5"/>
+                <a:endCxn id="87" idx="1"/>
+              </p:cNvCxnSpPr>
+              <p:nvPr/>
+            </p:nvCxnSpPr>
+            <p:spPr>
+              <a:xfrm>
+                <a:off x="7907348" y="3183495"/>
+                <a:ext cx="176427" cy="274940"/>
+              </a:xfrm>
+              <a:prstGeom prst="straightConnector1">
+                <a:avLst/>
+              </a:prstGeom>
+              <a:ln w="19050">
+                <a:tailEnd type="triangle"/>
+              </a:ln>
+            </p:spPr>
+            <p:style>
+              <a:lnRef idx="1">
+                <a:schemeClr val="accent1"/>
+              </a:lnRef>
+              <a:fillRef idx="0">
+                <a:schemeClr val="accent1"/>
+              </a:fillRef>
+              <a:effectRef idx="0">
+                <a:schemeClr val="accent1"/>
+              </a:effectRef>
+              <a:fontRef idx="minor">
+                <a:schemeClr val="tx1"/>
+              </a:fontRef>
+            </p:style>
+          </p:cxnSp>
+          <p:sp>
+            <p:nvSpPr>
+              <p:cNvPr id="144" name="Oval 143">
+                <a:extLst>
+                  <a:ext uri="{FF2B5EF4-FFF2-40B4-BE49-F238E27FC236}">
+                    <a16:creationId xmlns:a16="http://schemas.microsoft.com/office/drawing/2014/main" id="{17DBD242-11CA-4070-AC43-98BCF347B8B0}"/>
+                  </a:ext>
+                </a:extLst>
+              </p:cNvPr>
+              <p:cNvSpPr/>
+              <p:nvPr/>
+            </p:nvSpPr>
+            <p:spPr>
+              <a:xfrm>
+                <a:off x="8336832" y="3000566"/>
+                <a:ext cx="200993" cy="200993"/>
+              </a:xfrm>
+              <a:prstGeom prst="ellipse">
+                <a:avLst/>
+              </a:prstGeom>
+              <a:solidFill>
+                <a:schemeClr val="accent6">
+                  <a:lumMod val="60000"/>
+                  <a:lumOff val="40000"/>
+                </a:schemeClr>
+              </a:solidFill>
+              <a:ln>
+                <a:solidFill>
+                  <a:schemeClr val="accent6">
+                    <a:lumMod val="75000"/>
+                  </a:schemeClr>
+                </a:solidFill>
+              </a:ln>
+            </p:spPr>
+            <p:style>
+              <a:lnRef idx="2">
+                <a:schemeClr val="accent1">
+                  <a:shade val="50000"/>
+                </a:schemeClr>
+              </a:lnRef>
+              <a:fillRef idx="1">
+                <a:schemeClr val="accent1"/>
+              </a:fillRef>
+              <a:effectRef idx="0">
+                <a:schemeClr val="accent1"/>
+              </a:effectRef>
+              <a:fontRef idx="minor">
+                <a:schemeClr val="lt1"/>
+              </a:fontRef>
+            </p:style>
+            <p:txBody>
+              <a:bodyPr rtlCol="0" anchor="ctr"/>
+              <a:lstStyle/>
+              <a:p>
+                <a:pPr algn="ctr"/>
+                <a:endParaRPr lang="en-US" dirty="0"/>
+              </a:p>
+            </p:txBody>
+          </p:sp>
+          <p:cxnSp>
+            <p:nvCxnSpPr>
+              <p:cNvPr id="145" name="Straight Arrow Connector 144">
+                <a:extLst>
+                  <a:ext uri="{FF2B5EF4-FFF2-40B4-BE49-F238E27FC236}">
+                    <a16:creationId xmlns:a16="http://schemas.microsoft.com/office/drawing/2014/main" id="{11904348-BA85-446E-BA0D-557FAB979237}"/>
+                  </a:ext>
+                </a:extLst>
+              </p:cNvPr>
+              <p:cNvCxnSpPr>
+                <a:cxnSpLocks/>
+                <a:stCxn id="84" idx="5"/>
+                <a:endCxn id="144" idx="1"/>
+              </p:cNvCxnSpPr>
+              <p:nvPr/>
+            </p:nvCxnSpPr>
+            <p:spPr>
+              <a:xfrm>
+                <a:off x="8188168" y="2649726"/>
+                <a:ext cx="178099" cy="380275"/>
+              </a:xfrm>
+              <a:prstGeom prst="straightConnector1">
+                <a:avLst/>
+              </a:prstGeom>
+              <a:ln w="19050">
+                <a:tailEnd type="triangle"/>
+              </a:ln>
+            </p:spPr>
+            <p:style>
+              <a:lnRef idx="1">
+                <a:schemeClr val="accent1"/>
+              </a:lnRef>
+              <a:fillRef idx="0">
+                <a:schemeClr val="accent1"/>
+              </a:fillRef>
+              <a:effectRef idx="0">
+                <a:schemeClr val="accent1"/>
+              </a:effectRef>
+              <a:fontRef idx="minor">
+                <a:schemeClr val="tx1"/>
+              </a:fontRef>
+            </p:style>
+          </p:cxnSp>
+        </p:grpSp>
+        <p:sp>
+          <p:nvSpPr>
+            <p:cNvPr id="146" name="TextBox 145">
+              <a:extLst>
+                <a:ext uri="{FF2B5EF4-FFF2-40B4-BE49-F238E27FC236}">
+                  <a16:creationId xmlns:a16="http://schemas.microsoft.com/office/drawing/2014/main" id="{307BFB30-7BEA-4291-B07B-763FF4436103}"/>
+                </a:ext>
+              </a:extLst>
+            </p:cNvPr>
+            <p:cNvSpPr txBox="1"/>
+            <p:nvPr/>
+          </p:nvSpPr>
+          <p:spPr>
+            <a:xfrm>
+              <a:off x="5776954" y="2136226"/>
+              <a:ext cx="424717" cy="307777"/>
+            </a:xfrm>
+            <a:prstGeom prst="rect">
+              <a:avLst/>
+            </a:prstGeom>
+            <a:noFill/>
+          </p:spPr>
+          <p:txBody>
+            <a:bodyPr wrap="square" rtlCol="0">
+              <a:spAutoFit/>
+            </a:bodyPr>
+            <a:lstStyle/>
+            <a:p>
+              <a:r>
+                <a:rPr lang="en-US" sz="1400" dirty="0"/>
+                <a:t>V1</a:t>
+              </a:r>
+              <a:endParaRPr lang="en-US" sz="1100" dirty="0"/>
+            </a:p>
+          </p:txBody>
+        </p:sp>
+        <p:sp>
+          <p:nvSpPr>
+            <p:cNvPr id="147" name="TextBox 146">
+              <a:extLst>
+                <a:ext uri="{FF2B5EF4-FFF2-40B4-BE49-F238E27FC236}">
+                  <a16:creationId xmlns:a16="http://schemas.microsoft.com/office/drawing/2014/main" id="{F68C8B6D-C141-4037-BC49-0D76A06FB751}"/>
+                </a:ext>
+              </a:extLst>
+            </p:cNvPr>
+            <p:cNvSpPr txBox="1"/>
+            <p:nvPr/>
+          </p:nvSpPr>
+          <p:spPr>
+            <a:xfrm>
+              <a:off x="5931347" y="2557816"/>
+              <a:ext cx="424717" cy="307777"/>
+            </a:xfrm>
+            <a:prstGeom prst="rect">
+              <a:avLst/>
+            </a:prstGeom>
+            <a:noFill/>
+          </p:spPr>
+          <p:txBody>
+            <a:bodyPr wrap="square" rtlCol="0">
+              <a:spAutoFit/>
+            </a:bodyPr>
+            <a:lstStyle/>
+            <a:p>
+              <a:r>
+                <a:rPr lang="en-US" sz="1400" dirty="0"/>
+                <a:t>V2</a:t>
+              </a:r>
+              <a:endParaRPr lang="en-US" sz="1100" dirty="0"/>
+            </a:p>
+          </p:txBody>
+        </p:sp>
+      </p:grpSp>
+      <p:sp>
+        <p:nvSpPr>
+          <p:cNvPr id="148" name="TextBox 147">
+            <a:extLst>
+              <a:ext uri="{FF2B5EF4-FFF2-40B4-BE49-F238E27FC236}">
+                <a16:creationId xmlns:a16="http://schemas.microsoft.com/office/drawing/2014/main" id="{0806108C-4B3A-47D8-A9A9-EE0E673A4AC1}"/>
+              </a:ext>
+            </a:extLst>
+          </p:cNvPr>
+          <p:cNvSpPr txBox="1"/>
+          <p:nvPr/>
+        </p:nvSpPr>
+        <p:spPr>
+          <a:xfrm>
+            <a:off x="5510553" y="3605034"/>
+            <a:ext cx="1234702" cy="307777"/>
+          </a:xfrm>
+          <a:prstGeom prst="rect">
+            <a:avLst/>
+          </a:prstGeom>
+          <a:noFill/>
+        </p:spPr>
+        <p:txBody>
+          <a:bodyPr wrap="square" rtlCol="0">
+            <a:spAutoFit/>
+          </a:bodyPr>
+          <a:lstStyle/>
+          <a:p>
+            <a:r>
+              <a:rPr lang="en-US" sz="1400" dirty="0"/>
+              <a:t>&lt;v1,v2,…,</a:t>
+            </a:r>
+            <a:r>
+              <a:rPr lang="en-US" sz="1400" dirty="0" err="1"/>
+              <a:t>vn</a:t>
+            </a:r>
+            <a:r>
+              <a:rPr lang="en-US" sz="1400" dirty="0"/>
+              <a:t>&gt;</a:t>
+            </a:r>
+          </a:p>
+        </p:txBody>
+      </p:sp>
+      <p:sp>
+        <p:nvSpPr>
+          <p:cNvPr id="149" name="TextBox 148">
+            <a:extLst>
+              <a:ext uri="{FF2B5EF4-FFF2-40B4-BE49-F238E27FC236}">
+                <a16:creationId xmlns:a16="http://schemas.microsoft.com/office/drawing/2014/main" id="{DD99E727-5863-4D99-81C1-7E30265922A2}"/>
+              </a:ext>
+            </a:extLst>
+          </p:cNvPr>
+          <p:cNvSpPr txBox="1"/>
+          <p:nvPr/>
+        </p:nvSpPr>
+        <p:spPr>
+          <a:xfrm>
+            <a:off x="4579940" y="1699205"/>
+            <a:ext cx="1373818" cy="646331"/>
+          </a:xfrm>
+          <a:prstGeom prst="rect">
+            <a:avLst/>
+          </a:prstGeom>
+          <a:noFill/>
+        </p:spPr>
+        <p:txBody>
+          <a:bodyPr wrap="square" rtlCol="0">
+            <a:spAutoFit/>
+          </a:bodyPr>
+          <a:lstStyle/>
+          <a:p>
+            <a:pPr algn="ctr"/>
+            <a:r>
+              <a:rPr lang="en-US" dirty="0"/>
+              <a:t>Word</a:t>
+            </a:r>
+          </a:p>
+          <a:p>
+            <a:pPr algn="ctr"/>
+            <a:r>
+              <a:rPr lang="en-US" dirty="0"/>
+              <a:t>Embedding</a:t>
+            </a:r>
+          </a:p>
+        </p:txBody>
+      </p:sp>
+    </p:spTree>
+    <p:extLst>
+      <p:ext uri="{BB962C8B-B14F-4D97-AF65-F5344CB8AC3E}">
+        <p14:creationId xmlns:p14="http://schemas.microsoft.com/office/powerpoint/2010/main" val="3139791959"/>
+      </p:ext>
+    </p:extLst>
+  </p:cSld>
+  <p:clrMapOvr>
+    <a:masterClrMapping/>
+  </p:clrMapOvr>
+</p:sld>
+</file>
+
 <file path=ppt/theme/theme1.xml><?xml version="1.0" encoding="utf-8"?>
 <a:theme xmlns:a="http://schemas.openxmlformats.org/drawingml/2006/main" name="Office Theme">
   <a:themeElements>

</xml_diff>

<commit_message>
done with Step 2
</commit_message>
<xml_diff>
--- a/Figures.pptx
+++ b/Figures.pptx
@@ -270,7 +270,7 @@
           <a:p>
             <a:fld id="{9BED4BE8-31C7-403D-911A-3E727E0E58BF}" type="datetimeFigureOut">
               <a:rPr lang="en-US" smtClean="0"/>
-              <a:t>8/20/2021</a:t>
+              <a:t>8/21/2021</a:t>
             </a:fld>
             <a:endParaRPr lang="en-US"/>
           </a:p>
@@ -468,7 +468,7 @@
           <a:p>
             <a:fld id="{9BED4BE8-31C7-403D-911A-3E727E0E58BF}" type="datetimeFigureOut">
               <a:rPr lang="en-US" smtClean="0"/>
-              <a:t>8/20/2021</a:t>
+              <a:t>8/21/2021</a:t>
             </a:fld>
             <a:endParaRPr lang="en-US"/>
           </a:p>
@@ -676,7 +676,7 @@
           <a:p>
             <a:fld id="{9BED4BE8-31C7-403D-911A-3E727E0E58BF}" type="datetimeFigureOut">
               <a:rPr lang="en-US" smtClean="0"/>
-              <a:t>8/20/2021</a:t>
+              <a:t>8/21/2021</a:t>
             </a:fld>
             <a:endParaRPr lang="en-US"/>
           </a:p>
@@ -874,7 +874,7 @@
           <a:p>
             <a:fld id="{9BED4BE8-31C7-403D-911A-3E727E0E58BF}" type="datetimeFigureOut">
               <a:rPr lang="en-US" smtClean="0"/>
-              <a:t>8/20/2021</a:t>
+              <a:t>8/21/2021</a:t>
             </a:fld>
             <a:endParaRPr lang="en-US"/>
           </a:p>
@@ -1149,7 +1149,7 @@
           <a:p>
             <a:fld id="{9BED4BE8-31C7-403D-911A-3E727E0E58BF}" type="datetimeFigureOut">
               <a:rPr lang="en-US" smtClean="0"/>
-              <a:t>8/20/2021</a:t>
+              <a:t>8/21/2021</a:t>
             </a:fld>
             <a:endParaRPr lang="en-US"/>
           </a:p>
@@ -1414,7 +1414,7 @@
           <a:p>
             <a:fld id="{9BED4BE8-31C7-403D-911A-3E727E0E58BF}" type="datetimeFigureOut">
               <a:rPr lang="en-US" smtClean="0"/>
-              <a:t>8/20/2021</a:t>
+              <a:t>8/21/2021</a:t>
             </a:fld>
             <a:endParaRPr lang="en-US"/>
           </a:p>
@@ -1826,7 +1826,7 @@
           <a:p>
             <a:fld id="{9BED4BE8-31C7-403D-911A-3E727E0E58BF}" type="datetimeFigureOut">
               <a:rPr lang="en-US" smtClean="0"/>
-              <a:t>8/20/2021</a:t>
+              <a:t>8/21/2021</a:t>
             </a:fld>
             <a:endParaRPr lang="en-US"/>
           </a:p>
@@ -1967,7 +1967,7 @@
           <a:p>
             <a:fld id="{9BED4BE8-31C7-403D-911A-3E727E0E58BF}" type="datetimeFigureOut">
               <a:rPr lang="en-US" smtClean="0"/>
-              <a:t>8/20/2021</a:t>
+              <a:t>8/21/2021</a:t>
             </a:fld>
             <a:endParaRPr lang="en-US"/>
           </a:p>
@@ -2080,7 +2080,7 @@
           <a:p>
             <a:fld id="{9BED4BE8-31C7-403D-911A-3E727E0E58BF}" type="datetimeFigureOut">
               <a:rPr lang="en-US" smtClean="0"/>
-              <a:t>8/20/2021</a:t>
+              <a:t>8/21/2021</a:t>
             </a:fld>
             <a:endParaRPr lang="en-US"/>
           </a:p>
@@ -2391,7 +2391,7 @@
           <a:p>
             <a:fld id="{9BED4BE8-31C7-403D-911A-3E727E0E58BF}" type="datetimeFigureOut">
               <a:rPr lang="en-US" smtClean="0"/>
-              <a:t>8/20/2021</a:t>
+              <a:t>8/21/2021</a:t>
             </a:fld>
             <a:endParaRPr lang="en-US"/>
           </a:p>
@@ -2679,7 +2679,7 @@
           <a:p>
             <a:fld id="{9BED4BE8-31C7-403D-911A-3E727E0E58BF}" type="datetimeFigureOut">
               <a:rPr lang="en-US" smtClean="0"/>
-              <a:t>8/20/2021</a:t>
+              <a:t>8/21/2021</a:t>
             </a:fld>
             <a:endParaRPr lang="en-US"/>
           </a:p>
@@ -2920,7 +2920,7 @@
           <a:p>
             <a:fld id="{9BED4BE8-31C7-403D-911A-3E727E0E58BF}" type="datetimeFigureOut">
               <a:rPr lang="en-US" smtClean="0"/>
-              <a:t>8/20/2021</a:t>
+              <a:t>8/21/2021</a:t>
             </a:fld>
             <a:endParaRPr lang="en-US"/>
           </a:p>
@@ -22789,7 +22789,7 @@
         </p:nvSpPr>
         <p:spPr>
           <a:xfrm>
-            <a:off x="3227458" y="1872309"/>
+            <a:off x="3384429" y="1866111"/>
             <a:ext cx="3092227" cy="338554"/>
           </a:xfrm>
           <a:prstGeom prst="rect">
@@ -22804,44 +22804,8 @@
           <a:lstStyle/>
           <a:p>
             <a:r>
-              <a:rPr lang="en-US" sz="1600" i="1" dirty="0"/>
+              <a:rPr lang="en-US" sz="1600" dirty="0"/>
               <a:t>Code  coverage</a:t>
-            </a:r>
-          </a:p>
-        </p:txBody>
-      </p:sp>
-      <p:sp>
-        <p:nvSpPr>
-          <p:cNvPr id="3" name="TextBox 2">
-            <a:extLst>
-              <a:ext uri="{FF2B5EF4-FFF2-40B4-BE49-F238E27FC236}">
-                <a16:creationId xmlns:a16="http://schemas.microsoft.com/office/drawing/2014/main" id="{2E6AADB5-1754-47E3-805D-B0344C7AA2B0}"/>
-              </a:ext>
-            </a:extLst>
-          </p:cNvPr>
-          <p:cNvSpPr txBox="1"/>
-          <p:nvPr/>
-        </p:nvSpPr>
-        <p:spPr>
-          <a:xfrm>
-            <a:off x="3431855" y="2369383"/>
-            <a:ext cx="532549" cy="369332"/>
-          </a:xfrm>
-          <a:prstGeom prst="rect">
-            <a:avLst/>
-          </a:prstGeom>
-          <a:noFill/>
-        </p:spPr>
-        <p:txBody>
-          <a:bodyPr wrap="square" rtlCol="0">
-            <a:spAutoFit/>
-          </a:bodyPr>
-          <a:lstStyle/>
-          <a:p>
-            <a:pPr algn="ctr"/>
-            <a:r>
-              <a:rPr lang="en-US" dirty="0"/>
-              <a:t>AST</a:t>
             </a:r>
           </a:p>
         </p:txBody>
@@ -22860,7 +22824,7 @@
         </p:nvSpPr>
         <p:spPr>
           <a:xfrm>
-            <a:off x="3018593" y="3241112"/>
+            <a:off x="3312785" y="3246011"/>
             <a:ext cx="1412660" cy="369332"/>
           </a:xfrm>
           <a:prstGeom prst="rect">
@@ -22876,7 +22840,7 @@
           <a:p>
             <a:pPr algn="ctr"/>
             <a:r>
-              <a:rPr lang="en-US" i="1" dirty="0"/>
+              <a:rPr lang="en-US" dirty="0"/>
               <a:t>Variables</a:t>
             </a:r>
           </a:p>
@@ -22896,7 +22860,7 @@
         </p:nvSpPr>
         <p:spPr>
           <a:xfrm>
-            <a:off x="7345482" y="3704454"/>
+            <a:off x="7412077" y="3689846"/>
             <a:ext cx="744222" cy="369332"/>
           </a:xfrm>
           <a:prstGeom prst="rect">
@@ -23126,7 +23090,7 @@
         </p:nvSpPr>
         <p:spPr>
           <a:xfrm>
-            <a:off x="7287338" y="2647582"/>
+            <a:off x="7264646" y="2190271"/>
             <a:ext cx="848615" cy="369332"/>
           </a:xfrm>
           <a:prstGeom prst="rect">
@@ -23588,7 +23552,7 @@
         </p:nvSpPr>
         <p:spPr>
           <a:xfrm>
-            <a:off x="4872851" y="2569957"/>
+            <a:off x="4871381" y="2542927"/>
             <a:ext cx="210197" cy="221662"/>
           </a:xfrm>
           <a:prstGeom prst="rightArrow">
@@ -23634,7 +23598,7 @@
         </p:nvSpPr>
         <p:spPr>
           <a:xfrm>
-            <a:off x="4864947" y="3635093"/>
+            <a:off x="4871382" y="3579873"/>
             <a:ext cx="210197" cy="221662"/>
           </a:xfrm>
           <a:prstGeom prst="rightArrow">
@@ -23680,7 +23644,7 @@
         </p:nvSpPr>
         <p:spPr>
           <a:xfrm>
-            <a:off x="5322258" y="2562719"/>
+            <a:off x="5327805" y="2529782"/>
             <a:ext cx="210197" cy="221662"/>
           </a:xfrm>
           <a:prstGeom prst="rightArrow">
@@ -23726,7 +23690,7 @@
         </p:nvSpPr>
         <p:spPr>
           <a:xfrm>
-            <a:off x="5314354" y="3627855"/>
+            <a:off x="5332107" y="3587558"/>
             <a:ext cx="210197" cy="221662"/>
           </a:xfrm>
           <a:prstGeom prst="rightArrow">
@@ -23772,7 +23736,7 @@
         </p:nvSpPr>
         <p:spPr>
           <a:xfrm>
-            <a:off x="6642833" y="2504370"/>
+            <a:off x="6642727" y="2504296"/>
             <a:ext cx="210197" cy="221662"/>
           </a:xfrm>
           <a:prstGeom prst="rightArrow">
@@ -23818,7 +23782,7 @@
         </p:nvSpPr>
         <p:spPr>
           <a:xfrm>
-            <a:off x="6634929" y="3569506"/>
+            <a:off x="6646993" y="3599355"/>
             <a:ext cx="210197" cy="221662"/>
           </a:xfrm>
           <a:prstGeom prst="rightArrow">
@@ -23942,473 +23906,530 @@
           </a:p>
         </p:txBody>
       </p:sp>
-      <p:sp>
-        <p:nvSpPr>
-          <p:cNvPr id="120" name="Oval 119">
+      <p:grpSp>
+        <p:nvGrpSpPr>
+          <p:cNvPr id="5" name="Group 4">
             <a:extLst>
               <a:ext uri="{FF2B5EF4-FFF2-40B4-BE49-F238E27FC236}">
-                <a16:creationId xmlns:a16="http://schemas.microsoft.com/office/drawing/2014/main" id="{02910987-63ED-4E1E-B7C8-471816686224}"/>
+                <a16:creationId xmlns:a16="http://schemas.microsoft.com/office/drawing/2014/main" id="{6FC35AC6-BED0-4CFF-9A1F-1C55B0B64254}"/>
               </a:ext>
             </a:extLst>
           </p:cNvPr>
-          <p:cNvSpPr/>
+          <p:cNvGrpSpPr/>
           <p:nvPr/>
-        </p:nvSpPr>
-        <p:spPr>
+        </p:nvGrpSpPr>
+        <p:grpSpPr>
           <a:xfrm>
-            <a:off x="4016870" y="2378745"/>
-            <a:ext cx="200993" cy="135700"/>
+            <a:off x="3499200" y="2269967"/>
+            <a:ext cx="959158" cy="807824"/>
+            <a:chOff x="3379226" y="2351641"/>
+            <a:chExt cx="1158859" cy="814935"/>
           </a:xfrm>
-          <a:prstGeom prst="ellipse">
-            <a:avLst/>
-          </a:prstGeom>
-          <a:solidFill>
-            <a:schemeClr val="accent6">
-              <a:lumMod val="60000"/>
-              <a:lumOff val="40000"/>
-            </a:schemeClr>
-          </a:solidFill>
-          <a:ln>
+        </p:grpSpPr>
+        <p:sp>
+          <p:nvSpPr>
+            <p:cNvPr id="3" name="TextBox 2">
+              <a:extLst>
+                <a:ext uri="{FF2B5EF4-FFF2-40B4-BE49-F238E27FC236}">
+                  <a16:creationId xmlns:a16="http://schemas.microsoft.com/office/drawing/2014/main" id="{2E6AADB5-1754-47E3-805D-B0344C7AA2B0}"/>
+                </a:ext>
+              </a:extLst>
+            </p:cNvPr>
+            <p:cNvSpPr txBox="1"/>
+            <p:nvPr/>
+          </p:nvSpPr>
+          <p:spPr>
+            <a:xfrm>
+              <a:off x="3379226" y="2351641"/>
+              <a:ext cx="660381" cy="372583"/>
+            </a:xfrm>
+            <a:prstGeom prst="rect">
+              <a:avLst/>
+            </a:prstGeom>
+            <a:noFill/>
+          </p:spPr>
+          <p:txBody>
+            <a:bodyPr wrap="square" rtlCol="0">
+              <a:spAutoFit/>
+            </a:bodyPr>
+            <a:lstStyle/>
+            <a:p>
+              <a:pPr algn="ctr"/>
+              <a:r>
+                <a:rPr lang="en-US" dirty="0"/>
+                <a:t>AST</a:t>
+              </a:r>
+            </a:p>
+          </p:txBody>
+        </p:sp>
+        <p:sp>
+          <p:nvSpPr>
+            <p:cNvPr id="120" name="Oval 119">
+              <a:extLst>
+                <a:ext uri="{FF2B5EF4-FFF2-40B4-BE49-F238E27FC236}">
+                  <a16:creationId xmlns:a16="http://schemas.microsoft.com/office/drawing/2014/main" id="{02910987-63ED-4E1E-B7C8-471816686224}"/>
+                </a:ext>
+              </a:extLst>
+            </p:cNvPr>
+            <p:cNvSpPr/>
+            <p:nvPr/>
+          </p:nvSpPr>
+          <p:spPr>
+            <a:xfrm>
+              <a:off x="4016870" y="2378745"/>
+              <a:ext cx="200993" cy="135700"/>
+            </a:xfrm>
+            <a:prstGeom prst="ellipse">
+              <a:avLst/>
+            </a:prstGeom>
             <a:solidFill>
               <a:schemeClr val="accent6">
-                <a:lumMod val="75000"/>
+                <a:lumMod val="60000"/>
+                <a:lumOff val="40000"/>
               </a:schemeClr>
             </a:solidFill>
-          </a:ln>
-        </p:spPr>
-        <p:style>
-          <a:lnRef idx="2">
-            <a:schemeClr val="accent1">
-              <a:shade val="50000"/>
-            </a:schemeClr>
-          </a:lnRef>
-          <a:fillRef idx="1">
-            <a:schemeClr val="accent1"/>
-          </a:fillRef>
-          <a:effectRef idx="0">
-            <a:schemeClr val="accent1"/>
-          </a:effectRef>
-          <a:fontRef idx="minor">
-            <a:schemeClr val="lt1"/>
-          </a:fontRef>
-        </p:style>
-        <p:txBody>
-          <a:bodyPr rtlCol="0" anchor="ctr"/>
-          <a:lstStyle/>
-          <a:p>
-            <a:pPr algn="ctr"/>
-            <a:endParaRPr lang="en-US" dirty="0"/>
-          </a:p>
-        </p:txBody>
-      </p:sp>
-      <p:sp>
-        <p:nvSpPr>
-          <p:cNvPr id="121" name="Oval 120">
-            <a:extLst>
-              <a:ext uri="{FF2B5EF4-FFF2-40B4-BE49-F238E27FC236}">
-                <a16:creationId xmlns:a16="http://schemas.microsoft.com/office/drawing/2014/main" id="{860961CC-D4A5-449C-8925-6465367E38D0}"/>
-              </a:ext>
-            </a:extLst>
-          </p:cNvPr>
-          <p:cNvSpPr/>
-          <p:nvPr/>
-        </p:nvSpPr>
-        <p:spPr>
-          <a:xfrm>
-            <a:off x="3736050" y="2739118"/>
-            <a:ext cx="200993" cy="135700"/>
-          </a:xfrm>
-          <a:prstGeom prst="ellipse">
-            <a:avLst/>
-          </a:prstGeom>
-          <a:solidFill>
-            <a:schemeClr val="accent6">
-              <a:lumMod val="60000"/>
-              <a:lumOff val="40000"/>
-            </a:schemeClr>
-          </a:solidFill>
-          <a:ln>
+            <a:ln>
+              <a:solidFill>
+                <a:schemeClr val="accent6">
+                  <a:lumMod val="75000"/>
+                </a:schemeClr>
+              </a:solidFill>
+            </a:ln>
+          </p:spPr>
+          <p:style>
+            <a:lnRef idx="2">
+              <a:schemeClr val="accent1">
+                <a:shade val="50000"/>
+              </a:schemeClr>
+            </a:lnRef>
+            <a:fillRef idx="1">
+              <a:schemeClr val="accent1"/>
+            </a:fillRef>
+            <a:effectRef idx="0">
+              <a:schemeClr val="accent1"/>
+            </a:effectRef>
+            <a:fontRef idx="minor">
+              <a:schemeClr val="lt1"/>
+            </a:fontRef>
+          </p:style>
+          <p:txBody>
+            <a:bodyPr rtlCol="0" anchor="ctr"/>
+            <a:lstStyle/>
+            <a:p>
+              <a:pPr algn="ctr"/>
+              <a:endParaRPr lang="en-US" dirty="0"/>
+            </a:p>
+          </p:txBody>
+        </p:sp>
+        <p:sp>
+          <p:nvSpPr>
+            <p:cNvPr id="121" name="Oval 120">
+              <a:extLst>
+                <a:ext uri="{FF2B5EF4-FFF2-40B4-BE49-F238E27FC236}">
+                  <a16:creationId xmlns:a16="http://schemas.microsoft.com/office/drawing/2014/main" id="{860961CC-D4A5-449C-8925-6465367E38D0}"/>
+                </a:ext>
+              </a:extLst>
+            </p:cNvPr>
+            <p:cNvSpPr/>
+            <p:nvPr/>
+          </p:nvSpPr>
+          <p:spPr>
+            <a:xfrm>
+              <a:off x="3736050" y="2739118"/>
+              <a:ext cx="200993" cy="135700"/>
+            </a:xfrm>
+            <a:prstGeom prst="ellipse">
+              <a:avLst/>
+            </a:prstGeom>
             <a:solidFill>
               <a:schemeClr val="accent6">
-                <a:lumMod val="75000"/>
+                <a:lumMod val="60000"/>
+                <a:lumOff val="40000"/>
               </a:schemeClr>
             </a:solidFill>
-          </a:ln>
-        </p:spPr>
-        <p:style>
-          <a:lnRef idx="2">
-            <a:schemeClr val="accent1">
-              <a:shade val="50000"/>
-            </a:schemeClr>
-          </a:lnRef>
-          <a:fillRef idx="1">
-            <a:schemeClr val="accent1"/>
-          </a:fillRef>
-          <a:effectRef idx="0">
-            <a:schemeClr val="accent1"/>
-          </a:effectRef>
-          <a:fontRef idx="minor">
-            <a:schemeClr val="lt1"/>
-          </a:fontRef>
-        </p:style>
-        <p:txBody>
-          <a:bodyPr rtlCol="0" anchor="ctr"/>
-          <a:lstStyle/>
-          <a:p>
-            <a:pPr algn="ctr"/>
-            <a:endParaRPr lang="en-US" dirty="0"/>
-          </a:p>
-        </p:txBody>
-      </p:sp>
-      <p:sp>
-        <p:nvSpPr>
-          <p:cNvPr id="122" name="Oval 121">
-            <a:extLst>
-              <a:ext uri="{FF2B5EF4-FFF2-40B4-BE49-F238E27FC236}">
-                <a16:creationId xmlns:a16="http://schemas.microsoft.com/office/drawing/2014/main" id="{D4324D14-1354-43EA-855A-7CC46352451C}"/>
-              </a:ext>
-            </a:extLst>
-          </p:cNvPr>
-          <p:cNvSpPr/>
-          <p:nvPr/>
-        </p:nvSpPr>
-        <p:spPr>
-          <a:xfrm>
-            <a:off x="3479208" y="3030876"/>
-            <a:ext cx="200993" cy="135700"/>
-          </a:xfrm>
-          <a:prstGeom prst="ellipse">
-            <a:avLst/>
-          </a:prstGeom>
-          <a:solidFill>
-            <a:schemeClr val="accent6">
-              <a:lumMod val="60000"/>
-              <a:lumOff val="40000"/>
-            </a:schemeClr>
-          </a:solidFill>
-          <a:ln>
+            <a:ln>
+              <a:solidFill>
+                <a:schemeClr val="accent6">
+                  <a:lumMod val="75000"/>
+                </a:schemeClr>
+              </a:solidFill>
+            </a:ln>
+          </p:spPr>
+          <p:style>
+            <a:lnRef idx="2">
+              <a:schemeClr val="accent1">
+                <a:shade val="50000"/>
+              </a:schemeClr>
+            </a:lnRef>
+            <a:fillRef idx="1">
+              <a:schemeClr val="accent1"/>
+            </a:fillRef>
+            <a:effectRef idx="0">
+              <a:schemeClr val="accent1"/>
+            </a:effectRef>
+            <a:fontRef idx="minor">
+              <a:schemeClr val="lt1"/>
+            </a:fontRef>
+          </p:style>
+          <p:txBody>
+            <a:bodyPr rtlCol="0" anchor="ctr"/>
+            <a:lstStyle/>
+            <a:p>
+              <a:pPr algn="ctr"/>
+              <a:endParaRPr lang="en-US" dirty="0"/>
+            </a:p>
+          </p:txBody>
+        </p:sp>
+        <p:sp>
+          <p:nvSpPr>
+            <p:cNvPr id="122" name="Oval 121">
+              <a:extLst>
+                <a:ext uri="{FF2B5EF4-FFF2-40B4-BE49-F238E27FC236}">
+                  <a16:creationId xmlns:a16="http://schemas.microsoft.com/office/drawing/2014/main" id="{D4324D14-1354-43EA-855A-7CC46352451C}"/>
+                </a:ext>
+              </a:extLst>
+            </p:cNvPr>
+            <p:cNvSpPr/>
+            <p:nvPr/>
+          </p:nvSpPr>
+          <p:spPr>
+            <a:xfrm>
+              <a:off x="3479208" y="3030876"/>
+              <a:ext cx="200993" cy="135700"/>
+            </a:xfrm>
+            <a:prstGeom prst="ellipse">
+              <a:avLst/>
+            </a:prstGeom>
             <a:solidFill>
               <a:schemeClr val="accent6">
-                <a:lumMod val="75000"/>
+                <a:lumMod val="60000"/>
+                <a:lumOff val="40000"/>
               </a:schemeClr>
             </a:solidFill>
-          </a:ln>
-        </p:spPr>
-        <p:style>
-          <a:lnRef idx="2">
-            <a:schemeClr val="accent1">
-              <a:shade val="50000"/>
-            </a:schemeClr>
-          </a:lnRef>
-          <a:fillRef idx="1">
-            <a:schemeClr val="accent1"/>
-          </a:fillRef>
-          <a:effectRef idx="0">
-            <a:schemeClr val="accent1"/>
-          </a:effectRef>
-          <a:fontRef idx="minor">
-            <a:schemeClr val="lt1"/>
-          </a:fontRef>
-        </p:style>
-        <p:txBody>
-          <a:bodyPr rtlCol="0" anchor="ctr"/>
-          <a:lstStyle/>
-          <a:p>
-            <a:pPr algn="ctr"/>
-            <a:endParaRPr lang="en-US" dirty="0"/>
-          </a:p>
-        </p:txBody>
-      </p:sp>
-      <p:sp>
-        <p:nvSpPr>
-          <p:cNvPr id="123" name="Oval 122">
-            <a:extLst>
-              <a:ext uri="{FF2B5EF4-FFF2-40B4-BE49-F238E27FC236}">
-                <a16:creationId xmlns:a16="http://schemas.microsoft.com/office/drawing/2014/main" id="{0263B05C-3EF3-489C-8772-BD13773E375A}"/>
-              </a:ext>
-            </a:extLst>
-          </p:cNvPr>
-          <p:cNvSpPr/>
-          <p:nvPr/>
-        </p:nvSpPr>
-        <p:spPr>
-          <a:xfrm>
-            <a:off x="4054600" y="3020696"/>
-            <a:ext cx="200993" cy="135700"/>
-          </a:xfrm>
-          <a:prstGeom prst="ellipse">
-            <a:avLst/>
-          </a:prstGeom>
-          <a:solidFill>
-            <a:schemeClr val="accent6">
-              <a:lumMod val="60000"/>
-              <a:lumOff val="40000"/>
-            </a:schemeClr>
-          </a:solidFill>
-          <a:ln>
+            <a:ln>
+              <a:solidFill>
+                <a:schemeClr val="accent6">
+                  <a:lumMod val="75000"/>
+                </a:schemeClr>
+              </a:solidFill>
+            </a:ln>
+          </p:spPr>
+          <p:style>
+            <a:lnRef idx="2">
+              <a:schemeClr val="accent1">
+                <a:shade val="50000"/>
+              </a:schemeClr>
+            </a:lnRef>
+            <a:fillRef idx="1">
+              <a:schemeClr val="accent1"/>
+            </a:fillRef>
+            <a:effectRef idx="0">
+              <a:schemeClr val="accent1"/>
+            </a:effectRef>
+            <a:fontRef idx="minor">
+              <a:schemeClr val="lt1"/>
+            </a:fontRef>
+          </p:style>
+          <p:txBody>
+            <a:bodyPr rtlCol="0" anchor="ctr"/>
+            <a:lstStyle/>
+            <a:p>
+              <a:pPr algn="ctr"/>
+              <a:endParaRPr lang="en-US" dirty="0"/>
+            </a:p>
+          </p:txBody>
+        </p:sp>
+        <p:sp>
+          <p:nvSpPr>
+            <p:cNvPr id="123" name="Oval 122">
+              <a:extLst>
+                <a:ext uri="{FF2B5EF4-FFF2-40B4-BE49-F238E27FC236}">
+                  <a16:creationId xmlns:a16="http://schemas.microsoft.com/office/drawing/2014/main" id="{0263B05C-3EF3-489C-8772-BD13773E375A}"/>
+                </a:ext>
+              </a:extLst>
+            </p:cNvPr>
+            <p:cNvSpPr/>
+            <p:nvPr/>
+          </p:nvSpPr>
+          <p:spPr>
+            <a:xfrm>
+              <a:off x="4054600" y="3020696"/>
+              <a:ext cx="200993" cy="135700"/>
+            </a:xfrm>
+            <a:prstGeom prst="ellipse">
+              <a:avLst/>
+            </a:prstGeom>
             <a:solidFill>
               <a:schemeClr val="accent6">
-                <a:lumMod val="75000"/>
+                <a:lumMod val="60000"/>
+                <a:lumOff val="40000"/>
               </a:schemeClr>
             </a:solidFill>
-          </a:ln>
-        </p:spPr>
-        <p:style>
-          <a:lnRef idx="2">
-            <a:schemeClr val="accent1">
-              <a:shade val="50000"/>
-            </a:schemeClr>
-          </a:lnRef>
-          <a:fillRef idx="1">
-            <a:schemeClr val="accent1"/>
-          </a:fillRef>
-          <a:effectRef idx="0">
-            <a:schemeClr val="accent1"/>
-          </a:effectRef>
-          <a:fontRef idx="minor">
-            <a:schemeClr val="lt1"/>
-          </a:fontRef>
-        </p:style>
-        <p:txBody>
-          <a:bodyPr rtlCol="0" anchor="ctr"/>
-          <a:lstStyle/>
-          <a:p>
-            <a:pPr algn="ctr"/>
-            <a:endParaRPr lang="en-US" dirty="0"/>
-          </a:p>
-        </p:txBody>
-      </p:sp>
-      <p:cxnSp>
-        <p:nvCxnSpPr>
-          <p:cNvPr id="124" name="Straight Arrow Connector 123">
-            <a:extLst>
-              <a:ext uri="{FF2B5EF4-FFF2-40B4-BE49-F238E27FC236}">
-                <a16:creationId xmlns:a16="http://schemas.microsoft.com/office/drawing/2014/main" id="{BA019E94-7E53-47AD-A59F-7BA2CB8CABE9}"/>
-              </a:ext>
-            </a:extLst>
-          </p:cNvPr>
-          <p:cNvCxnSpPr>
-            <a:cxnSpLocks/>
-            <a:stCxn id="120" idx="3"/>
-            <a:endCxn id="121" idx="0"/>
-          </p:cNvCxnSpPr>
-          <p:nvPr/>
-        </p:nvCxnSpPr>
-        <p:spPr>
-          <a:xfrm flipH="1">
-            <a:off x="3836547" y="2494572"/>
-            <a:ext cx="209758" cy="244546"/>
-          </a:xfrm>
-          <a:prstGeom prst="straightConnector1">
-            <a:avLst/>
-          </a:prstGeom>
-          <a:ln w="19050">
-            <a:tailEnd type="triangle"/>
-          </a:ln>
-        </p:spPr>
-        <p:style>
-          <a:lnRef idx="1">
-            <a:schemeClr val="accent1"/>
-          </a:lnRef>
-          <a:fillRef idx="0">
-            <a:schemeClr val="accent1"/>
-          </a:fillRef>
-          <a:effectRef idx="0">
-            <a:schemeClr val="accent1"/>
-          </a:effectRef>
-          <a:fontRef idx="minor">
-            <a:schemeClr val="tx1"/>
-          </a:fontRef>
-        </p:style>
-      </p:cxnSp>
-      <p:cxnSp>
-        <p:nvCxnSpPr>
-          <p:cNvPr id="125" name="Straight Arrow Connector 124">
-            <a:extLst>
-              <a:ext uri="{FF2B5EF4-FFF2-40B4-BE49-F238E27FC236}">
-                <a16:creationId xmlns:a16="http://schemas.microsoft.com/office/drawing/2014/main" id="{123F44ED-89E4-4AC2-B9F6-720214CDE3F1}"/>
-              </a:ext>
-            </a:extLst>
-          </p:cNvPr>
-          <p:cNvCxnSpPr>
-            <a:cxnSpLocks/>
-            <a:stCxn id="121" idx="3"/>
-            <a:endCxn id="122" idx="7"/>
-          </p:cNvCxnSpPr>
-          <p:nvPr/>
-        </p:nvCxnSpPr>
-        <p:spPr>
-          <a:xfrm flipH="1">
-            <a:off x="3650766" y="2854944"/>
-            <a:ext cx="114719" cy="195805"/>
-          </a:xfrm>
-          <a:prstGeom prst="straightConnector1">
-            <a:avLst/>
-          </a:prstGeom>
-          <a:ln w="19050">
-            <a:tailEnd type="triangle"/>
-          </a:ln>
-        </p:spPr>
-        <p:style>
-          <a:lnRef idx="1">
-            <a:schemeClr val="accent1"/>
-          </a:lnRef>
-          <a:fillRef idx="0">
-            <a:schemeClr val="accent1"/>
-          </a:fillRef>
-          <a:effectRef idx="0">
-            <a:schemeClr val="accent1"/>
-          </a:effectRef>
-          <a:fontRef idx="minor">
-            <a:schemeClr val="tx1"/>
-          </a:fontRef>
-        </p:style>
-      </p:cxnSp>
-      <p:cxnSp>
-        <p:nvCxnSpPr>
-          <p:cNvPr id="126" name="Straight Arrow Connector 125">
-            <a:extLst>
-              <a:ext uri="{FF2B5EF4-FFF2-40B4-BE49-F238E27FC236}">
-                <a16:creationId xmlns:a16="http://schemas.microsoft.com/office/drawing/2014/main" id="{93852753-F936-4324-8614-1739B9C550C1}"/>
-              </a:ext>
-            </a:extLst>
-          </p:cNvPr>
-          <p:cNvCxnSpPr>
-            <a:cxnSpLocks/>
-            <a:stCxn id="121" idx="5"/>
-            <a:endCxn id="123" idx="1"/>
-          </p:cNvCxnSpPr>
-          <p:nvPr/>
-        </p:nvCxnSpPr>
-        <p:spPr>
-          <a:xfrm>
-            <a:off x="3907608" y="2854944"/>
-            <a:ext cx="176427" cy="185625"/>
-          </a:xfrm>
-          <a:prstGeom prst="straightConnector1">
-            <a:avLst/>
-          </a:prstGeom>
-          <a:ln w="19050">
-            <a:tailEnd type="triangle"/>
-          </a:ln>
-        </p:spPr>
-        <p:style>
-          <a:lnRef idx="1">
-            <a:schemeClr val="accent1"/>
-          </a:lnRef>
-          <a:fillRef idx="0">
-            <a:schemeClr val="accent1"/>
-          </a:fillRef>
-          <a:effectRef idx="0">
-            <a:schemeClr val="accent1"/>
-          </a:effectRef>
-          <a:fontRef idx="minor">
-            <a:schemeClr val="tx1"/>
-          </a:fontRef>
-        </p:style>
-      </p:cxnSp>
-      <p:sp>
-        <p:nvSpPr>
-          <p:cNvPr id="127" name="Oval 126">
-            <a:extLst>
-              <a:ext uri="{FF2B5EF4-FFF2-40B4-BE49-F238E27FC236}">
-                <a16:creationId xmlns:a16="http://schemas.microsoft.com/office/drawing/2014/main" id="{87518151-4353-4D8A-968D-993A87C546FF}"/>
-              </a:ext>
-            </a:extLst>
-          </p:cNvPr>
-          <p:cNvSpPr/>
-          <p:nvPr/>
-        </p:nvSpPr>
-        <p:spPr>
-          <a:xfrm>
-            <a:off x="4337092" y="2731440"/>
-            <a:ext cx="200993" cy="135700"/>
-          </a:xfrm>
-          <a:prstGeom prst="ellipse">
-            <a:avLst/>
-          </a:prstGeom>
-          <a:solidFill>
-            <a:schemeClr val="accent6">
-              <a:lumMod val="60000"/>
-              <a:lumOff val="40000"/>
-            </a:schemeClr>
-          </a:solidFill>
-          <a:ln>
+            <a:ln>
+              <a:solidFill>
+                <a:schemeClr val="accent6">
+                  <a:lumMod val="75000"/>
+                </a:schemeClr>
+              </a:solidFill>
+            </a:ln>
+          </p:spPr>
+          <p:style>
+            <a:lnRef idx="2">
+              <a:schemeClr val="accent1">
+                <a:shade val="50000"/>
+              </a:schemeClr>
+            </a:lnRef>
+            <a:fillRef idx="1">
+              <a:schemeClr val="accent1"/>
+            </a:fillRef>
+            <a:effectRef idx="0">
+              <a:schemeClr val="accent1"/>
+            </a:effectRef>
+            <a:fontRef idx="minor">
+              <a:schemeClr val="lt1"/>
+            </a:fontRef>
+          </p:style>
+          <p:txBody>
+            <a:bodyPr rtlCol="0" anchor="ctr"/>
+            <a:lstStyle/>
+            <a:p>
+              <a:pPr algn="ctr"/>
+              <a:endParaRPr lang="en-US" dirty="0"/>
+            </a:p>
+          </p:txBody>
+        </p:sp>
+        <p:cxnSp>
+          <p:nvCxnSpPr>
+            <p:cNvPr id="124" name="Straight Arrow Connector 123">
+              <a:extLst>
+                <a:ext uri="{FF2B5EF4-FFF2-40B4-BE49-F238E27FC236}">
+                  <a16:creationId xmlns:a16="http://schemas.microsoft.com/office/drawing/2014/main" id="{BA019E94-7E53-47AD-A59F-7BA2CB8CABE9}"/>
+                </a:ext>
+              </a:extLst>
+            </p:cNvPr>
+            <p:cNvCxnSpPr>
+              <a:cxnSpLocks/>
+              <a:stCxn id="120" idx="3"/>
+              <a:endCxn id="121" idx="0"/>
+            </p:cNvCxnSpPr>
+            <p:nvPr/>
+          </p:nvCxnSpPr>
+          <p:spPr>
+            <a:xfrm flipH="1">
+              <a:off x="3836547" y="2494572"/>
+              <a:ext cx="209758" cy="244546"/>
+            </a:xfrm>
+            <a:prstGeom prst="straightConnector1">
+              <a:avLst/>
+            </a:prstGeom>
+            <a:ln w="19050">
+              <a:tailEnd type="triangle"/>
+            </a:ln>
+          </p:spPr>
+          <p:style>
+            <a:lnRef idx="1">
+              <a:schemeClr val="accent1"/>
+            </a:lnRef>
+            <a:fillRef idx="0">
+              <a:schemeClr val="accent1"/>
+            </a:fillRef>
+            <a:effectRef idx="0">
+              <a:schemeClr val="accent1"/>
+            </a:effectRef>
+            <a:fontRef idx="minor">
+              <a:schemeClr val="tx1"/>
+            </a:fontRef>
+          </p:style>
+        </p:cxnSp>
+        <p:cxnSp>
+          <p:nvCxnSpPr>
+            <p:cNvPr id="125" name="Straight Arrow Connector 124">
+              <a:extLst>
+                <a:ext uri="{FF2B5EF4-FFF2-40B4-BE49-F238E27FC236}">
+                  <a16:creationId xmlns:a16="http://schemas.microsoft.com/office/drawing/2014/main" id="{123F44ED-89E4-4AC2-B9F6-720214CDE3F1}"/>
+                </a:ext>
+              </a:extLst>
+            </p:cNvPr>
+            <p:cNvCxnSpPr>
+              <a:cxnSpLocks/>
+              <a:stCxn id="121" idx="3"/>
+              <a:endCxn id="122" idx="7"/>
+            </p:cNvCxnSpPr>
+            <p:nvPr/>
+          </p:nvCxnSpPr>
+          <p:spPr>
+            <a:xfrm flipH="1">
+              <a:off x="3650766" y="2854944"/>
+              <a:ext cx="114719" cy="195805"/>
+            </a:xfrm>
+            <a:prstGeom prst="straightConnector1">
+              <a:avLst/>
+            </a:prstGeom>
+            <a:ln w="19050">
+              <a:tailEnd type="triangle"/>
+            </a:ln>
+          </p:spPr>
+          <p:style>
+            <a:lnRef idx="1">
+              <a:schemeClr val="accent1"/>
+            </a:lnRef>
+            <a:fillRef idx="0">
+              <a:schemeClr val="accent1"/>
+            </a:fillRef>
+            <a:effectRef idx="0">
+              <a:schemeClr val="accent1"/>
+            </a:effectRef>
+            <a:fontRef idx="minor">
+              <a:schemeClr val="tx1"/>
+            </a:fontRef>
+          </p:style>
+        </p:cxnSp>
+        <p:cxnSp>
+          <p:nvCxnSpPr>
+            <p:cNvPr id="126" name="Straight Arrow Connector 125">
+              <a:extLst>
+                <a:ext uri="{FF2B5EF4-FFF2-40B4-BE49-F238E27FC236}">
+                  <a16:creationId xmlns:a16="http://schemas.microsoft.com/office/drawing/2014/main" id="{93852753-F936-4324-8614-1739B9C550C1}"/>
+                </a:ext>
+              </a:extLst>
+            </p:cNvPr>
+            <p:cNvCxnSpPr>
+              <a:cxnSpLocks/>
+              <a:stCxn id="121" idx="5"/>
+              <a:endCxn id="123" idx="1"/>
+            </p:cNvCxnSpPr>
+            <p:nvPr/>
+          </p:nvCxnSpPr>
+          <p:spPr>
+            <a:xfrm>
+              <a:off x="3907608" y="2854944"/>
+              <a:ext cx="176427" cy="185625"/>
+            </a:xfrm>
+            <a:prstGeom prst="straightConnector1">
+              <a:avLst/>
+            </a:prstGeom>
+            <a:ln w="19050">
+              <a:tailEnd type="triangle"/>
+            </a:ln>
+          </p:spPr>
+          <p:style>
+            <a:lnRef idx="1">
+              <a:schemeClr val="accent1"/>
+            </a:lnRef>
+            <a:fillRef idx="0">
+              <a:schemeClr val="accent1"/>
+            </a:fillRef>
+            <a:effectRef idx="0">
+              <a:schemeClr val="accent1"/>
+            </a:effectRef>
+            <a:fontRef idx="minor">
+              <a:schemeClr val="tx1"/>
+            </a:fontRef>
+          </p:style>
+        </p:cxnSp>
+        <p:sp>
+          <p:nvSpPr>
+            <p:cNvPr id="127" name="Oval 126">
+              <a:extLst>
+                <a:ext uri="{FF2B5EF4-FFF2-40B4-BE49-F238E27FC236}">
+                  <a16:creationId xmlns:a16="http://schemas.microsoft.com/office/drawing/2014/main" id="{87518151-4353-4D8A-968D-993A87C546FF}"/>
+                </a:ext>
+              </a:extLst>
+            </p:cNvPr>
+            <p:cNvSpPr/>
+            <p:nvPr/>
+          </p:nvSpPr>
+          <p:spPr>
+            <a:xfrm>
+              <a:off x="4337092" y="2731440"/>
+              <a:ext cx="200993" cy="135700"/>
+            </a:xfrm>
+            <a:prstGeom prst="ellipse">
+              <a:avLst/>
+            </a:prstGeom>
             <a:solidFill>
               <a:schemeClr val="accent6">
-                <a:lumMod val="75000"/>
+                <a:lumMod val="60000"/>
+                <a:lumOff val="40000"/>
               </a:schemeClr>
             </a:solidFill>
-          </a:ln>
-        </p:spPr>
-        <p:style>
-          <a:lnRef idx="2">
-            <a:schemeClr val="accent1">
-              <a:shade val="50000"/>
-            </a:schemeClr>
-          </a:lnRef>
-          <a:fillRef idx="1">
-            <a:schemeClr val="accent1"/>
-          </a:fillRef>
-          <a:effectRef idx="0">
-            <a:schemeClr val="accent1"/>
-          </a:effectRef>
-          <a:fontRef idx="minor">
-            <a:schemeClr val="lt1"/>
-          </a:fontRef>
-        </p:style>
-        <p:txBody>
-          <a:bodyPr rtlCol="0" anchor="ctr"/>
-          <a:lstStyle/>
-          <a:p>
-            <a:pPr algn="ctr"/>
-            <a:endParaRPr lang="en-US" dirty="0"/>
-          </a:p>
-        </p:txBody>
-      </p:sp>
-      <p:cxnSp>
-        <p:nvCxnSpPr>
-          <p:cNvPr id="128" name="Straight Arrow Connector 127">
-            <a:extLst>
-              <a:ext uri="{FF2B5EF4-FFF2-40B4-BE49-F238E27FC236}">
-                <a16:creationId xmlns:a16="http://schemas.microsoft.com/office/drawing/2014/main" id="{44984258-6B71-455F-8101-4CD6CB93E3AC}"/>
-              </a:ext>
-            </a:extLst>
-          </p:cNvPr>
-          <p:cNvCxnSpPr>
-            <a:cxnSpLocks/>
-            <a:stCxn id="120" idx="5"/>
-            <a:endCxn id="127" idx="1"/>
-          </p:cNvCxnSpPr>
-          <p:nvPr/>
-        </p:nvCxnSpPr>
-        <p:spPr>
-          <a:xfrm>
-            <a:off x="4188428" y="2494572"/>
-            <a:ext cx="178099" cy="256742"/>
-          </a:xfrm>
-          <a:prstGeom prst="straightConnector1">
-            <a:avLst/>
-          </a:prstGeom>
-          <a:ln w="19050">
-            <a:tailEnd type="triangle"/>
-          </a:ln>
-        </p:spPr>
-        <p:style>
-          <a:lnRef idx="1">
-            <a:schemeClr val="accent1"/>
-          </a:lnRef>
-          <a:fillRef idx="0">
-            <a:schemeClr val="accent1"/>
-          </a:fillRef>
-          <a:effectRef idx="0">
-            <a:schemeClr val="accent1"/>
-          </a:effectRef>
-          <a:fontRef idx="minor">
-            <a:schemeClr val="tx1"/>
-          </a:fontRef>
-        </p:style>
-      </p:cxnSp>
+            <a:ln>
+              <a:solidFill>
+                <a:schemeClr val="accent6">
+                  <a:lumMod val="75000"/>
+                </a:schemeClr>
+              </a:solidFill>
+            </a:ln>
+          </p:spPr>
+          <p:style>
+            <a:lnRef idx="2">
+              <a:schemeClr val="accent1">
+                <a:shade val="50000"/>
+              </a:schemeClr>
+            </a:lnRef>
+            <a:fillRef idx="1">
+              <a:schemeClr val="accent1"/>
+            </a:fillRef>
+            <a:effectRef idx="0">
+              <a:schemeClr val="accent1"/>
+            </a:effectRef>
+            <a:fontRef idx="minor">
+              <a:schemeClr val="lt1"/>
+            </a:fontRef>
+          </p:style>
+          <p:txBody>
+            <a:bodyPr rtlCol="0" anchor="ctr"/>
+            <a:lstStyle/>
+            <a:p>
+              <a:pPr algn="ctr"/>
+              <a:endParaRPr lang="en-US" dirty="0"/>
+            </a:p>
+          </p:txBody>
+        </p:sp>
+        <p:cxnSp>
+          <p:nvCxnSpPr>
+            <p:cNvPr id="128" name="Straight Arrow Connector 127">
+              <a:extLst>
+                <a:ext uri="{FF2B5EF4-FFF2-40B4-BE49-F238E27FC236}">
+                  <a16:creationId xmlns:a16="http://schemas.microsoft.com/office/drawing/2014/main" id="{44984258-6B71-455F-8101-4CD6CB93E3AC}"/>
+                </a:ext>
+              </a:extLst>
+            </p:cNvPr>
+            <p:cNvCxnSpPr>
+              <a:cxnSpLocks/>
+              <a:stCxn id="120" idx="5"/>
+              <a:endCxn id="127" idx="1"/>
+            </p:cNvCxnSpPr>
+            <p:nvPr/>
+          </p:nvCxnSpPr>
+          <p:spPr>
+            <a:xfrm>
+              <a:off x="4188428" y="2494572"/>
+              <a:ext cx="178099" cy="256742"/>
+            </a:xfrm>
+            <a:prstGeom prst="straightConnector1">
+              <a:avLst/>
+            </a:prstGeom>
+            <a:ln w="19050">
+              <a:tailEnd type="triangle"/>
+            </a:ln>
+          </p:spPr>
+          <p:style>
+            <a:lnRef idx="1">
+              <a:schemeClr val="accent1"/>
+            </a:lnRef>
+            <a:fillRef idx="0">
+              <a:schemeClr val="accent1"/>
+            </a:fillRef>
+            <a:effectRef idx="0">
+              <a:schemeClr val="accent1"/>
+            </a:effectRef>
+            <a:fontRef idx="minor">
+              <a:schemeClr val="tx1"/>
+            </a:fontRef>
+          </p:style>
+        </p:cxnSp>
+      </p:grpSp>
       <p:sp>
         <p:nvSpPr>
           <p:cNvPr id="129" name="TextBox 128">
@@ -24692,8 +24713,8 @@
         </p:nvGrpSpPr>
         <p:grpSpPr>
           <a:xfrm>
-            <a:off x="5461801" y="2287555"/>
-            <a:ext cx="1058877" cy="787831"/>
+            <a:off x="5653482" y="2249070"/>
+            <a:ext cx="785135" cy="738665"/>
             <a:chOff x="7478948" y="2478168"/>
             <a:chExt cx="1058877" cy="1166903"/>
           </a:xfrm>
@@ -25180,8 +25201,8 @@
         </p:nvSpPr>
         <p:spPr>
           <a:xfrm>
-            <a:off x="5718171" y="2209340"/>
-            <a:ext cx="424717" cy="307777"/>
+            <a:off x="5843579" y="2057425"/>
+            <a:ext cx="369190" cy="307777"/>
           </a:xfrm>
           <a:prstGeom prst="rect">
             <a:avLst/>
@@ -25196,7 +25217,7 @@
           <a:p>
             <a:r>
               <a:rPr lang="en-US" sz="1400" dirty="0"/>
-              <a:t>V1</a:t>
+              <a:t>V</a:t>
             </a:r>
             <a:endParaRPr lang="en-US" sz="1100" dirty="0"/>
           </a:p>
@@ -25216,8 +25237,8 @@
         </p:nvSpPr>
         <p:spPr>
           <a:xfrm>
-            <a:off x="5872564" y="2630930"/>
-            <a:ext cx="424717" cy="307777"/>
+            <a:off x="5629248" y="2378808"/>
+            <a:ext cx="339458" cy="307777"/>
           </a:xfrm>
           <a:prstGeom prst="rect">
             <a:avLst/>
@@ -25232,95 +25253,9 @@
           <a:p>
             <a:r>
               <a:rPr lang="en-US" sz="1400" dirty="0"/>
-              <a:t>V2</a:t>
+              <a:t>V</a:t>
             </a:r>
             <a:endParaRPr lang="en-US" sz="1100" dirty="0"/>
-          </a:p>
-        </p:txBody>
-      </p:sp>
-      <p:sp>
-        <p:nvSpPr>
-          <p:cNvPr id="148" name="TextBox 147">
-            <a:extLst>
-              <a:ext uri="{FF2B5EF4-FFF2-40B4-BE49-F238E27FC236}">
-                <a16:creationId xmlns:a16="http://schemas.microsoft.com/office/drawing/2014/main" id="{0806108C-4B3A-47D8-A9A9-EE0E673A4AC1}"/>
-              </a:ext>
-            </a:extLst>
-          </p:cNvPr>
-          <p:cNvSpPr txBox="1"/>
-          <p:nvPr/>
-        </p:nvSpPr>
-        <p:spPr>
-          <a:xfrm>
-            <a:off x="5445218" y="3494455"/>
-            <a:ext cx="1331825" cy="338554"/>
-          </a:xfrm>
-          <a:prstGeom prst="rect">
-            <a:avLst/>
-          </a:prstGeom>
-          <a:noFill/>
-        </p:spPr>
-        <p:txBody>
-          <a:bodyPr wrap="square" rtlCol="0">
-            <a:spAutoFit/>
-          </a:bodyPr>
-          <a:lstStyle/>
-          <a:p>
-            <a:r>
-              <a:rPr lang="en-US" sz="1600" dirty="0"/>
-              <a:t>&lt;v1,v2,…,</a:t>
-            </a:r>
-            <a:r>
-              <a:rPr lang="en-US" sz="1600" dirty="0" err="1"/>
-              <a:t>vn</a:t>
-            </a:r>
-            <a:r>
-              <a:rPr lang="en-US" sz="1600" dirty="0"/>
-              <a:t>&gt;</a:t>
-            </a:r>
-          </a:p>
-        </p:txBody>
-      </p:sp>
-      <p:sp>
-        <p:nvSpPr>
-          <p:cNvPr id="149" name="TextBox 148">
-            <a:extLst>
-              <a:ext uri="{FF2B5EF4-FFF2-40B4-BE49-F238E27FC236}">
-                <a16:creationId xmlns:a16="http://schemas.microsoft.com/office/drawing/2014/main" id="{DD99E727-5863-4D99-81C1-7E30265922A2}"/>
-              </a:ext>
-            </a:extLst>
-          </p:cNvPr>
-          <p:cNvSpPr txBox="1"/>
-          <p:nvPr/>
-        </p:nvSpPr>
-        <p:spPr>
-          <a:xfrm>
-            <a:off x="4121318" y="1651887"/>
-            <a:ext cx="2373760" cy="646331"/>
-          </a:xfrm>
-          <a:prstGeom prst="rect">
-            <a:avLst/>
-          </a:prstGeom>
-          <a:noFill/>
-        </p:spPr>
-        <p:txBody>
-          <a:bodyPr wrap="square" rtlCol="0">
-            <a:spAutoFit/>
-          </a:bodyPr>
-          <a:lstStyle/>
-          <a:p>
-            <a:pPr algn="ctr"/>
-            <a:r>
-              <a:rPr lang="en-US" i="1" dirty="0"/>
-              <a:t>Token </a:t>
-            </a:r>
-          </a:p>
-          <a:p>
-            <a:pPr algn="ctr"/>
-            <a:r>
-              <a:rPr lang="en-US" i="1" dirty="0"/>
-              <a:t>Embedding</a:t>
-            </a:r>
           </a:p>
         </p:txBody>
       </p:sp>
@@ -25438,42 +25373,6 @@
       </p:sp>
       <p:sp>
         <p:nvSpPr>
-          <p:cNvPr id="76" name="TextBox 75">
-            <a:extLst>
-              <a:ext uri="{FF2B5EF4-FFF2-40B4-BE49-F238E27FC236}">
-                <a16:creationId xmlns:a16="http://schemas.microsoft.com/office/drawing/2014/main" id="{7833E23C-76F9-4F5B-A064-77915BE3CD3B}"/>
-              </a:ext>
-            </a:extLst>
-          </p:cNvPr>
-          <p:cNvSpPr txBox="1"/>
-          <p:nvPr/>
-        </p:nvSpPr>
-        <p:spPr>
-          <a:xfrm>
-            <a:off x="4075239" y="3024120"/>
-            <a:ext cx="2373760" cy="369332"/>
-          </a:xfrm>
-          <a:prstGeom prst="rect">
-            <a:avLst/>
-          </a:prstGeom>
-          <a:noFill/>
-        </p:spPr>
-        <p:txBody>
-          <a:bodyPr wrap="square" rtlCol="0">
-            <a:spAutoFit/>
-          </a:bodyPr>
-          <a:lstStyle/>
-          <a:p>
-            <a:pPr algn="ctr"/>
-            <a:r>
-              <a:rPr lang="en-US" i="1" dirty="0"/>
-              <a:t>Sub-token Embedding</a:t>
-            </a:r>
-          </a:p>
-        </p:txBody>
-      </p:sp>
-      <p:sp>
-        <p:nvSpPr>
           <p:cNvPr id="90" name="Rectangle: Rounded Corners 89">
             <a:extLst>
               <a:ext uri="{FF2B5EF4-FFF2-40B4-BE49-F238E27FC236}">
@@ -25549,7 +25448,7 @@
         </p:nvSpPr>
         <p:spPr>
           <a:xfrm>
-            <a:off x="6256504" y="2940168"/>
+            <a:off x="6032200" y="2978374"/>
             <a:ext cx="1893136" cy="369332"/>
           </a:xfrm>
           <a:prstGeom prst="rect">
@@ -25565,7 +25464,7 @@
           <a:p>
             <a:pPr algn="ctr"/>
             <a:r>
-              <a:rPr lang="en-US" i="1" dirty="0"/>
+              <a:rPr lang="en-US" b="1" i="1" dirty="0"/>
               <a:t>Sequential Model</a:t>
             </a:r>
           </a:p>
@@ -25601,14 +25500,14 @@
           <a:p>
             <a:pPr algn="ctr"/>
             <a:r>
-              <a:rPr lang="en-US" i="1" dirty="0"/>
+              <a:rPr lang="en-US" b="1" i="1" dirty="0"/>
               <a:t>Tree-based </a:t>
             </a:r>
           </a:p>
           <a:p>
             <a:pPr algn="ctr"/>
             <a:r>
-              <a:rPr lang="en-US" i="1" dirty="0"/>
+              <a:rPr lang="en-US" b="1" i="1" dirty="0"/>
               <a:t>Model</a:t>
             </a:r>
           </a:p>
@@ -25628,7 +25527,7 @@
         </p:nvSpPr>
         <p:spPr>
           <a:xfrm>
-            <a:off x="9290437" y="2559760"/>
+            <a:off x="9303151" y="2145113"/>
             <a:ext cx="744222" cy="369332"/>
           </a:xfrm>
           <a:prstGeom prst="rect">
@@ -26478,10 +26377,10 @@
       </p:sp>
       <p:sp>
         <p:nvSpPr>
-          <p:cNvPr id="157" name="TextBox 156">
+          <p:cNvPr id="88" name="TextBox 87">
             <a:extLst>
               <a:ext uri="{FF2B5EF4-FFF2-40B4-BE49-F238E27FC236}">
-                <a16:creationId xmlns:a16="http://schemas.microsoft.com/office/drawing/2014/main" id="{4201F98A-A866-4B13-80F3-E4E62D0D0CA0}"/>
+                <a16:creationId xmlns:a16="http://schemas.microsoft.com/office/drawing/2014/main" id="{1D275B28-2F70-4A0D-8506-1508F598CBED}"/>
               </a:ext>
             </a:extLst>
           </p:cNvPr>
@@ -26490,50 +26389,7 @@
         </p:nvSpPr>
         <p:spPr>
           <a:xfrm>
-            <a:off x="8201360" y="1116650"/>
-            <a:ext cx="2165448" cy="646331"/>
-          </a:xfrm>
-          <a:prstGeom prst="rect">
-            <a:avLst/>
-          </a:prstGeom>
-          <a:noFill/>
-        </p:spPr>
-        <p:txBody>
-          <a:bodyPr wrap="square" rtlCol="0">
-            <a:spAutoFit/>
-          </a:bodyPr>
-          <a:lstStyle/>
-          <a:p>
-            <a:pPr algn="ctr"/>
-            <a:r>
-              <a:rPr lang="en-US" i="1" dirty="0"/>
-              <a:t>Fully connected </a:t>
-            </a:r>
-          </a:p>
-          <a:p>
-            <a:pPr algn="ctr"/>
-            <a:r>
-              <a:rPr lang="en-US" i="1" dirty="0"/>
-              <a:t>layer</a:t>
-            </a:r>
-          </a:p>
-        </p:txBody>
-      </p:sp>
-      <p:sp>
-        <p:nvSpPr>
-          <p:cNvPr id="158" name="TextBox 157">
-            <a:extLst>
-              <a:ext uri="{FF2B5EF4-FFF2-40B4-BE49-F238E27FC236}">
-                <a16:creationId xmlns:a16="http://schemas.microsoft.com/office/drawing/2014/main" id="{48C48188-0603-4764-BAFA-05E4ABDDEADF}"/>
-              </a:ext>
-            </a:extLst>
-          </p:cNvPr>
-          <p:cNvSpPr txBox="1"/>
-          <p:nvPr/>
-        </p:nvSpPr>
-        <p:spPr>
-          <a:xfrm>
-            <a:off x="8927103" y="2024237"/>
+            <a:off x="4508042" y="2986144"/>
             <a:ext cx="1373818" cy="369332"/>
           </a:xfrm>
           <a:prstGeom prst="rect">
@@ -26549,7 +26405,129 @@
           <a:p>
             <a:pPr algn="ctr"/>
             <a:r>
-              <a:rPr lang="en-US" i="1" dirty="0"/>
+              <a:rPr lang="en-US" b="1" i="1" dirty="0"/>
+              <a:t>embedding</a:t>
+            </a:r>
+          </a:p>
+        </p:txBody>
+      </p:sp>
+      <p:sp>
+        <p:nvSpPr>
+          <p:cNvPr id="89" name="TextBox 88">
+            <a:extLst>
+              <a:ext uri="{FF2B5EF4-FFF2-40B4-BE49-F238E27FC236}">
+                <a16:creationId xmlns:a16="http://schemas.microsoft.com/office/drawing/2014/main" id="{92DE1A28-6ABC-4D2F-8226-3B72D22A769D}"/>
+              </a:ext>
+            </a:extLst>
+          </p:cNvPr>
+          <p:cNvSpPr txBox="1"/>
+          <p:nvPr/>
+        </p:nvSpPr>
+        <p:spPr>
+          <a:xfrm>
+            <a:off x="5521704" y="3557239"/>
+            <a:ext cx="1509159" cy="307777"/>
+          </a:xfrm>
+          <a:prstGeom prst="rect">
+            <a:avLst/>
+          </a:prstGeom>
+          <a:noFill/>
+        </p:spPr>
+        <p:txBody>
+          <a:bodyPr wrap="square" rtlCol="0">
+            <a:spAutoFit/>
+          </a:bodyPr>
+          <a:lstStyle/>
+          <a:p>
+            <a:r>
+              <a:rPr lang="en-US" sz="1400" dirty="0"/>
+              <a:t>&lt;v1,v2,…,</a:t>
+            </a:r>
+            <a:r>
+              <a:rPr lang="en-US" sz="1400" dirty="0" err="1"/>
+              <a:t>vn</a:t>
+            </a:r>
+            <a:r>
+              <a:rPr lang="en-US" sz="1400" dirty="0"/>
+              <a:t>&gt;</a:t>
+            </a:r>
+          </a:p>
+        </p:txBody>
+      </p:sp>
+      <p:sp>
+        <p:nvSpPr>
+          <p:cNvPr id="91" name="TextBox 90">
+            <a:extLst>
+              <a:ext uri="{FF2B5EF4-FFF2-40B4-BE49-F238E27FC236}">
+                <a16:creationId xmlns:a16="http://schemas.microsoft.com/office/drawing/2014/main" id="{348D64BF-669D-4248-86C4-FE9155FCFEEA}"/>
+              </a:ext>
+            </a:extLst>
+          </p:cNvPr>
+          <p:cNvSpPr txBox="1"/>
+          <p:nvPr/>
+        </p:nvSpPr>
+        <p:spPr>
+          <a:xfrm>
+            <a:off x="8564987" y="1106460"/>
+            <a:ext cx="1310628" cy="923330"/>
+          </a:xfrm>
+          <a:prstGeom prst="rect">
+            <a:avLst/>
+          </a:prstGeom>
+          <a:noFill/>
+        </p:spPr>
+        <p:txBody>
+          <a:bodyPr wrap="square" rtlCol="0">
+            <a:spAutoFit/>
+          </a:bodyPr>
+          <a:lstStyle/>
+          <a:p>
+            <a:pPr algn="ctr"/>
+            <a:r>
+              <a:rPr lang="en-US" b="1" i="1" dirty="0"/>
+              <a:t>Fully connected </a:t>
+            </a:r>
+          </a:p>
+          <a:p>
+            <a:pPr algn="ctr"/>
+            <a:r>
+              <a:rPr lang="en-US" b="1" i="1" dirty="0"/>
+              <a:t>layer</a:t>
+            </a:r>
+          </a:p>
+        </p:txBody>
+      </p:sp>
+      <p:sp>
+        <p:nvSpPr>
+          <p:cNvPr id="92" name="TextBox 91">
+            <a:extLst>
+              <a:ext uri="{FF2B5EF4-FFF2-40B4-BE49-F238E27FC236}">
+                <a16:creationId xmlns:a16="http://schemas.microsoft.com/office/drawing/2014/main" id="{D064FDF3-ACAB-4676-9452-E300D8011371}"/>
+              </a:ext>
+            </a:extLst>
+          </p:cNvPr>
+          <p:cNvSpPr txBox="1"/>
+          <p:nvPr/>
+        </p:nvSpPr>
+        <p:spPr>
+          <a:xfrm>
+            <a:off x="8796519" y="2859716"/>
+            <a:ext cx="1373818" cy="369332"/>
+          </a:xfrm>
+          <a:prstGeom prst="rect">
+            <a:avLst/>
+          </a:prstGeom>
+          <a:noFill/>
+        </p:spPr>
+        <p:txBody>
+          <a:bodyPr wrap="square" rtlCol="0">
+            <a:spAutoFit/>
+          </a:bodyPr>
+          <a:lstStyle/>
+          <a:p>
+            <a:pPr algn="ctr"/>
+            <a:r>
+              <a:rPr lang="en-US" b="1" i="1" dirty="0"/>
               <a:t>concatenate</a:t>
             </a:r>
           </a:p>

</xml_diff>